<commit_message>
Simulator and Simulator Wrapper folien
</commit_message>
<xml_diff>
--- a/Projektvortrag/Präsentation Projektvortrag.pptx
+++ b/Projektvortrag/Präsentation Projektvortrag.pptx
@@ -24484,10 +24484,135 @@
           <a:bodyPr/>
           <a:lstStyle/>
           <a:p>
+            <a:pPr marL="285750" indent="-285750">
+              <a:buFont typeface="Arial" panose="020B0604020202020204" pitchFamily="34" charset="0"/>
+              <a:buChar char="•"/>
+            </a:pPr>
+            <a:r>
+              <a:rPr lang="de-DE" dirty="0"/>
+              <a:t>Der Simulator nimmt alle Einstellungsmöglichkeiten entgegen</a:t>
+            </a:r>
+          </a:p>
+          <a:p>
+            <a:pPr marL="285750" indent="-285750">
+              <a:buFont typeface="Arial" panose="020B0604020202020204" pitchFamily="34" charset="0"/>
+              <a:buChar char="•"/>
+            </a:pPr>
+            <a:r>
+              <a:rPr lang="de-DE" dirty="0"/>
+              <a:t>Bei dem Aufruf von </a:t>
+            </a:r>
+            <a:r>
+              <a:rPr lang="de-DE" b="1" dirty="0"/>
+              <a:t>simulate </a:t>
+            </a:r>
+            <a:r>
+              <a:rPr lang="de-DE" dirty="0"/>
+              <a:t>wird eine Generationsstufe durchgeführt</a:t>
+            </a:r>
+          </a:p>
+          <a:p>
+            <a:pPr marL="552450" lvl="1" indent="-285750">
+              <a:buFont typeface="Arial" panose="020B0604020202020204" pitchFamily="34" charset="0"/>
+              <a:buChar char="•"/>
+            </a:pPr>
+            <a:r>
+              <a:rPr lang="de-DE" dirty="0"/>
+              <a:t>Die Genetischen Algorithmen werden automatisch in der richtigen Reihenfolge aufgerufen</a:t>
+            </a:r>
+          </a:p>
+          <a:p>
+            <a:pPr marL="552450" lvl="1" indent="-285750">
+              <a:buFont typeface="Arial" panose="020B0604020202020204" pitchFamily="34" charset="0"/>
+              <a:buChar char="•"/>
+            </a:pPr>
+            <a:r>
+              <a:rPr lang="de-DE" dirty="0"/>
+              <a:t>Gibt statistische Ergebnisse zurück (beste, schlechteste, average)</a:t>
+            </a:r>
+          </a:p>
+          <a:p>
+            <a:pPr marL="285750" indent="-285750">
+              <a:buFont typeface="Arial" panose="020B0604020202020204" pitchFamily="34" charset="0"/>
+              <a:buChar char="•"/>
+            </a:pPr>
+            <a:endParaRPr lang="de-DE" dirty="0"/>
+          </a:p>
+          <a:p>
+            <a:pPr marL="285750" indent="-285750">
+              <a:buFont typeface="Arial" panose="020B0604020202020204" pitchFamily="34" charset="0"/>
+              <a:buChar char="•"/>
+            </a:pPr>
+            <a:r>
+              <a:rPr lang="de-DE" dirty="0"/>
+              <a:t>Die Funktion </a:t>
+            </a:r>
+            <a:r>
+              <a:rPr lang="de-DE" b="1" dirty="0"/>
+              <a:t>best_individual</a:t>
+            </a:r>
+            <a:r>
+              <a:rPr lang="de-DE" dirty="0"/>
+              <a:t> gibt das Individuum mit der größten Fitness zurücl</a:t>
+            </a:r>
+          </a:p>
+          <a:p>
+            <a:pPr marL="285750" indent="-285750">
+              <a:buFont typeface="Arial" panose="020B0604020202020204" pitchFamily="34" charset="0"/>
+              <a:buChar char="•"/>
+            </a:pPr>
+            <a:endParaRPr lang="de-DE" dirty="0"/>
+          </a:p>
+          <a:p>
+            <a:pPr marL="552450" lvl="1" indent="-285750">
+              <a:buFont typeface="Arial" panose="020B0604020202020204" pitchFamily="34" charset="0"/>
+              <a:buChar char="•"/>
+            </a:pPr>
+            <a:endParaRPr lang="de-DE" dirty="0"/>
+          </a:p>
+          <a:p>
+            <a:pPr marL="552450" lvl="1" indent="-285750">
+              <a:buFont typeface="Arial" panose="020B0604020202020204" pitchFamily="34" charset="0"/>
+              <a:buChar char="•"/>
+            </a:pPr>
+            <a:endParaRPr lang="de-DE" dirty="0"/>
+          </a:p>
+          <a:p>
+            <a:pPr lvl="1"/>
             <a:endParaRPr lang="de-DE" dirty="0"/>
           </a:p>
         </p:txBody>
       </p:sp>
+      <p:pic>
+        <p:nvPicPr>
+          <p:cNvPr id="5" name="Picture 4">
+            <a:extLst>
+              <a:ext uri="{FF2B5EF4-FFF2-40B4-BE49-F238E27FC236}">
+                <a16:creationId xmlns:a16="http://schemas.microsoft.com/office/drawing/2014/main" id="{218822C5-0C67-414D-B6B4-0F36E1BD69C4}"/>
+              </a:ext>
+            </a:extLst>
+          </p:cNvPr>
+          <p:cNvPicPr>
+            <a:picLocks noChangeAspect="1"/>
+          </p:cNvPicPr>
+          <p:nvPr/>
+        </p:nvPicPr>
+        <p:blipFill>
+          <a:blip r:embed="rId2"/>
+          <a:stretch>
+            <a:fillRect/>
+          </a:stretch>
+        </p:blipFill>
+        <p:spPr>
+          <a:xfrm>
+            <a:off x="2358485" y="3568731"/>
+            <a:ext cx="5153025" cy="2419350"/>
+          </a:xfrm>
+          <a:prstGeom prst="rect">
+            <a:avLst/>
+          </a:prstGeom>
+        </p:spPr>
+      </p:pic>
     </p:spTree>
     <p:extLst>
       <p:ext uri="{BB962C8B-B14F-4D97-AF65-F5344CB8AC3E}">
@@ -24562,12 +24687,369 @@
             <p:ph type="body" sz="quarter" idx="11"/>
           </p:nvPr>
         </p:nvSpPr>
-        <p:spPr/>
+        <p:spPr>
+          <a:xfrm>
+            <a:off x="334963" y="1280160"/>
+            <a:ext cx="11487150" cy="1835902"/>
+          </a:xfrm>
+        </p:spPr>
         <p:txBody>
           <a:bodyPr/>
           <a:lstStyle/>
           <a:p>
-            <a:endParaRPr lang="de-DE"/>
+            <a:pPr marL="285750" indent="-285750">
+              <a:buFont typeface="Arial" panose="020B0604020202020204" pitchFamily="34" charset="0"/>
+              <a:buChar char="•"/>
+            </a:pPr>
+            <a:r>
+              <a:rPr lang="de-DE" dirty="0"/>
+              <a:t>Boost Python Bibliothek</a:t>
+            </a:r>
+          </a:p>
+          <a:p>
+            <a:pPr marL="285750" indent="-285750">
+              <a:buFont typeface="Arial" panose="020B0604020202020204" pitchFamily="34" charset="0"/>
+              <a:buChar char="•"/>
+            </a:pPr>
+            <a:r>
+              <a:rPr lang="de-DE" dirty="0"/>
+              <a:t>Erstellung von Schnittstellen zwischen C++ und Python</a:t>
+            </a:r>
+          </a:p>
+          <a:p>
+            <a:pPr marL="285750" indent="-285750">
+              <a:buFont typeface="Arial" panose="020B0604020202020204" pitchFamily="34" charset="0"/>
+              <a:buChar char="•"/>
+            </a:pPr>
+            <a:r>
+              <a:rPr lang="de-DE" dirty="0"/>
+              <a:t>Schnell und unkompliziert</a:t>
+            </a:r>
+          </a:p>
+        </p:txBody>
+      </p:sp>
+      <p:sp>
+        <p:nvSpPr>
+          <p:cNvPr id="7" name="Text Placeholder 2">
+            <a:extLst>
+              <a:ext uri="{FF2B5EF4-FFF2-40B4-BE49-F238E27FC236}">
+                <a16:creationId xmlns:a16="http://schemas.microsoft.com/office/drawing/2014/main" id="{E5D452C1-DD4D-4E05-90BB-0F8EBB7CDC84}"/>
+              </a:ext>
+            </a:extLst>
+          </p:cNvPr>
+          <p:cNvSpPr txBox="1">
+            <a:spLocks/>
+          </p:cNvSpPr>
+          <p:nvPr/>
+        </p:nvSpPr>
+        <p:spPr bwMode="auto">
+          <a:xfrm>
+            <a:off x="369887" y="2511048"/>
+            <a:ext cx="6723371" cy="3721075"/>
+          </a:xfrm>
+          <a:prstGeom prst="rect">
+            <a:avLst/>
+          </a:prstGeom>
+          <a:noFill/>
+          <a:ln>
+            <a:noFill/>
+          </a:ln>
+          <a:extLst>
+            <a:ext uri="{909E8E84-426E-40DD-AFC4-6F175D3DCCD1}">
+              <a14:hiddenFill xmlns:a14="http://schemas.microsoft.com/office/drawing/2010/main">
+                <a:solidFill>
+                  <a:srgbClr val="FFFFFF"/>
+                </a:solidFill>
+              </a14:hiddenFill>
+            </a:ext>
+            <a:ext uri="{91240B29-F687-4F45-9708-019B960494DF}">
+              <a14:hiddenLine xmlns:a14="http://schemas.microsoft.com/office/drawing/2010/main" w="9525">
+                <a:solidFill>
+                  <a:srgbClr val="000000"/>
+                </a:solidFill>
+                <a:miter lim="800000"/>
+                <a:headEnd/>
+                <a:tailEnd/>
+              </a14:hiddenLine>
+            </a:ext>
+          </a:extLst>
+        </p:spPr>
+        <p:txBody>
+          <a:bodyPr vert="horz" wrap="square" lIns="91440" tIns="45720" rIns="91440" bIns="45720" numCol="1" anchor="t" anchorCtr="0" compatLnSpc="1">
+            <a:prstTxWarp prst="textNoShape">
+              <a:avLst/>
+            </a:prstTxWarp>
+          </a:bodyPr>
+          <a:lstStyle>
+            <a:lvl1pPr marL="0" indent="0" algn="l" rtl="0" eaLnBrk="0" fontAlgn="base" hangingPunct="0">
+              <a:spcBef>
+                <a:spcPct val="20000"/>
+              </a:spcBef>
+              <a:spcAft>
+                <a:spcPct val="0"/>
+              </a:spcAft>
+              <a:buClr>
+                <a:srgbClr val="80BA24"/>
+              </a:buClr>
+              <a:buSzPct val="106000"/>
+              <a:buFontTx/>
+              <a:buNone/>
+              <a:defRPr kern="1200" baseline="0">
+                <a:solidFill>
+                  <a:srgbClr val="4A5C66"/>
+                </a:solidFill>
+                <a:latin typeface="Arial" pitchFamily="34" charset="0"/>
+                <a:ea typeface="MS PGothic" panose="020B0600070205080204" pitchFamily="34" charset="-128"/>
+                <a:cs typeface="Arial" pitchFamily="34" charset="0"/>
+              </a:defRPr>
+            </a:lvl1pPr>
+            <a:lvl2pPr marL="266700" indent="0" algn="l" rtl="0" eaLnBrk="0" fontAlgn="base" hangingPunct="0">
+              <a:spcBef>
+                <a:spcPct val="20000"/>
+              </a:spcBef>
+              <a:spcAft>
+                <a:spcPct val="0"/>
+              </a:spcAft>
+              <a:buClr>
+                <a:srgbClr val="80BA24"/>
+              </a:buClr>
+              <a:buSzPct val="90000"/>
+              <a:buFontTx/>
+              <a:buNone/>
+              <a:defRPr kern="1200">
+                <a:solidFill>
+                  <a:srgbClr val="4A5C66"/>
+                </a:solidFill>
+                <a:latin typeface="Arial" pitchFamily="34" charset="0"/>
+                <a:ea typeface="Arial" charset="0"/>
+                <a:cs typeface="Arial" pitchFamily="34" charset="0"/>
+              </a:defRPr>
+            </a:lvl2pPr>
+            <a:lvl3pPr marL="542925" indent="0" algn="l" rtl="0" eaLnBrk="0" fontAlgn="base" hangingPunct="0">
+              <a:spcBef>
+                <a:spcPct val="20000"/>
+              </a:spcBef>
+              <a:spcAft>
+                <a:spcPct val="0"/>
+              </a:spcAft>
+              <a:buClr>
+                <a:srgbClr val="80BA24"/>
+              </a:buClr>
+              <a:buSzPct val="80000"/>
+              <a:buFontTx/>
+              <a:buNone/>
+              <a:defRPr kern="1200">
+                <a:solidFill>
+                  <a:srgbClr val="4A5C66"/>
+                </a:solidFill>
+                <a:latin typeface="Arial" pitchFamily="34" charset="0"/>
+                <a:ea typeface="Arial" charset="0"/>
+                <a:cs typeface="Arial" pitchFamily="34" charset="0"/>
+              </a:defRPr>
+            </a:lvl3pPr>
+            <a:lvl4pPr marL="809625" indent="0" algn="l" rtl="0" eaLnBrk="0" fontAlgn="base" hangingPunct="0">
+              <a:spcBef>
+                <a:spcPct val="20000"/>
+              </a:spcBef>
+              <a:spcAft>
+                <a:spcPct val="0"/>
+              </a:spcAft>
+              <a:buClr>
+                <a:srgbClr val="80BA24"/>
+              </a:buClr>
+              <a:buSzPct val="80000"/>
+              <a:buFontTx/>
+              <a:buNone/>
+              <a:defRPr kern="1200">
+                <a:solidFill>
+                  <a:srgbClr val="4A5C66"/>
+                </a:solidFill>
+                <a:latin typeface="Arial" pitchFamily="34" charset="0"/>
+                <a:ea typeface="Arial" charset="0"/>
+                <a:cs typeface="Arial" pitchFamily="34" charset="0"/>
+              </a:defRPr>
+            </a:lvl4pPr>
+            <a:lvl5pPr marL="1076325" indent="0" algn="l" rtl="0" eaLnBrk="0" fontAlgn="base" hangingPunct="0">
+              <a:spcBef>
+                <a:spcPct val="20000"/>
+              </a:spcBef>
+              <a:spcAft>
+                <a:spcPct val="0"/>
+              </a:spcAft>
+              <a:buClr>
+                <a:srgbClr val="80BA24"/>
+              </a:buClr>
+              <a:buSzPct val="80000"/>
+              <a:buFontTx/>
+              <a:buNone/>
+              <a:defRPr kern="1200">
+                <a:solidFill>
+                  <a:srgbClr val="4A5C66"/>
+                </a:solidFill>
+                <a:latin typeface="Arial" pitchFamily="34" charset="0"/>
+                <a:ea typeface="Arial" charset="0"/>
+                <a:cs typeface="Arial" pitchFamily="34" charset="0"/>
+              </a:defRPr>
+            </a:lvl5pPr>
+            <a:lvl6pPr marL="2514600" indent="-228600" algn="l" defTabSz="914400" rtl="0" eaLnBrk="1" latinLnBrk="0" hangingPunct="1">
+              <a:spcBef>
+                <a:spcPct val="20000"/>
+              </a:spcBef>
+              <a:buFont typeface="Arial" pitchFamily="34" charset="0"/>
+              <a:buChar char="•"/>
+              <a:defRPr sz="2000" kern="1200">
+                <a:solidFill>
+                  <a:schemeClr val="tx1"/>
+                </a:solidFill>
+                <a:latin typeface="+mn-lt"/>
+                <a:ea typeface="+mn-ea"/>
+                <a:cs typeface="+mn-cs"/>
+              </a:defRPr>
+            </a:lvl6pPr>
+            <a:lvl7pPr marL="2971800" indent="-228600" algn="l" defTabSz="914400" rtl="0" eaLnBrk="1" latinLnBrk="0" hangingPunct="1">
+              <a:spcBef>
+                <a:spcPct val="20000"/>
+              </a:spcBef>
+              <a:buFont typeface="Arial" pitchFamily="34" charset="0"/>
+              <a:buChar char="•"/>
+              <a:defRPr sz="2000" kern="1200">
+                <a:solidFill>
+                  <a:schemeClr val="tx1"/>
+                </a:solidFill>
+                <a:latin typeface="+mn-lt"/>
+                <a:ea typeface="+mn-ea"/>
+                <a:cs typeface="+mn-cs"/>
+              </a:defRPr>
+            </a:lvl7pPr>
+            <a:lvl8pPr marL="3429000" indent="-228600" algn="l" defTabSz="914400" rtl="0" eaLnBrk="1" latinLnBrk="0" hangingPunct="1">
+              <a:spcBef>
+                <a:spcPct val="20000"/>
+              </a:spcBef>
+              <a:buFont typeface="Arial" pitchFamily="34" charset="0"/>
+              <a:buChar char="•"/>
+              <a:defRPr sz="2000" kern="1200">
+                <a:solidFill>
+                  <a:schemeClr val="tx1"/>
+                </a:solidFill>
+                <a:latin typeface="+mn-lt"/>
+                <a:ea typeface="+mn-ea"/>
+                <a:cs typeface="+mn-cs"/>
+              </a:defRPr>
+            </a:lvl8pPr>
+            <a:lvl9pPr marL="3886200" indent="-228600" algn="l" defTabSz="914400" rtl="0" eaLnBrk="1" latinLnBrk="0" hangingPunct="1">
+              <a:spcBef>
+                <a:spcPct val="20000"/>
+              </a:spcBef>
+              <a:buFont typeface="Arial" pitchFamily="34" charset="0"/>
+              <a:buChar char="•"/>
+              <a:defRPr sz="2000" kern="1200">
+                <a:solidFill>
+                  <a:schemeClr val="tx1"/>
+                </a:solidFill>
+                <a:latin typeface="+mn-lt"/>
+                <a:ea typeface="+mn-ea"/>
+                <a:cs typeface="+mn-cs"/>
+              </a:defRPr>
+            </a:lvl9pPr>
+          </a:lstStyle>
+          <a:p>
+            <a:r>
+              <a:rPr lang="en-US" sz="1200" dirty="0"/>
+              <a:t>BOOST_PYTHON_MODULE(</a:t>
+            </a:r>
+            <a:r>
+              <a:rPr lang="en-US" sz="1200" dirty="0" err="1"/>
+              <a:t>Simulator_Wrapper</a:t>
+            </a:r>
+            <a:r>
+              <a:rPr lang="en-US" sz="1200" dirty="0"/>
+              <a:t>)</a:t>
+            </a:r>
+          </a:p>
+          <a:p>
+            <a:r>
+              <a:rPr lang="en-US" sz="1200" dirty="0"/>
+              <a:t>{</a:t>
+            </a:r>
+          </a:p>
+          <a:p>
+            <a:r>
+              <a:rPr lang="de-DE" sz="1200" dirty="0"/>
+              <a:t>    to_python_converter&lt;std::tuple&lt;int, int, int&gt;, TupleToList&lt;int&gt; &gt;();</a:t>
+            </a:r>
+          </a:p>
+          <a:p>
+            <a:endParaRPr lang="de-DE" sz="1200" dirty="0"/>
+          </a:p>
+          <a:p>
+            <a:r>
+              <a:rPr lang="de-DE" sz="1200" dirty="0"/>
+              <a:t>    enum_&lt;Selection_Algorithm&gt;("Selection_Algorithm")</a:t>
+            </a:r>
+          </a:p>
+          <a:p>
+            <a:r>
+              <a:rPr lang="de-DE" sz="1200" dirty="0"/>
+              <a:t>            .value("SOFT", Selection_Algorithm::SOFT);</a:t>
+            </a:r>
+          </a:p>
+          <a:p>
+            <a:endParaRPr lang="de-DE" sz="1200" dirty="0"/>
+          </a:p>
+          <a:p>
+            <a:r>
+              <a:rPr lang="de-DE" sz="1200" dirty="0"/>
+              <a:t>    class_&lt;Simulator&gt;("Simulator", init&lt;</a:t>
+            </a:r>
+          </a:p>
+          <a:p>
+            <a:r>
+              <a:rPr lang="de-DE" sz="1200" dirty="0"/>
+              <a:t>            std::string, std::string, std::string,</a:t>
+            </a:r>
+          </a:p>
+          <a:p>
+            <a:r>
+              <a:rPr lang="de-DE" sz="1200" dirty="0"/>
+              <a:t>            int,int,int,int,</a:t>
+            </a:r>
+          </a:p>
+          <a:p>
+            <a:r>
+              <a:rPr lang="de-DE" sz="1200" dirty="0"/>
+              <a:t>            Crossover_Algorithm, Marriage_Algorithm, Mutation_Algorithm, Selection_Algorithm&gt;(</a:t>
+            </a:r>
+          </a:p>
+          <a:p>
+            <a:r>
+              <a:rPr lang="de-DE" sz="1200" dirty="0"/>
+              <a:t>            ))</a:t>
+            </a:r>
+          </a:p>
+          <a:p>
+            <a:r>
+              <a:rPr lang="de-DE" sz="1200" dirty="0"/>
+              <a:t>            .def("simulate", &amp;Simulator::simulate)</a:t>
+            </a:r>
+          </a:p>
+          <a:p>
+            <a:r>
+              <a:rPr lang="de-DE" sz="1200" dirty="0"/>
+              <a:t>            .def("finished", &amp;Simulator::finished)</a:t>
+            </a:r>
+          </a:p>
+          <a:p>
+            <a:r>
+              <a:rPr lang="de-DE" sz="1200" dirty="0"/>
+              <a:t>            .def(„best_individual", &amp;Simulator::best_individual);</a:t>
+            </a:r>
+          </a:p>
+          <a:p>
+            <a:r>
+              <a:rPr lang="de-DE" sz="1200" dirty="0"/>
+              <a:t>}</a:t>
+            </a:r>
+            <a:endParaRPr lang="de-DE" sz="1800" dirty="0"/>
           </a:p>
         </p:txBody>
       </p:sp>

</xml_diff>

<commit_message>
Start der Crossover folien
</commit_message>
<xml_diff>
--- a/Projektvortrag/Präsentation Projektvortrag.pptx
+++ b/Projektvortrag/Präsentation Projektvortrag.pptx
@@ -6,10 +6,10 @@
     <p:sldMasterId id="2147483678" r:id="rId2"/>
   </p:sldMasterIdLst>
   <p:notesMasterIdLst>
-    <p:notesMasterId r:id="rId27"/>
+    <p:notesMasterId r:id="rId28"/>
   </p:notesMasterIdLst>
   <p:handoutMasterIdLst>
-    <p:handoutMasterId r:id="rId28"/>
+    <p:handoutMasterId r:id="rId29"/>
   </p:handoutMasterIdLst>
   <p:sldIdLst>
     <p:sldId id="256" r:id="rId3"/>
@@ -25,27 +25,28 @@
     <p:sldId id="285" r:id="rId13"/>
     <p:sldId id="272" r:id="rId14"/>
     <p:sldId id="274" r:id="rId15"/>
-    <p:sldId id="276" r:id="rId16"/>
-    <p:sldId id="277" r:id="rId17"/>
-    <p:sldId id="275" r:id="rId18"/>
-    <p:sldId id="278" r:id="rId19"/>
-    <p:sldId id="286" r:id="rId20"/>
-    <p:sldId id="279" r:id="rId21"/>
-    <p:sldId id="280" r:id="rId22"/>
-    <p:sldId id="281" r:id="rId23"/>
-    <p:sldId id="282" r:id="rId24"/>
-    <p:sldId id="283" r:id="rId25"/>
-    <p:sldId id="257" r:id="rId26"/>
+    <p:sldId id="287" r:id="rId16"/>
+    <p:sldId id="276" r:id="rId17"/>
+    <p:sldId id="277" r:id="rId18"/>
+    <p:sldId id="275" r:id="rId19"/>
+    <p:sldId id="278" r:id="rId20"/>
+    <p:sldId id="286" r:id="rId21"/>
+    <p:sldId id="279" r:id="rId22"/>
+    <p:sldId id="280" r:id="rId23"/>
+    <p:sldId id="281" r:id="rId24"/>
+    <p:sldId id="282" r:id="rId25"/>
+    <p:sldId id="283" r:id="rId26"/>
+    <p:sldId id="257" r:id="rId27"/>
   </p:sldIdLst>
   <p:sldSz cx="12192000" cy="6858000"/>
   <p:notesSz cx="6858000" cy="9144000"/>
   <p:embeddedFontLst>
     <p:embeddedFont>
       <p:font typeface="Calibri" panose="020F0502020204030204" pitchFamily="34" charset="0"/>
-      <p:regular r:id="rId29"/>
-      <p:bold r:id="rId30"/>
-      <p:italic r:id="rId31"/>
-      <p:boldItalic r:id="rId32"/>
+      <p:regular r:id="rId30"/>
+      <p:bold r:id="rId31"/>
+      <p:italic r:id="rId32"/>
+      <p:boldItalic r:id="rId33"/>
     </p:embeddedFont>
   </p:embeddedFontLst>
   <p:defaultTextStyle>
@@ -295,6 +296,7 @@
             <p14:sldId id="285"/>
             <p14:sldId id="272"/>
             <p14:sldId id="274"/>
+            <p14:sldId id="287"/>
             <p14:sldId id="276"/>
             <p14:sldId id="277"/>
             <p14:sldId id="275"/>
@@ -20335,7 +20337,7 @@
             </a:pPr>
             <a:r>
               <a:rPr lang="de-DE" dirty="0"/>
-              <a:t>Methoden um den Umgang mit Individuen zu erleichertn</a:t>
+              <a:t>Methoden um den Umgang mit Individuen zu erleichern</a:t>
             </a:r>
           </a:p>
           <a:p>
@@ -20359,7 +20361,7 @@
             </a:pPr>
             <a:r>
               <a:rPr lang="de-DE" dirty="0"/>
-              <a:t>Hält das Chromom</a:t>
+              <a:t>Hält das Chromosom</a:t>
             </a:r>
           </a:p>
           <a:p>
@@ -20369,7 +20371,7 @@
             </a:pPr>
             <a:r>
               <a:rPr lang="de-DE" dirty="0"/>
-              <a:t>Fitness- und Rating-Funktion werden beim erstellen übergeben</a:t>
+              <a:t>Fitness- und Rating-Funktion werden beim Erstellen übergeben</a:t>
             </a:r>
           </a:p>
           <a:p>
@@ -20379,7 +20381,7 @@
             </a:pPr>
             <a:r>
               <a:rPr lang="de-DE" dirty="0"/>
-              <a:t>Methode um das Chromosome zu prüfen</a:t>
+              <a:t>Methode um das Chromosom zu prüfen</a:t>
             </a:r>
           </a:p>
         </p:txBody>
@@ -22424,7 +22426,91 @@
           <a:bodyPr/>
           <a:lstStyle/>
           <a:p>
-            <a:endParaRPr lang="de-DE"/>
+            <a:pPr marL="285750" indent="-285750">
+              <a:buFont typeface="Arial" panose="020B0604020202020204" pitchFamily="34" charset="0"/>
+              <a:buChar char="•"/>
+            </a:pPr>
+            <a:r>
+              <a:rPr lang="de-DE" dirty="0"/>
+              <a:t>Wichtigster Teil der Genetischen Algorithmen</a:t>
+            </a:r>
+          </a:p>
+          <a:p>
+            <a:pPr marL="285750" indent="-285750">
+              <a:buFont typeface="Arial" panose="020B0604020202020204" pitchFamily="34" charset="0"/>
+              <a:buChar char="•"/>
+            </a:pPr>
+            <a:r>
+              <a:rPr lang="de-DE" dirty="0"/>
+              <a:t>Definiert wie aus zwei Eltern nachkommen generiert werden</a:t>
+            </a:r>
+          </a:p>
+          <a:p>
+            <a:pPr marL="285750" indent="-285750">
+              <a:buFont typeface="Arial" panose="020B0604020202020204" pitchFamily="34" charset="0"/>
+              <a:buChar char="•"/>
+            </a:pPr>
+            <a:endParaRPr lang="de-DE" dirty="0"/>
+          </a:p>
+          <a:p>
+            <a:pPr marL="285750" indent="-285750">
+              <a:buFont typeface="Arial" panose="020B0604020202020204" pitchFamily="34" charset="0"/>
+              <a:buChar char="•"/>
+            </a:pPr>
+            <a:r>
+              <a:rPr lang="de-DE" dirty="0"/>
+              <a:t>Unsere Bibliothek enthält folgende Verfahren:</a:t>
+            </a:r>
+          </a:p>
+          <a:p>
+            <a:pPr marL="552450" lvl="1" indent="-285750">
+              <a:buFont typeface="Arial" panose="020B0604020202020204" pitchFamily="34" charset="0"/>
+              <a:buChar char="•"/>
+            </a:pPr>
+            <a:r>
+              <a:rPr lang="de-DE" dirty="0"/>
+              <a:t>Partially-Matched-Crossover</a:t>
+            </a:r>
+          </a:p>
+          <a:p>
+            <a:pPr marL="552450" lvl="1" indent="-285750">
+              <a:buFont typeface="Arial" panose="020B0604020202020204" pitchFamily="34" charset="0"/>
+              <a:buChar char="•"/>
+            </a:pPr>
+            <a:r>
+              <a:rPr lang="de-DE" dirty="0"/>
+              <a:t>Order-Crossover</a:t>
+            </a:r>
+          </a:p>
+          <a:p>
+            <a:pPr marL="552450" lvl="1" indent="-285750">
+              <a:buFont typeface="Arial" panose="020B0604020202020204" pitchFamily="34" charset="0"/>
+              <a:buChar char="•"/>
+            </a:pPr>
+            <a:r>
+              <a:rPr lang="de-DE" dirty="0"/>
+              <a:t>Cycle-Crossover-All-Cycles</a:t>
+            </a:r>
+          </a:p>
+          <a:p>
+            <a:pPr marL="552450" lvl="1" indent="-285750">
+              <a:buFont typeface="Arial" panose="020B0604020202020204" pitchFamily="34" charset="0"/>
+              <a:buChar char="•"/>
+            </a:pPr>
+            <a:r>
+              <a:rPr lang="de-DE" dirty="0"/>
+              <a:t>Cycle-Crossover-One-Cyle</a:t>
+            </a:r>
+          </a:p>
+          <a:p>
+            <a:pPr marL="552450" lvl="1" indent="-285750">
+              <a:buFont typeface="Arial" panose="020B0604020202020204" pitchFamily="34" charset="0"/>
+              <a:buChar char="•"/>
+            </a:pPr>
+            <a:r>
+              <a:rPr lang="de-DE" dirty="0"/>
+              <a:t>Edge-Recombination-Crossover</a:t>
+            </a:r>
           </a:p>
         </p:txBody>
       </p:sp>
@@ -22463,7 +22549,7 @@
           <p:cNvPr id="2" name="Title 1">
             <a:extLst>
               <a:ext uri="{FF2B5EF4-FFF2-40B4-BE49-F238E27FC236}">
-                <a16:creationId xmlns:a16="http://schemas.microsoft.com/office/drawing/2014/main" id="{85052616-A1AA-4C30-9C7B-DBB34145436D}"/>
+                <a16:creationId xmlns:a16="http://schemas.microsoft.com/office/drawing/2014/main" id="{DD2388D8-106E-40D0-A4BD-5FF4C2E2935B}"/>
               </a:ext>
             </a:extLst>
           </p:cNvPr>
@@ -22481,617 +22567,751 @@
           <a:p>
             <a:r>
               <a:rPr lang="de-DE" dirty="0"/>
-              <a:t>Realisierung – Mutations-Algorithmus</a:t>
+              <a:t>Realisierung – Partially-Matches-Crossover</a:t>
             </a:r>
           </a:p>
         </p:txBody>
       </p:sp>
       <p:sp>
         <p:nvSpPr>
-          <p:cNvPr id="4" name="Rectangle 1">
+          <p:cNvPr id="3" name="Text Placeholder 2">
             <a:extLst>
               <a:ext uri="{FF2B5EF4-FFF2-40B4-BE49-F238E27FC236}">
-                <a16:creationId xmlns:a16="http://schemas.microsoft.com/office/drawing/2014/main" id="{902F850E-7E9B-4622-87C4-FE1420D027EA}"/>
+                <a16:creationId xmlns:a16="http://schemas.microsoft.com/office/drawing/2014/main" id="{79F1354A-B6A2-451D-B387-D4D8507220EF}"/>
               </a:ext>
             </a:extLst>
           </p:cNvPr>
           <p:cNvSpPr>
-            <a:spLocks noGrp="1" noChangeArrowheads="1"/>
+            <a:spLocks noGrp="1"/>
           </p:cNvSpPr>
           <p:nvPr>
             <p:ph type="body" sz="quarter" idx="11"/>
           </p:nvPr>
         </p:nvSpPr>
+        <p:spPr>
+          <a:xfrm>
+            <a:off x="334963" y="1280160"/>
+            <a:ext cx="6101348" cy="4534714"/>
+          </a:xfrm>
+        </p:spPr>
+        <p:txBody>
+          <a:bodyPr/>
+          <a:lstStyle/>
+          <a:p>
+            <a:r>
+              <a:rPr lang="en-US" sz="1050" dirty="0">
+                <a:solidFill>
+                  <a:schemeClr val="accent6">
+                    <a:lumMod val="75000"/>
+                  </a:schemeClr>
+                </a:solidFill>
+              </a:rPr>
+              <a:t>bool</a:t>
+            </a:r>
+            <a:r>
+              <a:rPr lang="en-US" sz="1050" dirty="0"/>
+              <a:t> </a:t>
+            </a:r>
+            <a:r>
+              <a:rPr lang="en-US" sz="1050" dirty="0" err="1"/>
+              <a:t>partially_matched_crossover</a:t>
+            </a:r>
+            <a:r>
+              <a:rPr lang="en-US" sz="1050" dirty="0"/>
+              <a:t>(Individual &amp;p1, Individual &amp;p2, Individual &amp;c1, Individual &amp;c2) {</a:t>
+            </a:r>
+            <a:r>
+              <a:rPr lang="de-DE" sz="1050" dirty="0"/>
+              <a:t> </a:t>
+            </a:r>
+          </a:p>
+          <a:p>
+            <a:pPr lvl="1"/>
+            <a:r>
+              <a:rPr lang="de-DE" sz="1050" dirty="0"/>
+              <a:t>int length = p1.get_size();</a:t>
+            </a:r>
+          </a:p>
+          <a:p>
+            <a:pPr lvl="1"/>
+            <a:r>
+              <a:rPr lang="de-DE" sz="1050" dirty="0"/>
+              <a:t>int interval_border_left = rng.random(length - 2) + 1; // inclusive</a:t>
+            </a:r>
+          </a:p>
+          <a:p>
+            <a:pPr lvl="1"/>
+            <a:r>
+              <a:rPr lang="de-DE" sz="1050" dirty="0"/>
+              <a:t>int interval_border_right; // exclusive</a:t>
+            </a:r>
+          </a:p>
+          <a:p>
+            <a:pPr lvl="1"/>
+            <a:r>
+              <a:rPr lang="de-DE" sz="1050" dirty="0">
+                <a:solidFill>
+                  <a:schemeClr val="accent6">
+                    <a:lumMod val="75000"/>
+                  </a:schemeClr>
+                </a:solidFill>
+              </a:rPr>
+              <a:t>do</a:t>
+            </a:r>
+            <a:r>
+              <a:rPr lang="de-DE" sz="1050" dirty="0"/>
+              <a:t> {</a:t>
+            </a:r>
+          </a:p>
+          <a:p>
+            <a:pPr lvl="1"/>
+            <a:r>
+              <a:rPr lang="de-DE" sz="1050" dirty="0"/>
+              <a:t>    interval_border_right = rng.random(length - interval_border_left) + interval_border_left;</a:t>
+            </a:r>
+          </a:p>
+          <a:p>
+            <a:pPr lvl="1"/>
+            <a:r>
+              <a:rPr lang="de-DE" sz="1050" dirty="0"/>
+              <a:t>} </a:t>
+            </a:r>
+            <a:r>
+              <a:rPr lang="de-DE" sz="1050" dirty="0">
+                <a:solidFill>
+                  <a:schemeClr val="accent6">
+                    <a:lumMod val="75000"/>
+                  </a:schemeClr>
+                </a:solidFill>
+              </a:rPr>
+              <a:t>while</a:t>
+            </a:r>
+            <a:r>
+              <a:rPr lang="de-DE" sz="1050" dirty="0"/>
+              <a:t> (interval_border_left == interval_border_right);</a:t>
+            </a:r>
+          </a:p>
+          <a:p>
+            <a:pPr lvl="1"/>
+            <a:endParaRPr lang="de-DE" sz="1050" dirty="0"/>
+          </a:p>
+          <a:p>
+            <a:pPr lvl="1"/>
+            <a:r>
+              <a:rPr lang="de-DE" sz="1050" dirty="0">
+                <a:solidFill>
+                  <a:schemeClr val="accent6">
+                    <a:lumMod val="75000"/>
+                  </a:schemeClr>
+                </a:solidFill>
+              </a:rPr>
+              <a:t>for</a:t>
+            </a:r>
+            <a:r>
+              <a:rPr lang="de-DE" sz="1050" dirty="0"/>
+              <a:t> (int i = 0; i &lt; length; ++i) {</a:t>
+            </a:r>
+          </a:p>
+          <a:p>
+            <a:pPr lvl="1"/>
+            <a:r>
+              <a:rPr lang="de-DE" sz="1050" dirty="0"/>
+              <a:t>    </a:t>
+            </a:r>
+            <a:r>
+              <a:rPr lang="de-DE" sz="1050" dirty="0">
+                <a:solidFill>
+                  <a:schemeClr val="accent6">
+                    <a:lumMod val="75000"/>
+                  </a:schemeClr>
+                </a:solidFill>
+              </a:rPr>
+              <a:t>if</a:t>
+            </a:r>
+            <a:r>
+              <a:rPr lang="de-DE" sz="1050" dirty="0"/>
+              <a:t> (i &lt; interval_border_left || i &gt;= interval_border_right) {</a:t>
+            </a:r>
+          </a:p>
+          <a:p>
+            <a:pPr lvl="1"/>
+            <a:r>
+              <a:rPr lang="de-DE" sz="1050" dirty="0"/>
+              <a:t>        c1.update_chromosome(p1.get_chromosome().at(i), i);</a:t>
+            </a:r>
+          </a:p>
+          <a:p>
+            <a:pPr lvl="1"/>
+            <a:r>
+              <a:rPr lang="de-DE" sz="1050" dirty="0"/>
+              <a:t>        c2.update_chromosome(p2.get_chromosome().at(i), i);</a:t>
+            </a:r>
+          </a:p>
+          <a:p>
+            <a:pPr lvl="1"/>
+            <a:r>
+              <a:rPr lang="de-DE" sz="1050" dirty="0"/>
+              <a:t>    } </a:t>
+            </a:r>
+            <a:r>
+              <a:rPr lang="de-DE" sz="1050" dirty="0">
+                <a:solidFill>
+                  <a:schemeClr val="accent6">
+                    <a:lumMod val="75000"/>
+                  </a:schemeClr>
+                </a:solidFill>
+              </a:rPr>
+              <a:t>else</a:t>
+            </a:r>
+            <a:r>
+              <a:rPr lang="de-DE" sz="1050" dirty="0"/>
+              <a:t> {</a:t>
+            </a:r>
+          </a:p>
+          <a:p>
+            <a:pPr lvl="1"/>
+            <a:r>
+              <a:rPr lang="de-DE" sz="1050" dirty="0"/>
+              <a:t>        c1.update_chromosome(p2.get_chromosome().at(i), i);</a:t>
+            </a:r>
+          </a:p>
+          <a:p>
+            <a:pPr lvl="1"/>
+            <a:r>
+              <a:rPr lang="de-DE" sz="1050" dirty="0"/>
+              <a:t>        c2.update_chromosome(p1.get_chromosome().at(i), i);</a:t>
+            </a:r>
+          </a:p>
+          <a:p>
+            <a:pPr lvl="1"/>
+            <a:r>
+              <a:rPr lang="de-DE" sz="1050" dirty="0"/>
+              <a:t>    }</a:t>
+            </a:r>
+          </a:p>
+          <a:p>
+            <a:pPr lvl="1"/>
+            <a:r>
+              <a:rPr lang="de-DE" sz="1050" dirty="0"/>
+              <a:t>}</a:t>
+            </a:r>
+          </a:p>
+          <a:p>
+            <a:pPr lvl="1"/>
+            <a:endParaRPr lang="de-DE" sz="1050" dirty="0"/>
+          </a:p>
+          <a:p>
+            <a:pPr lvl="1"/>
+            <a:r>
+              <a:rPr lang="de-DE" sz="1050" dirty="0"/>
+              <a:t>duplicate_correction_pmx(p1, p2, c1);</a:t>
+            </a:r>
+          </a:p>
+          <a:p>
+            <a:pPr lvl="1"/>
+            <a:r>
+              <a:rPr lang="de-DE" sz="1050" dirty="0"/>
+              <a:t>duplicate_correction_pmx(p2, p1, c2);</a:t>
+            </a:r>
+          </a:p>
+          <a:p>
+            <a:pPr lvl="1"/>
+            <a:r>
+              <a:rPr lang="de-DE" sz="1050" dirty="0">
+                <a:solidFill>
+                  <a:schemeClr val="accent6">
+                    <a:lumMod val="75000"/>
+                  </a:schemeClr>
+                </a:solidFill>
+              </a:rPr>
+              <a:t>return</a:t>
+            </a:r>
+            <a:r>
+              <a:rPr lang="de-DE" sz="1050" dirty="0"/>
+              <a:t> true;</a:t>
+            </a:r>
+          </a:p>
+          <a:p>
+            <a:pPr lvl="1"/>
+            <a:r>
+              <a:rPr lang="de-DE" sz="1050" dirty="0"/>
+              <a:t>}</a:t>
+            </a:r>
+          </a:p>
+        </p:txBody>
+      </p:sp>
+      <p:sp>
+        <p:nvSpPr>
+          <p:cNvPr id="7" name="Text Placeholder 2">
+            <a:extLst>
+              <a:ext uri="{FF2B5EF4-FFF2-40B4-BE49-F238E27FC236}">
+                <a16:creationId xmlns:a16="http://schemas.microsoft.com/office/drawing/2014/main" id="{3DAEF8D3-31AA-46E3-BE55-7474D0551DCE}"/>
+              </a:ext>
+            </a:extLst>
+          </p:cNvPr>
+          <p:cNvSpPr txBox="1">
+            <a:spLocks/>
+          </p:cNvSpPr>
+          <p:nvPr/>
+        </p:nvSpPr>
         <p:spPr bwMode="auto">
           <a:xfrm>
-            <a:off x="334963" y="1131901"/>
-            <a:ext cx="5630831" cy="3600986"/>
+            <a:off x="7377344" y="1280160"/>
+            <a:ext cx="4660776" cy="4206240"/>
           </a:xfrm>
           <a:prstGeom prst="rect">
             <a:avLst/>
           </a:prstGeom>
-          <a:solidFill>
-            <a:srgbClr val="FFFFFF"/>
-          </a:solidFill>
+          <a:noFill/>
           <a:ln>
             <a:noFill/>
           </a:ln>
-          <a:effectLst/>
           <a:extLst>
+            <a:ext uri="{909E8E84-426E-40DD-AFC4-6F175D3DCCD1}">
+              <a14:hiddenFill xmlns:a14="http://schemas.microsoft.com/office/drawing/2010/main">
+                <a:solidFill>
+                  <a:srgbClr val="FFFFFF"/>
+                </a:solidFill>
+              </a14:hiddenFill>
+            </a:ext>
             <a:ext uri="{91240B29-F687-4F45-9708-019B960494DF}">
               <a14:hiddenLine xmlns:a14="http://schemas.microsoft.com/office/drawing/2010/main" w="9525">
                 <a:solidFill>
-                  <a:schemeClr val="tx1"/>
+                  <a:srgbClr val="000000"/>
                 </a:solidFill>
                 <a:miter lim="800000"/>
                 <a:headEnd/>
                 <a:tailEnd/>
               </a14:hiddenLine>
             </a:ext>
-            <a:ext uri="{AF507438-7753-43E0-B8FC-AC1667EBCBE1}">
-              <a14:hiddenEffects xmlns:a14="http://schemas.microsoft.com/office/drawing/2010/main">
-                <a:effectLst>
-                  <a:outerShdw dist="35921" dir="2700000" algn="ctr" rotWithShape="0">
-                    <a:schemeClr val="bg2"/>
-                  </a:outerShdw>
-                </a:effectLst>
-              </a14:hiddenEffects>
-            </a:ext>
           </a:extLst>
         </p:spPr>
         <p:txBody>
-          <a:bodyPr vert="horz" wrap="square" lIns="91440" tIns="45720" rIns="91440" bIns="45720" numCol="1" anchor="ctr" anchorCtr="0" compatLnSpc="1">
+          <a:bodyPr vert="horz" wrap="square" lIns="91440" tIns="45720" rIns="91440" bIns="45720" numCol="1" anchor="t" anchorCtr="0" compatLnSpc="1">
             <a:prstTxWarp prst="textNoShape">
               <a:avLst/>
             </a:prstTxWarp>
-            <a:spAutoFit/>
           </a:bodyPr>
-          <a:lstStyle/>
-          <a:p>
-            <a:pPr marR="0" lvl="0" defTabSz="914400" latinLnBrk="0">
-              <a:lnSpc>
-                <a:spcPct val="100000"/>
-              </a:lnSpc>
-              <a:tabLst/>
+          <a:lstStyle>
+            <a:lvl1pPr marL="0" indent="0" algn="l" rtl="0" eaLnBrk="0" fontAlgn="base" hangingPunct="0">
+              <a:spcBef>
+                <a:spcPct val="20000"/>
+              </a:spcBef>
+              <a:spcAft>
+                <a:spcPct val="0"/>
+              </a:spcAft>
+              <a:buClr>
+                <a:srgbClr val="80BA24"/>
+              </a:buClr>
+              <a:buSzPct val="106000"/>
+              <a:buFontTx/>
+              <a:buNone/>
+              <a:defRPr kern="1200" baseline="0">
+                <a:solidFill>
+                  <a:srgbClr val="4A5C66"/>
+                </a:solidFill>
+                <a:latin typeface="Arial" pitchFamily="34" charset="0"/>
+                <a:ea typeface="MS PGothic" panose="020B0600070205080204" pitchFamily="34" charset="-128"/>
+                <a:cs typeface="Arial" pitchFamily="34" charset="0"/>
+              </a:defRPr>
+            </a:lvl1pPr>
+            <a:lvl2pPr marL="266700" indent="0" algn="l" rtl="0" eaLnBrk="0" fontAlgn="base" hangingPunct="0">
+              <a:spcBef>
+                <a:spcPct val="20000"/>
+              </a:spcBef>
+              <a:spcAft>
+                <a:spcPct val="0"/>
+              </a:spcAft>
+              <a:buClr>
+                <a:srgbClr val="80BA24"/>
+              </a:buClr>
+              <a:buSzPct val="90000"/>
+              <a:buFontTx/>
+              <a:buNone/>
+              <a:defRPr kern="1200">
+                <a:solidFill>
+                  <a:srgbClr val="4A5C66"/>
+                </a:solidFill>
+                <a:latin typeface="Arial" pitchFamily="34" charset="0"/>
+                <a:ea typeface="Arial" charset="0"/>
+                <a:cs typeface="Arial" pitchFamily="34" charset="0"/>
+              </a:defRPr>
+            </a:lvl2pPr>
+            <a:lvl3pPr marL="542925" indent="0" algn="l" rtl="0" eaLnBrk="0" fontAlgn="base" hangingPunct="0">
+              <a:spcBef>
+                <a:spcPct val="20000"/>
+              </a:spcBef>
+              <a:spcAft>
+                <a:spcPct val="0"/>
+              </a:spcAft>
+              <a:buClr>
+                <a:srgbClr val="80BA24"/>
+              </a:buClr>
+              <a:buSzPct val="80000"/>
+              <a:buFontTx/>
+              <a:buNone/>
+              <a:defRPr kern="1200">
+                <a:solidFill>
+                  <a:srgbClr val="4A5C66"/>
+                </a:solidFill>
+                <a:latin typeface="Arial" pitchFamily="34" charset="0"/>
+                <a:ea typeface="Arial" charset="0"/>
+                <a:cs typeface="Arial" pitchFamily="34" charset="0"/>
+              </a:defRPr>
+            </a:lvl3pPr>
+            <a:lvl4pPr marL="809625" indent="0" algn="l" rtl="0" eaLnBrk="0" fontAlgn="base" hangingPunct="0">
+              <a:spcBef>
+                <a:spcPct val="20000"/>
+              </a:spcBef>
+              <a:spcAft>
+                <a:spcPct val="0"/>
+              </a:spcAft>
+              <a:buClr>
+                <a:srgbClr val="80BA24"/>
+              </a:buClr>
+              <a:buSzPct val="80000"/>
+              <a:buFontTx/>
+              <a:buNone/>
+              <a:defRPr kern="1200">
+                <a:solidFill>
+                  <a:srgbClr val="4A5C66"/>
+                </a:solidFill>
+                <a:latin typeface="Arial" pitchFamily="34" charset="0"/>
+                <a:ea typeface="Arial" charset="0"/>
+                <a:cs typeface="Arial" pitchFamily="34" charset="0"/>
+              </a:defRPr>
+            </a:lvl4pPr>
+            <a:lvl5pPr marL="1076325" indent="0" algn="l" rtl="0" eaLnBrk="0" fontAlgn="base" hangingPunct="0">
+              <a:spcBef>
+                <a:spcPct val="20000"/>
+              </a:spcBef>
+              <a:spcAft>
+                <a:spcPct val="0"/>
+              </a:spcAft>
+              <a:buClr>
+                <a:srgbClr val="80BA24"/>
+              </a:buClr>
+              <a:buSzPct val="80000"/>
+              <a:buFontTx/>
+              <a:buNone/>
+              <a:defRPr kern="1200">
+                <a:solidFill>
+                  <a:srgbClr val="4A5C66"/>
+                </a:solidFill>
+                <a:latin typeface="Arial" pitchFamily="34" charset="0"/>
+                <a:ea typeface="Arial" charset="0"/>
+                <a:cs typeface="Arial" pitchFamily="34" charset="0"/>
+              </a:defRPr>
+            </a:lvl5pPr>
+            <a:lvl6pPr marL="2514600" indent="-228600" algn="l" defTabSz="914400" rtl="0" eaLnBrk="1" latinLnBrk="0" hangingPunct="1">
+              <a:spcBef>
+                <a:spcPct val="20000"/>
+              </a:spcBef>
+              <a:buFont typeface="Arial" pitchFamily="34" charset="0"/>
+              <a:buChar char="•"/>
+              <a:defRPr sz="2000" kern="1200">
+                <a:solidFill>
+                  <a:schemeClr val="tx1"/>
+                </a:solidFill>
+                <a:latin typeface="+mn-lt"/>
+                <a:ea typeface="+mn-ea"/>
+                <a:cs typeface="+mn-cs"/>
+              </a:defRPr>
+            </a:lvl6pPr>
+            <a:lvl7pPr marL="2971800" indent="-228600" algn="l" defTabSz="914400" rtl="0" eaLnBrk="1" latinLnBrk="0" hangingPunct="1">
+              <a:spcBef>
+                <a:spcPct val="20000"/>
+              </a:spcBef>
+              <a:buFont typeface="Arial" pitchFamily="34" charset="0"/>
+              <a:buChar char="•"/>
+              <a:defRPr sz="2000" kern="1200">
+                <a:solidFill>
+                  <a:schemeClr val="tx1"/>
+                </a:solidFill>
+                <a:latin typeface="+mn-lt"/>
+                <a:ea typeface="+mn-ea"/>
+                <a:cs typeface="+mn-cs"/>
+              </a:defRPr>
+            </a:lvl7pPr>
+            <a:lvl8pPr marL="3429000" indent="-228600" algn="l" defTabSz="914400" rtl="0" eaLnBrk="1" latinLnBrk="0" hangingPunct="1">
+              <a:spcBef>
+                <a:spcPct val="20000"/>
+              </a:spcBef>
+              <a:buFont typeface="Arial" pitchFamily="34" charset="0"/>
+              <a:buChar char="•"/>
+              <a:defRPr sz="2000" kern="1200">
+                <a:solidFill>
+                  <a:schemeClr val="tx1"/>
+                </a:solidFill>
+                <a:latin typeface="+mn-lt"/>
+                <a:ea typeface="+mn-ea"/>
+                <a:cs typeface="+mn-cs"/>
+              </a:defRPr>
+            </a:lvl8pPr>
+            <a:lvl9pPr marL="3886200" indent="-228600" algn="l" defTabSz="914400" rtl="0" eaLnBrk="1" latinLnBrk="0" hangingPunct="1">
+              <a:spcBef>
+                <a:spcPct val="20000"/>
+              </a:spcBef>
+              <a:buFont typeface="Arial" pitchFamily="34" charset="0"/>
+              <a:buChar char="•"/>
+              <a:defRPr sz="2000" kern="1200">
+                <a:solidFill>
+                  <a:schemeClr val="tx1"/>
+                </a:solidFill>
+                <a:latin typeface="+mn-lt"/>
+                <a:ea typeface="+mn-ea"/>
+                <a:cs typeface="+mn-cs"/>
+              </a:defRPr>
+            </a:lvl9pPr>
+          </a:lstStyle>
+          <a:p>
+            <a:pPr>
+              <a:spcAft>
+                <a:spcPts val="600"/>
+              </a:spcAft>
             </a:pPr>
-            <a:r>
-              <a:rPr lang="de-DE" altLang="de-DE" sz="1200" dirty="0">
-                <a:solidFill>
-                  <a:schemeClr val="accent6">
-                    <a:lumMod val="75000"/>
+            <a:endParaRPr lang="de-DE" sz="1800" dirty="0"/>
+          </a:p>
+          <a:p>
+            <a:pPr marL="342900" indent="-342900">
+              <a:spcAft>
+                <a:spcPts val="600"/>
+              </a:spcAft>
+              <a:buAutoNum type="arabicPeriod"/>
+            </a:pPr>
+            <a:r>
+              <a:rPr lang="de-DE" sz="1800" dirty="0"/>
+              <a:t>Wähle zwei zufällige Intervallgrenzen</a:t>
+            </a:r>
+          </a:p>
+          <a:p>
+            <a:pPr lvl="2">
+              <a:spcAft>
+                <a:spcPts val="600"/>
+              </a:spcAft>
+            </a:pPr>
+            <a:r>
+              <a:rPr lang="de-DE" sz="1800" dirty="0"/>
+              <a:t>p1 = 1 | 2 3 | 4 5</a:t>
+            </a:r>
+          </a:p>
+          <a:p>
+            <a:pPr lvl="2">
+              <a:spcAft>
+                <a:spcPts val="600"/>
+              </a:spcAft>
+            </a:pPr>
+            <a:r>
+              <a:rPr lang="de-DE" sz="1800" dirty="0"/>
+              <a:t>p2 = 5 | 4 3 | 2 1</a:t>
+            </a:r>
+          </a:p>
+          <a:p>
+            <a:pPr marL="342900" indent="-342900">
+              <a:spcAft>
+                <a:spcPts val="600"/>
+              </a:spcAft>
+              <a:buAutoNum type="arabicPeriod"/>
+            </a:pPr>
+            <a:r>
+              <a:rPr lang="de-DE" sz="1800" dirty="0"/>
+              <a:t>Tausche in diesem Intervall die Chromosome der Eltern und schreibe alles in die Kinder</a:t>
+            </a:r>
+          </a:p>
+          <a:p>
+            <a:pPr lvl="2">
+              <a:spcAft>
+                <a:spcPts val="600"/>
+              </a:spcAft>
+            </a:pPr>
+            <a:r>
+              <a:rPr lang="de-DE" sz="1800" dirty="0"/>
+              <a:t>c1 = 1 | </a:t>
+            </a:r>
+            <a:r>
+              <a:rPr lang="de-DE" sz="1800" dirty="0">
+                <a:solidFill>
+                  <a:srgbClr val="FF0000"/>
+                </a:solidFill>
+              </a:rPr>
+              <a:t>4</a:t>
+            </a:r>
+            <a:r>
+              <a:rPr lang="de-DE" sz="1800" dirty="0"/>
+              <a:t> 3 | </a:t>
+            </a:r>
+            <a:r>
+              <a:rPr lang="de-DE" sz="1800" dirty="0">
+                <a:solidFill>
+                  <a:srgbClr val="FF0000"/>
+                </a:solidFill>
+              </a:rPr>
+              <a:t>4</a:t>
+            </a:r>
+            <a:r>
+              <a:rPr lang="de-DE" sz="1800" dirty="0"/>
+              <a:t> 5</a:t>
+            </a:r>
+          </a:p>
+          <a:p>
+            <a:pPr lvl="2">
+              <a:spcAft>
+                <a:spcPts val="600"/>
+              </a:spcAft>
+            </a:pPr>
+            <a:r>
+              <a:rPr lang="de-DE" sz="1800" dirty="0"/>
+              <a:t>c2 = 5 | </a:t>
+            </a:r>
+            <a:r>
+              <a:rPr lang="de-DE" sz="1800" dirty="0">
+                <a:solidFill>
+                  <a:srgbClr val="FF0000"/>
+                </a:solidFill>
+              </a:rPr>
+              <a:t>2</a:t>
+            </a:r>
+            <a:r>
+              <a:rPr lang="de-DE" sz="1800" dirty="0"/>
+              <a:t> 3 | </a:t>
+            </a:r>
+            <a:r>
+              <a:rPr lang="de-DE" sz="1800" dirty="0">
+                <a:solidFill>
+                  <a:srgbClr val="FF0000"/>
+                </a:solidFill>
+              </a:rPr>
+              <a:t>2</a:t>
+            </a:r>
+            <a:r>
+              <a:rPr lang="de-DE" sz="1800" dirty="0"/>
+              <a:t> 1</a:t>
+            </a:r>
+          </a:p>
+          <a:p>
+            <a:pPr marL="342900" indent="-342900">
+              <a:spcAft>
+                <a:spcPts val="600"/>
+              </a:spcAft>
+              <a:buAutoNum type="arabicPeriod"/>
+            </a:pPr>
+            <a:r>
+              <a:rPr lang="de-DE" sz="1800" dirty="0"/>
+              <a:t>Korrigiere doppelte Werte</a:t>
+            </a:r>
+          </a:p>
+          <a:p>
+            <a:pPr lvl="2">
+              <a:spcAft>
+                <a:spcPts val="600"/>
+              </a:spcAft>
+            </a:pPr>
+            <a:r>
+              <a:rPr lang="de-DE" sz="1800" dirty="0"/>
+              <a:t>c1 = 1 | </a:t>
+            </a:r>
+            <a:r>
+              <a:rPr lang="de-DE" sz="1800" dirty="0">
+                <a:solidFill>
+                  <a:schemeClr val="accent3">
+                    <a:lumMod val="50000"/>
                   </a:schemeClr>
                 </a:solidFill>
               </a:rPr>
-              <a:t>bool</a:t>
-            </a:r>
-            <a:r>
-              <a:rPr lang="de-DE" altLang="de-DE" sz="1200" dirty="0"/>
-              <a:t> mutation_delete_shift(Individual &amp;individual, int percentage) {</a:t>
-            </a:r>
-          </a:p>
-          <a:p>
-            <a:pPr marR="0" lvl="0" defTabSz="914400" latinLnBrk="0">
-              <a:lnSpc>
-                <a:spcPct val="100000"/>
-              </a:lnSpc>
-              <a:tabLst/>
+              <a:t>4</a:t>
+            </a:r>
+            <a:r>
+              <a:rPr lang="de-DE" sz="1800" dirty="0"/>
+              <a:t> 3 | </a:t>
+            </a:r>
+            <a:r>
+              <a:rPr lang="de-DE" sz="1800" dirty="0">
+                <a:solidFill>
+                  <a:schemeClr val="accent3">
+                    <a:lumMod val="50000"/>
+                  </a:schemeClr>
+                </a:solidFill>
+              </a:rPr>
+              <a:t>2</a:t>
+            </a:r>
+            <a:r>
+              <a:rPr lang="de-DE" sz="1800" dirty="0"/>
+              <a:t> 5</a:t>
+            </a:r>
+          </a:p>
+          <a:p>
+            <a:pPr lvl="2">
+              <a:spcAft>
+                <a:spcPts val="600"/>
+              </a:spcAft>
             </a:pPr>
             <a:r>
-              <a:rPr lang="de-DE" altLang="de-DE" sz="1200" dirty="0"/>
-              <a:t>    bool mutate = rand() % 100 &lt; percentage;</a:t>
-            </a:r>
-          </a:p>
-          <a:p>
-            <a:pPr marR="0" lvl="0" defTabSz="914400" latinLnBrk="0">
-              <a:lnSpc>
-                <a:spcPct val="100000"/>
-              </a:lnSpc>
-              <a:tabLst/>
+              <a:rPr lang="de-DE" sz="1800" dirty="0"/>
+              <a:t>c2 = 5 | </a:t>
+            </a:r>
+            <a:r>
+              <a:rPr lang="de-DE" sz="1800" dirty="0">
+                <a:solidFill>
+                  <a:schemeClr val="accent3">
+                    <a:lumMod val="50000"/>
+                  </a:schemeClr>
+                </a:solidFill>
+              </a:rPr>
+              <a:t>2</a:t>
+            </a:r>
+            <a:r>
+              <a:rPr lang="de-DE" sz="1800" dirty="0"/>
+              <a:t> 3 | </a:t>
+            </a:r>
+            <a:r>
+              <a:rPr lang="de-DE" sz="1800" dirty="0">
+                <a:solidFill>
+                  <a:schemeClr val="accent3">
+                    <a:lumMod val="50000"/>
+                  </a:schemeClr>
+                </a:solidFill>
+              </a:rPr>
+              <a:t>4</a:t>
+            </a:r>
+            <a:r>
+              <a:rPr lang="de-DE" sz="1800" dirty="0"/>
+              <a:t> 1</a:t>
+            </a:r>
+          </a:p>
+          <a:p>
+            <a:pPr lvl="2">
+              <a:spcAft>
+                <a:spcPts val="600"/>
+              </a:spcAft>
             </a:pPr>
-            <a:endParaRPr lang="de-DE" altLang="de-DE" sz="1200" dirty="0"/>
-          </a:p>
-          <a:p>
-            <a:pPr marR="0" lvl="0" defTabSz="914400" latinLnBrk="0">
-              <a:lnSpc>
-                <a:spcPct val="100000"/>
-              </a:lnSpc>
-              <a:tabLst/>
+            <a:endParaRPr lang="de-DE" sz="1800" dirty="0"/>
+          </a:p>
+          <a:p>
+            <a:pPr>
+              <a:spcAft>
+                <a:spcPts val="600"/>
+              </a:spcAft>
             </a:pPr>
             <a:r>
-              <a:rPr lang="de-DE" altLang="de-DE" sz="1200" dirty="0"/>
-              <a:t>    </a:t>
-            </a:r>
-            <a:r>
-              <a:rPr lang="de-DE" altLang="de-DE" sz="1200" dirty="0">
-                <a:solidFill>
-                  <a:schemeClr val="accent6">
-                    <a:lumMod val="75000"/>
-                  </a:schemeClr>
-                </a:solidFill>
-              </a:rPr>
-              <a:t>if</a:t>
-            </a:r>
-            <a:r>
-              <a:rPr lang="de-DE" altLang="de-DE" sz="1200" dirty="0"/>
-              <a:t> (mutate) {</a:t>
-            </a:r>
-          </a:p>
-          <a:p>
-            <a:pPr marR="0" lvl="0" defTabSz="914400" latinLnBrk="0">
-              <a:lnSpc>
-                <a:spcPct val="100000"/>
-              </a:lnSpc>
-              <a:tabLst/>
+              <a:rPr lang="de-DE" sz="1800" dirty="0"/>
+              <a:t>	</a:t>
+            </a:r>
+          </a:p>
+          <a:p>
+            <a:pPr marL="342900" indent="-342900">
+              <a:spcAft>
+                <a:spcPts val="600"/>
+              </a:spcAft>
+              <a:buAutoNum type="arabicPeriod"/>
             </a:pPr>
-            <a:r>
-              <a:rPr lang="de-DE" altLang="de-DE" sz="1200" dirty="0"/>
-              <a:t>        int position_a = rand() % (individual.get_size() - 1);</a:t>
-            </a:r>
-          </a:p>
-          <a:p>
-            <a:pPr marR="0" lvl="0" defTabSz="914400" latinLnBrk="0">
-              <a:lnSpc>
-                <a:spcPct val="100000"/>
-              </a:lnSpc>
-              <a:tabLst/>
-            </a:pPr>
-            <a:r>
-              <a:rPr lang="de-DE" altLang="de-DE" sz="1200" dirty="0"/>
-              <a:t>        int position_b;</a:t>
-            </a:r>
-          </a:p>
-          <a:p>
-            <a:pPr marR="0" lvl="0" defTabSz="914400" latinLnBrk="0">
-              <a:lnSpc>
-                <a:spcPct val="100000"/>
-              </a:lnSpc>
-              <a:tabLst/>
-            </a:pPr>
-            <a:r>
-              <a:rPr lang="de-DE" altLang="de-DE" sz="1200" dirty="0"/>
-              <a:t>        </a:t>
-            </a:r>
-            <a:r>
-              <a:rPr lang="de-DE" altLang="de-DE" sz="1200" dirty="0">
-                <a:solidFill>
-                  <a:schemeClr val="accent6">
-                    <a:lumMod val="75000"/>
-                  </a:schemeClr>
-                </a:solidFill>
-              </a:rPr>
-              <a:t>do</a:t>
-            </a:r>
-            <a:r>
-              <a:rPr lang="de-DE" altLang="de-DE" sz="1200" dirty="0"/>
-              <a:t> {</a:t>
-            </a:r>
-          </a:p>
-          <a:p>
-            <a:pPr marR="0" lvl="0" defTabSz="914400" latinLnBrk="0">
-              <a:lnSpc>
-                <a:spcPct val="100000"/>
-              </a:lnSpc>
-              <a:tabLst/>
-            </a:pPr>
-            <a:r>
-              <a:rPr lang="de-DE" altLang="de-DE" sz="1200" dirty="0"/>
-              <a:t>            position_b = rand() % (individual.get_size() - position_a) + position_a;</a:t>
-            </a:r>
-          </a:p>
-          <a:p>
-            <a:pPr marR="0" lvl="0" defTabSz="914400" latinLnBrk="0">
-              <a:lnSpc>
-                <a:spcPct val="100000"/>
-              </a:lnSpc>
-              <a:tabLst/>
-            </a:pPr>
-            <a:r>
-              <a:rPr lang="de-DE" altLang="de-DE" sz="1200" dirty="0"/>
-              <a:t>        } </a:t>
-            </a:r>
-            <a:r>
-              <a:rPr lang="de-DE" altLang="de-DE" sz="1200" dirty="0">
-                <a:solidFill>
-                  <a:schemeClr val="accent6">
-                    <a:lumMod val="75000"/>
-                  </a:schemeClr>
-                </a:solidFill>
-              </a:rPr>
-              <a:t>while</a:t>
-            </a:r>
-            <a:r>
-              <a:rPr lang="de-DE" altLang="de-DE" sz="1200" dirty="0"/>
-              <a:t> (position_a == position_b);</a:t>
-            </a:r>
-          </a:p>
-          <a:p>
-            <a:pPr marR="0" lvl="0" defTabSz="914400" latinLnBrk="0">
-              <a:lnSpc>
-                <a:spcPct val="100000"/>
-              </a:lnSpc>
-              <a:tabLst/>
-            </a:pPr>
-            <a:r>
-              <a:rPr lang="de-DE" altLang="de-DE" sz="1200" dirty="0"/>
-              <a:t>    </a:t>
-            </a:r>
-          </a:p>
-          <a:p>
-            <a:pPr marR="0" lvl="0" defTabSz="914400" latinLnBrk="0">
-              <a:lnSpc>
-                <a:spcPct val="100000"/>
-              </a:lnSpc>
-              <a:tabLst/>
-            </a:pPr>
-            <a:r>
-              <a:rPr lang="de-DE" altLang="de-DE" sz="1200" dirty="0"/>
-              <a:t>    </a:t>
-            </a:r>
-            <a:r>
-              <a:rPr lang="de-DE" altLang="de-DE" sz="1200" dirty="0">
-                <a:solidFill>
-                  <a:schemeClr val="accent6">
-                    <a:lumMod val="75000"/>
-                  </a:schemeClr>
-                </a:solidFill>
-              </a:rPr>
-              <a:t>for</a:t>
-            </a:r>
-            <a:r>
-              <a:rPr lang="de-DE" altLang="de-DE" sz="1200" dirty="0"/>
-              <a:t> (int i = position_a; i &lt; position_b; i++) {</a:t>
-            </a:r>
-          </a:p>
-          <a:p>
-            <a:pPr marR="0" lvl="0" defTabSz="914400" latinLnBrk="0">
-              <a:lnSpc>
-                <a:spcPct val="100000"/>
-              </a:lnSpc>
-              <a:tabLst/>
-            </a:pPr>
-            <a:r>
-              <a:rPr lang="de-DE" altLang="de-DE" sz="1200" dirty="0"/>
-              <a:t>        swap_chromosome(individual.get_chromosome(), i, i + 1);</a:t>
-            </a:r>
-          </a:p>
-          <a:p>
-            <a:pPr marR="0" lvl="0" defTabSz="914400" latinLnBrk="0">
-              <a:lnSpc>
-                <a:spcPct val="100000"/>
-              </a:lnSpc>
-              <a:tabLst/>
-            </a:pPr>
-            <a:r>
-              <a:rPr lang="de-DE" altLang="de-DE" sz="1200" dirty="0"/>
-              <a:t>    }</a:t>
-            </a:r>
-          </a:p>
-          <a:p>
-            <a:pPr marR="0" lvl="0" defTabSz="914400" latinLnBrk="0">
-              <a:lnSpc>
-                <a:spcPct val="100000"/>
-              </a:lnSpc>
-              <a:tabLst/>
-            </a:pPr>
-            <a:endParaRPr lang="de-DE" altLang="de-DE" sz="1200" dirty="0"/>
-          </a:p>
-          <a:p>
-            <a:pPr marR="0" lvl="0" defTabSz="914400" latinLnBrk="0">
-              <a:lnSpc>
-                <a:spcPct val="100000"/>
-              </a:lnSpc>
-              <a:tabLst/>
-            </a:pPr>
-            <a:r>
-              <a:rPr lang="de-DE" altLang="de-DE" sz="1200" dirty="0"/>
-              <a:t>    return mutate;</a:t>
-            </a:r>
-          </a:p>
-          <a:p>
-            <a:pPr marR="0" lvl="0" defTabSz="914400" latinLnBrk="0">
-              <a:lnSpc>
-                <a:spcPct val="100000"/>
-              </a:lnSpc>
-              <a:tabLst/>
-            </a:pPr>
-            <a:r>
-              <a:rPr lang="de-DE" altLang="de-DE" sz="1200" dirty="0"/>
-              <a:t>}</a:t>
-            </a:r>
-          </a:p>
-        </p:txBody>
-      </p:sp>
-      <p:sp>
-        <p:nvSpPr>
-          <p:cNvPr id="11" name="TextBox 10">
-            <a:extLst>
-              <a:ext uri="{FF2B5EF4-FFF2-40B4-BE49-F238E27FC236}">
-                <a16:creationId xmlns:a16="http://schemas.microsoft.com/office/drawing/2014/main" id="{A9A881C4-7DE0-4C0F-B2EC-F77D820DCF22}"/>
-              </a:ext>
-            </a:extLst>
-          </p:cNvPr>
-          <p:cNvSpPr txBox="1"/>
-          <p:nvPr/>
-        </p:nvSpPr>
-        <p:spPr>
-          <a:xfrm>
-            <a:off x="5965794" y="1292791"/>
-            <a:ext cx="4074850" cy="4108817"/>
-          </a:xfrm>
-          <a:prstGeom prst="rect">
-            <a:avLst/>
-          </a:prstGeom>
-          <a:noFill/>
-        </p:spPr>
-        <p:txBody>
-          <a:bodyPr wrap="square" rtlCol="0">
-            <a:spAutoFit/>
-          </a:bodyPr>
-          <a:lstStyle/>
-          <a:p>
-            <a:pPr>
-              <a:spcAft>
-                <a:spcPts val="600"/>
-              </a:spcAft>
-            </a:pPr>
-            <a:r>
-              <a:rPr lang="de-DE" dirty="0">
-                <a:solidFill>
-                  <a:srgbClr val="4A5C66"/>
-                </a:solidFill>
-                <a:latin typeface="Arial" panose="020B0604020202020204" pitchFamily="34" charset="0"/>
-                <a:cs typeface="Arial" panose="020B0604020202020204" pitchFamily="34" charset="0"/>
-              </a:rPr>
-              <a:t>Chromosom: {1,2,</a:t>
-            </a:r>
-            <a:r>
-              <a:rPr lang="de-DE" b="1" dirty="0">
-                <a:solidFill>
-                  <a:srgbClr val="4A5C66"/>
-                </a:solidFill>
-                <a:latin typeface="Arial" panose="020B0604020202020204" pitchFamily="34" charset="0"/>
-                <a:cs typeface="Arial" panose="020B0604020202020204" pitchFamily="34" charset="0"/>
-              </a:rPr>
-              <a:t>3,4,5,6,7</a:t>
-            </a:r>
-            <a:r>
-              <a:rPr lang="de-DE" dirty="0">
-                <a:solidFill>
-                  <a:srgbClr val="4A5C66"/>
-                </a:solidFill>
-                <a:latin typeface="Arial" panose="020B0604020202020204" pitchFamily="34" charset="0"/>
-                <a:cs typeface="Arial" panose="020B0604020202020204" pitchFamily="34" charset="0"/>
-              </a:rPr>
-              <a:t>,8,9,10}</a:t>
-            </a:r>
-          </a:p>
-          <a:p>
-            <a:pPr>
-              <a:spcAft>
-                <a:spcPts val="600"/>
-              </a:spcAft>
-            </a:pPr>
-            <a:endParaRPr lang="de-DE" dirty="0">
-              <a:solidFill>
-                <a:srgbClr val="4A5C66"/>
-              </a:solidFill>
-              <a:latin typeface="Arial" panose="020B0604020202020204" pitchFamily="34" charset="0"/>
-              <a:cs typeface="Arial" panose="020B0604020202020204" pitchFamily="34" charset="0"/>
-            </a:endParaRPr>
-          </a:p>
-          <a:p>
-            <a:pPr>
-              <a:spcAft>
-                <a:spcPts val="600"/>
-              </a:spcAft>
-            </a:pPr>
-            <a:endParaRPr lang="de-DE" dirty="0">
-              <a:solidFill>
-                <a:srgbClr val="4A5C66"/>
-              </a:solidFill>
-              <a:latin typeface="Arial" panose="020B0604020202020204" pitchFamily="34" charset="0"/>
-              <a:cs typeface="Arial" panose="020B0604020202020204" pitchFamily="34" charset="0"/>
-            </a:endParaRPr>
-          </a:p>
-          <a:p>
-            <a:pPr>
-              <a:spcAft>
-                <a:spcPts val="600"/>
-              </a:spcAft>
-            </a:pPr>
-            <a:r>
-              <a:rPr lang="de-DE" dirty="0">
-                <a:solidFill>
-                  <a:srgbClr val="4A5C66"/>
-                </a:solidFill>
-                <a:latin typeface="Arial" panose="020B0604020202020204" pitchFamily="34" charset="0"/>
-                <a:cs typeface="Arial" panose="020B0604020202020204" pitchFamily="34" charset="0"/>
-              </a:rPr>
-              <a:t>position_a=3</a:t>
-            </a:r>
-          </a:p>
-          <a:p>
-            <a:pPr>
-              <a:spcAft>
-                <a:spcPts val="600"/>
-              </a:spcAft>
-            </a:pPr>
-            <a:endParaRPr lang="de-DE" dirty="0">
-              <a:solidFill>
-                <a:srgbClr val="4A5C66"/>
-              </a:solidFill>
-              <a:latin typeface="Arial" panose="020B0604020202020204" pitchFamily="34" charset="0"/>
-              <a:cs typeface="Arial" panose="020B0604020202020204" pitchFamily="34" charset="0"/>
-            </a:endParaRPr>
-          </a:p>
-          <a:p>
-            <a:pPr>
-              <a:spcAft>
-                <a:spcPts val="600"/>
-              </a:spcAft>
-            </a:pPr>
-            <a:r>
-              <a:rPr lang="de-DE" dirty="0">
-                <a:solidFill>
-                  <a:srgbClr val="4A5C66"/>
-                </a:solidFill>
-                <a:latin typeface="Arial" panose="020B0604020202020204" pitchFamily="34" charset="0"/>
-                <a:cs typeface="Arial" panose="020B0604020202020204" pitchFamily="34" charset="0"/>
-              </a:rPr>
-              <a:t>position_b=7</a:t>
-            </a:r>
-          </a:p>
-          <a:p>
-            <a:pPr>
-              <a:spcAft>
-                <a:spcPts val="600"/>
-              </a:spcAft>
-            </a:pPr>
-            <a:endParaRPr lang="de-DE" dirty="0">
-              <a:solidFill>
-                <a:srgbClr val="4A5C66"/>
-              </a:solidFill>
-              <a:latin typeface="Arial" panose="020B0604020202020204" pitchFamily="34" charset="0"/>
-              <a:cs typeface="Arial" panose="020B0604020202020204" pitchFamily="34" charset="0"/>
-            </a:endParaRPr>
-          </a:p>
-          <a:p>
-            <a:pPr>
-              <a:spcAft>
-                <a:spcPts val="600"/>
-              </a:spcAft>
-            </a:pPr>
-            <a:endParaRPr lang="de-DE" dirty="0">
-              <a:solidFill>
-                <a:srgbClr val="4A5C66"/>
-              </a:solidFill>
-              <a:latin typeface="Arial" panose="020B0604020202020204" pitchFamily="34" charset="0"/>
-              <a:cs typeface="Arial" panose="020B0604020202020204" pitchFamily="34" charset="0"/>
-            </a:endParaRPr>
-          </a:p>
-          <a:p>
-            <a:pPr>
-              <a:spcAft>
-                <a:spcPts val="600"/>
-              </a:spcAft>
-            </a:pPr>
-            <a:endParaRPr lang="de-DE" dirty="0">
-              <a:solidFill>
-                <a:srgbClr val="4A5C66"/>
-              </a:solidFill>
-              <a:latin typeface="Arial" panose="020B0604020202020204" pitchFamily="34" charset="0"/>
-              <a:cs typeface="Arial" panose="020B0604020202020204" pitchFamily="34" charset="0"/>
-            </a:endParaRPr>
-          </a:p>
-          <a:p>
-            <a:pPr>
-              <a:spcAft>
-                <a:spcPts val="600"/>
-              </a:spcAft>
-            </a:pPr>
-            <a:endParaRPr lang="de-DE" dirty="0">
-              <a:solidFill>
-                <a:srgbClr val="4A5C66"/>
-              </a:solidFill>
-              <a:latin typeface="Arial" panose="020B0604020202020204" pitchFamily="34" charset="0"/>
-              <a:cs typeface="Arial" panose="020B0604020202020204" pitchFamily="34" charset="0"/>
-            </a:endParaRPr>
-          </a:p>
-          <a:p>
-            <a:pPr>
-              <a:spcAft>
-                <a:spcPts val="600"/>
-              </a:spcAft>
-            </a:pPr>
-            <a:r>
-              <a:rPr lang="de-DE" dirty="0">
-                <a:solidFill>
-                  <a:srgbClr val="4A5C66"/>
-                </a:solidFill>
-                <a:latin typeface="Arial" panose="020B0604020202020204" pitchFamily="34" charset="0"/>
-                <a:cs typeface="Arial" panose="020B0604020202020204" pitchFamily="34" charset="0"/>
-              </a:rPr>
-              <a:t>Ergebnis: {1,2,</a:t>
-            </a:r>
-            <a:r>
-              <a:rPr lang="de-DE" b="1" dirty="0">
-                <a:solidFill>
-                  <a:srgbClr val="4A5C66"/>
-                </a:solidFill>
-                <a:latin typeface="Arial" panose="020B0604020202020204" pitchFamily="34" charset="0"/>
-                <a:cs typeface="Arial" panose="020B0604020202020204" pitchFamily="34" charset="0"/>
-              </a:rPr>
-              <a:t>4,5,6,7,</a:t>
-            </a:r>
-            <a:r>
-              <a:rPr lang="de-DE" b="1" dirty="0">
-                <a:solidFill>
-                  <a:srgbClr val="C00000"/>
-                </a:solidFill>
-                <a:latin typeface="Arial" panose="020B0604020202020204" pitchFamily="34" charset="0"/>
-                <a:cs typeface="Arial" panose="020B0604020202020204" pitchFamily="34" charset="0"/>
-              </a:rPr>
-              <a:t>3</a:t>
-            </a:r>
-            <a:r>
-              <a:rPr lang="de-DE" dirty="0">
-                <a:solidFill>
-                  <a:srgbClr val="4A5C66"/>
-                </a:solidFill>
-                <a:latin typeface="Arial" panose="020B0604020202020204" pitchFamily="34" charset="0"/>
-                <a:cs typeface="Arial" panose="020B0604020202020204" pitchFamily="34" charset="0"/>
-              </a:rPr>
-              <a:t>,8,9,10}</a:t>
-            </a:r>
-          </a:p>
-          <a:p>
-            <a:pPr>
-              <a:spcAft>
-                <a:spcPts val="600"/>
-              </a:spcAft>
-            </a:pPr>
-            <a:endParaRPr lang="de-DE" dirty="0">
-              <a:solidFill>
-                <a:srgbClr val="4A5C66"/>
-              </a:solidFill>
-              <a:latin typeface="Arial" panose="020B0604020202020204" pitchFamily="34" charset="0"/>
-              <a:cs typeface="Arial" panose="020B0604020202020204" pitchFamily="34" charset="0"/>
-            </a:endParaRPr>
-          </a:p>
-          <a:p>
-            <a:pPr>
-              <a:spcAft>
-                <a:spcPts val="600"/>
-              </a:spcAft>
-            </a:pPr>
-            <a:endParaRPr lang="de-DE" dirty="0">
-              <a:solidFill>
-                <a:srgbClr val="4A5C66"/>
-              </a:solidFill>
-              <a:latin typeface="Arial" panose="020B0604020202020204" pitchFamily="34" charset="0"/>
-              <a:cs typeface="Arial" panose="020B0604020202020204" pitchFamily="34" charset="0"/>
-            </a:endParaRPr>
-          </a:p>
-          <a:p>
-            <a:pPr>
-              <a:spcAft>
-                <a:spcPts val="600"/>
-              </a:spcAft>
-            </a:pPr>
-            <a:endParaRPr lang="de-DE" dirty="0">
-              <a:solidFill>
-                <a:srgbClr val="4A5C66"/>
-              </a:solidFill>
-              <a:latin typeface="Arial" panose="020B0604020202020204" pitchFamily="34" charset="0"/>
-              <a:cs typeface="Arial" panose="020B0604020202020204" pitchFamily="34" charset="0"/>
-            </a:endParaRPr>
+            <a:endParaRPr lang="de-DE" sz="1800" dirty="0"/>
           </a:p>
         </p:txBody>
       </p:sp>
     </p:spTree>
     <p:extLst>
       <p:ext uri="{BB962C8B-B14F-4D97-AF65-F5344CB8AC3E}">
-        <p14:creationId xmlns:p14="http://schemas.microsoft.com/office/powerpoint/2010/main" val="21206333"/>
+        <p14:creationId xmlns:p14="http://schemas.microsoft.com/office/powerpoint/2010/main" val="198717295"/>
       </p:ext>
     </p:extLst>
   </p:cSld>
@@ -23141,6 +23361,676 @@
           <a:p>
             <a:r>
               <a:rPr lang="de-DE" dirty="0"/>
+              <a:t>Realisierung – Mutations-Algorithmus</a:t>
+            </a:r>
+          </a:p>
+        </p:txBody>
+      </p:sp>
+      <p:sp>
+        <p:nvSpPr>
+          <p:cNvPr id="4" name="Rectangle 1">
+            <a:extLst>
+              <a:ext uri="{FF2B5EF4-FFF2-40B4-BE49-F238E27FC236}">
+                <a16:creationId xmlns:a16="http://schemas.microsoft.com/office/drawing/2014/main" id="{902F850E-7E9B-4622-87C4-FE1420D027EA}"/>
+              </a:ext>
+            </a:extLst>
+          </p:cNvPr>
+          <p:cNvSpPr>
+            <a:spLocks noGrp="1" noChangeArrowheads="1"/>
+          </p:cNvSpPr>
+          <p:nvPr>
+            <p:ph type="body" sz="quarter" idx="11"/>
+          </p:nvPr>
+        </p:nvSpPr>
+        <p:spPr bwMode="auto">
+          <a:xfrm>
+            <a:off x="334963" y="1131901"/>
+            <a:ext cx="5630831" cy="3600986"/>
+          </a:xfrm>
+          <a:prstGeom prst="rect">
+            <a:avLst/>
+          </a:prstGeom>
+          <a:solidFill>
+            <a:srgbClr val="FFFFFF"/>
+          </a:solidFill>
+          <a:ln>
+            <a:noFill/>
+          </a:ln>
+          <a:effectLst/>
+          <a:extLst>
+            <a:ext uri="{91240B29-F687-4F45-9708-019B960494DF}">
+              <a14:hiddenLine xmlns:a14="http://schemas.microsoft.com/office/drawing/2010/main" w="9525">
+                <a:solidFill>
+                  <a:schemeClr val="tx1"/>
+                </a:solidFill>
+                <a:miter lim="800000"/>
+                <a:headEnd/>
+                <a:tailEnd/>
+              </a14:hiddenLine>
+            </a:ext>
+            <a:ext uri="{AF507438-7753-43E0-B8FC-AC1667EBCBE1}">
+              <a14:hiddenEffects xmlns:a14="http://schemas.microsoft.com/office/drawing/2010/main">
+                <a:effectLst>
+                  <a:outerShdw dist="35921" dir="2700000" algn="ctr" rotWithShape="0">
+                    <a:schemeClr val="bg2"/>
+                  </a:outerShdw>
+                </a:effectLst>
+              </a14:hiddenEffects>
+            </a:ext>
+          </a:extLst>
+        </p:spPr>
+        <p:txBody>
+          <a:bodyPr vert="horz" wrap="square" lIns="91440" tIns="45720" rIns="91440" bIns="45720" numCol="1" anchor="ctr" anchorCtr="0" compatLnSpc="1">
+            <a:prstTxWarp prst="textNoShape">
+              <a:avLst/>
+            </a:prstTxWarp>
+            <a:spAutoFit/>
+          </a:bodyPr>
+          <a:lstStyle/>
+          <a:p>
+            <a:pPr marR="0" lvl="0" defTabSz="914400" latinLnBrk="0">
+              <a:lnSpc>
+                <a:spcPct val="100000"/>
+              </a:lnSpc>
+              <a:tabLst/>
+            </a:pPr>
+            <a:r>
+              <a:rPr lang="de-DE" altLang="de-DE" sz="1200" dirty="0">
+                <a:solidFill>
+                  <a:schemeClr val="accent6">
+                    <a:lumMod val="75000"/>
+                  </a:schemeClr>
+                </a:solidFill>
+              </a:rPr>
+              <a:t>bool</a:t>
+            </a:r>
+            <a:r>
+              <a:rPr lang="de-DE" altLang="de-DE" sz="1200" dirty="0"/>
+              <a:t> mutation_delete_shift(Individual &amp;individual, int percentage) {</a:t>
+            </a:r>
+          </a:p>
+          <a:p>
+            <a:pPr marR="0" lvl="0" defTabSz="914400" latinLnBrk="0">
+              <a:lnSpc>
+                <a:spcPct val="100000"/>
+              </a:lnSpc>
+              <a:tabLst/>
+            </a:pPr>
+            <a:r>
+              <a:rPr lang="de-DE" altLang="de-DE" sz="1200" dirty="0"/>
+              <a:t>    bool mutate = rand() % 100 &lt; percentage;</a:t>
+            </a:r>
+          </a:p>
+          <a:p>
+            <a:pPr marR="0" lvl="0" defTabSz="914400" latinLnBrk="0">
+              <a:lnSpc>
+                <a:spcPct val="100000"/>
+              </a:lnSpc>
+              <a:tabLst/>
+            </a:pPr>
+            <a:endParaRPr lang="de-DE" altLang="de-DE" sz="1200" dirty="0"/>
+          </a:p>
+          <a:p>
+            <a:pPr marR="0" lvl="0" defTabSz="914400" latinLnBrk="0">
+              <a:lnSpc>
+                <a:spcPct val="100000"/>
+              </a:lnSpc>
+              <a:tabLst/>
+            </a:pPr>
+            <a:r>
+              <a:rPr lang="de-DE" altLang="de-DE" sz="1200" dirty="0"/>
+              <a:t>    </a:t>
+            </a:r>
+            <a:r>
+              <a:rPr lang="de-DE" altLang="de-DE" sz="1200" dirty="0">
+                <a:solidFill>
+                  <a:schemeClr val="accent6">
+                    <a:lumMod val="75000"/>
+                  </a:schemeClr>
+                </a:solidFill>
+              </a:rPr>
+              <a:t>if</a:t>
+            </a:r>
+            <a:r>
+              <a:rPr lang="de-DE" altLang="de-DE" sz="1200" dirty="0"/>
+              <a:t> (mutate) {</a:t>
+            </a:r>
+          </a:p>
+          <a:p>
+            <a:pPr marR="0" lvl="0" defTabSz="914400" latinLnBrk="0">
+              <a:lnSpc>
+                <a:spcPct val="100000"/>
+              </a:lnSpc>
+              <a:tabLst/>
+            </a:pPr>
+            <a:r>
+              <a:rPr lang="de-DE" altLang="de-DE" sz="1200" dirty="0"/>
+              <a:t>        int position_a = rand() % (individual.get_size() - 1);</a:t>
+            </a:r>
+          </a:p>
+          <a:p>
+            <a:pPr marR="0" lvl="0" defTabSz="914400" latinLnBrk="0">
+              <a:lnSpc>
+                <a:spcPct val="100000"/>
+              </a:lnSpc>
+              <a:tabLst/>
+            </a:pPr>
+            <a:r>
+              <a:rPr lang="de-DE" altLang="de-DE" sz="1200" dirty="0"/>
+              <a:t>        int position_b;</a:t>
+            </a:r>
+          </a:p>
+          <a:p>
+            <a:pPr marR="0" lvl="0" defTabSz="914400" latinLnBrk="0">
+              <a:lnSpc>
+                <a:spcPct val="100000"/>
+              </a:lnSpc>
+              <a:tabLst/>
+            </a:pPr>
+            <a:r>
+              <a:rPr lang="de-DE" altLang="de-DE" sz="1200" dirty="0"/>
+              <a:t>        </a:t>
+            </a:r>
+            <a:r>
+              <a:rPr lang="de-DE" altLang="de-DE" sz="1200" dirty="0">
+                <a:solidFill>
+                  <a:schemeClr val="accent6">
+                    <a:lumMod val="75000"/>
+                  </a:schemeClr>
+                </a:solidFill>
+              </a:rPr>
+              <a:t>do</a:t>
+            </a:r>
+            <a:r>
+              <a:rPr lang="de-DE" altLang="de-DE" sz="1200" dirty="0"/>
+              <a:t> {</a:t>
+            </a:r>
+          </a:p>
+          <a:p>
+            <a:pPr marR="0" lvl="0" defTabSz="914400" latinLnBrk="0">
+              <a:lnSpc>
+                <a:spcPct val="100000"/>
+              </a:lnSpc>
+              <a:tabLst/>
+            </a:pPr>
+            <a:r>
+              <a:rPr lang="de-DE" altLang="de-DE" sz="1200" dirty="0"/>
+              <a:t>            position_b = rand() % (individual.get_size() - position_a) + position_a;</a:t>
+            </a:r>
+          </a:p>
+          <a:p>
+            <a:pPr marR="0" lvl="0" defTabSz="914400" latinLnBrk="0">
+              <a:lnSpc>
+                <a:spcPct val="100000"/>
+              </a:lnSpc>
+              <a:tabLst/>
+            </a:pPr>
+            <a:r>
+              <a:rPr lang="de-DE" altLang="de-DE" sz="1200" dirty="0"/>
+              <a:t>        } </a:t>
+            </a:r>
+            <a:r>
+              <a:rPr lang="de-DE" altLang="de-DE" sz="1200" dirty="0">
+                <a:solidFill>
+                  <a:schemeClr val="accent6">
+                    <a:lumMod val="75000"/>
+                  </a:schemeClr>
+                </a:solidFill>
+              </a:rPr>
+              <a:t>while</a:t>
+            </a:r>
+            <a:r>
+              <a:rPr lang="de-DE" altLang="de-DE" sz="1200" dirty="0"/>
+              <a:t> (position_a == position_b);</a:t>
+            </a:r>
+          </a:p>
+          <a:p>
+            <a:pPr marR="0" lvl="0" defTabSz="914400" latinLnBrk="0">
+              <a:lnSpc>
+                <a:spcPct val="100000"/>
+              </a:lnSpc>
+              <a:tabLst/>
+            </a:pPr>
+            <a:r>
+              <a:rPr lang="de-DE" altLang="de-DE" sz="1200" dirty="0"/>
+              <a:t>    </a:t>
+            </a:r>
+          </a:p>
+          <a:p>
+            <a:pPr marR="0" lvl="0" defTabSz="914400" latinLnBrk="0">
+              <a:lnSpc>
+                <a:spcPct val="100000"/>
+              </a:lnSpc>
+              <a:tabLst/>
+            </a:pPr>
+            <a:r>
+              <a:rPr lang="de-DE" altLang="de-DE" sz="1200" dirty="0"/>
+              <a:t>    </a:t>
+            </a:r>
+            <a:r>
+              <a:rPr lang="de-DE" altLang="de-DE" sz="1200" dirty="0">
+                <a:solidFill>
+                  <a:schemeClr val="accent6">
+                    <a:lumMod val="75000"/>
+                  </a:schemeClr>
+                </a:solidFill>
+              </a:rPr>
+              <a:t>for</a:t>
+            </a:r>
+            <a:r>
+              <a:rPr lang="de-DE" altLang="de-DE" sz="1200" dirty="0"/>
+              <a:t> (int i = position_a; i &lt; position_b; i++) {</a:t>
+            </a:r>
+          </a:p>
+          <a:p>
+            <a:pPr marR="0" lvl="0" defTabSz="914400" latinLnBrk="0">
+              <a:lnSpc>
+                <a:spcPct val="100000"/>
+              </a:lnSpc>
+              <a:tabLst/>
+            </a:pPr>
+            <a:r>
+              <a:rPr lang="de-DE" altLang="de-DE" sz="1200" dirty="0"/>
+              <a:t>        swap_chromosome(individual.get_chromosome(), i, i + 1);</a:t>
+            </a:r>
+          </a:p>
+          <a:p>
+            <a:pPr marR="0" lvl="0" defTabSz="914400" latinLnBrk="0">
+              <a:lnSpc>
+                <a:spcPct val="100000"/>
+              </a:lnSpc>
+              <a:tabLst/>
+            </a:pPr>
+            <a:r>
+              <a:rPr lang="de-DE" altLang="de-DE" sz="1200" dirty="0"/>
+              <a:t>    }</a:t>
+            </a:r>
+          </a:p>
+          <a:p>
+            <a:pPr marR="0" lvl="0" defTabSz="914400" latinLnBrk="0">
+              <a:lnSpc>
+                <a:spcPct val="100000"/>
+              </a:lnSpc>
+              <a:tabLst/>
+            </a:pPr>
+            <a:endParaRPr lang="de-DE" altLang="de-DE" sz="1200" dirty="0"/>
+          </a:p>
+          <a:p>
+            <a:pPr marR="0" lvl="0" defTabSz="914400" latinLnBrk="0">
+              <a:lnSpc>
+                <a:spcPct val="100000"/>
+              </a:lnSpc>
+              <a:tabLst/>
+            </a:pPr>
+            <a:r>
+              <a:rPr lang="de-DE" altLang="de-DE" sz="1200" dirty="0"/>
+              <a:t>    return mutate;</a:t>
+            </a:r>
+          </a:p>
+          <a:p>
+            <a:pPr marR="0" lvl="0" defTabSz="914400" latinLnBrk="0">
+              <a:lnSpc>
+                <a:spcPct val="100000"/>
+              </a:lnSpc>
+              <a:tabLst/>
+            </a:pPr>
+            <a:r>
+              <a:rPr lang="de-DE" altLang="de-DE" sz="1200" dirty="0"/>
+              <a:t>}</a:t>
+            </a:r>
+          </a:p>
+        </p:txBody>
+      </p:sp>
+      <p:sp>
+        <p:nvSpPr>
+          <p:cNvPr id="11" name="TextBox 10">
+            <a:extLst>
+              <a:ext uri="{FF2B5EF4-FFF2-40B4-BE49-F238E27FC236}">
+                <a16:creationId xmlns:a16="http://schemas.microsoft.com/office/drawing/2014/main" id="{A9A881C4-7DE0-4C0F-B2EC-F77D820DCF22}"/>
+              </a:ext>
+            </a:extLst>
+          </p:cNvPr>
+          <p:cNvSpPr txBox="1"/>
+          <p:nvPr/>
+        </p:nvSpPr>
+        <p:spPr>
+          <a:xfrm>
+            <a:off x="5965794" y="1292791"/>
+            <a:ext cx="4074850" cy="4108817"/>
+          </a:xfrm>
+          <a:prstGeom prst="rect">
+            <a:avLst/>
+          </a:prstGeom>
+          <a:noFill/>
+        </p:spPr>
+        <p:txBody>
+          <a:bodyPr wrap="square" rtlCol="0">
+            <a:spAutoFit/>
+          </a:bodyPr>
+          <a:lstStyle/>
+          <a:p>
+            <a:pPr>
+              <a:spcAft>
+                <a:spcPts val="600"/>
+              </a:spcAft>
+            </a:pPr>
+            <a:r>
+              <a:rPr lang="de-DE" dirty="0">
+                <a:solidFill>
+                  <a:srgbClr val="4A5C66"/>
+                </a:solidFill>
+                <a:latin typeface="Arial" panose="020B0604020202020204" pitchFamily="34" charset="0"/>
+                <a:cs typeface="Arial" panose="020B0604020202020204" pitchFamily="34" charset="0"/>
+              </a:rPr>
+              <a:t>Chromosom: {1,2,</a:t>
+            </a:r>
+            <a:r>
+              <a:rPr lang="de-DE" b="1" dirty="0">
+                <a:solidFill>
+                  <a:srgbClr val="C00000"/>
+                </a:solidFill>
+                <a:latin typeface="Arial" panose="020B0604020202020204" pitchFamily="34" charset="0"/>
+                <a:cs typeface="Arial" panose="020B0604020202020204" pitchFamily="34" charset="0"/>
+              </a:rPr>
+              <a:t>3</a:t>
+            </a:r>
+            <a:r>
+              <a:rPr lang="de-DE" b="1" dirty="0">
+                <a:solidFill>
+                  <a:srgbClr val="4A5C66"/>
+                </a:solidFill>
+                <a:latin typeface="Arial" panose="020B0604020202020204" pitchFamily="34" charset="0"/>
+                <a:cs typeface="Arial" panose="020B0604020202020204" pitchFamily="34" charset="0"/>
+              </a:rPr>
+              <a:t>,4,5,6,7</a:t>
+            </a:r>
+            <a:r>
+              <a:rPr lang="de-DE" dirty="0">
+                <a:solidFill>
+                  <a:srgbClr val="4A5C66"/>
+                </a:solidFill>
+                <a:latin typeface="Arial" panose="020B0604020202020204" pitchFamily="34" charset="0"/>
+                <a:cs typeface="Arial" panose="020B0604020202020204" pitchFamily="34" charset="0"/>
+              </a:rPr>
+              <a:t>,8,9,10}</a:t>
+            </a:r>
+          </a:p>
+          <a:p>
+            <a:pPr>
+              <a:spcAft>
+                <a:spcPts val="600"/>
+              </a:spcAft>
+            </a:pPr>
+            <a:endParaRPr lang="de-DE" dirty="0">
+              <a:solidFill>
+                <a:srgbClr val="4A5C66"/>
+              </a:solidFill>
+              <a:latin typeface="Arial" panose="020B0604020202020204" pitchFamily="34" charset="0"/>
+              <a:cs typeface="Arial" panose="020B0604020202020204" pitchFamily="34" charset="0"/>
+            </a:endParaRPr>
+          </a:p>
+          <a:p>
+            <a:pPr>
+              <a:spcAft>
+                <a:spcPts val="600"/>
+              </a:spcAft>
+            </a:pPr>
+            <a:endParaRPr lang="de-DE" dirty="0">
+              <a:solidFill>
+                <a:srgbClr val="4A5C66"/>
+              </a:solidFill>
+              <a:latin typeface="Arial" panose="020B0604020202020204" pitchFamily="34" charset="0"/>
+              <a:cs typeface="Arial" panose="020B0604020202020204" pitchFamily="34" charset="0"/>
+            </a:endParaRPr>
+          </a:p>
+          <a:p>
+            <a:pPr>
+              <a:spcAft>
+                <a:spcPts val="600"/>
+              </a:spcAft>
+            </a:pPr>
+            <a:r>
+              <a:rPr lang="de-DE" dirty="0">
+                <a:solidFill>
+                  <a:srgbClr val="4A5C66"/>
+                </a:solidFill>
+                <a:latin typeface="Arial" panose="020B0604020202020204" pitchFamily="34" charset="0"/>
+                <a:cs typeface="Arial" panose="020B0604020202020204" pitchFamily="34" charset="0"/>
+              </a:rPr>
+              <a:t>position_a=3</a:t>
+            </a:r>
+          </a:p>
+          <a:p>
+            <a:pPr>
+              <a:spcAft>
+                <a:spcPts val="600"/>
+              </a:spcAft>
+            </a:pPr>
+            <a:endParaRPr lang="de-DE" dirty="0">
+              <a:solidFill>
+                <a:srgbClr val="4A5C66"/>
+              </a:solidFill>
+              <a:latin typeface="Arial" panose="020B0604020202020204" pitchFamily="34" charset="0"/>
+              <a:cs typeface="Arial" panose="020B0604020202020204" pitchFamily="34" charset="0"/>
+            </a:endParaRPr>
+          </a:p>
+          <a:p>
+            <a:pPr>
+              <a:spcAft>
+                <a:spcPts val="600"/>
+              </a:spcAft>
+            </a:pPr>
+            <a:r>
+              <a:rPr lang="de-DE" dirty="0">
+                <a:solidFill>
+                  <a:srgbClr val="4A5C66"/>
+                </a:solidFill>
+                <a:latin typeface="Arial" panose="020B0604020202020204" pitchFamily="34" charset="0"/>
+                <a:cs typeface="Arial" panose="020B0604020202020204" pitchFamily="34" charset="0"/>
+              </a:rPr>
+              <a:t>position_b=7</a:t>
+            </a:r>
+          </a:p>
+          <a:p>
+            <a:pPr>
+              <a:spcAft>
+                <a:spcPts val="600"/>
+              </a:spcAft>
+            </a:pPr>
+            <a:endParaRPr lang="de-DE" dirty="0">
+              <a:solidFill>
+                <a:srgbClr val="4A5C66"/>
+              </a:solidFill>
+              <a:latin typeface="Arial" panose="020B0604020202020204" pitchFamily="34" charset="0"/>
+              <a:cs typeface="Arial" panose="020B0604020202020204" pitchFamily="34" charset="0"/>
+            </a:endParaRPr>
+          </a:p>
+          <a:p>
+            <a:pPr>
+              <a:spcAft>
+                <a:spcPts val="600"/>
+              </a:spcAft>
+            </a:pPr>
+            <a:endParaRPr lang="de-DE" dirty="0">
+              <a:solidFill>
+                <a:srgbClr val="4A5C66"/>
+              </a:solidFill>
+              <a:latin typeface="Arial" panose="020B0604020202020204" pitchFamily="34" charset="0"/>
+              <a:cs typeface="Arial" panose="020B0604020202020204" pitchFamily="34" charset="0"/>
+            </a:endParaRPr>
+          </a:p>
+          <a:p>
+            <a:pPr>
+              <a:spcAft>
+                <a:spcPts val="600"/>
+              </a:spcAft>
+            </a:pPr>
+            <a:endParaRPr lang="de-DE" dirty="0">
+              <a:solidFill>
+                <a:srgbClr val="4A5C66"/>
+              </a:solidFill>
+              <a:latin typeface="Arial" panose="020B0604020202020204" pitchFamily="34" charset="0"/>
+              <a:cs typeface="Arial" panose="020B0604020202020204" pitchFamily="34" charset="0"/>
+            </a:endParaRPr>
+          </a:p>
+          <a:p>
+            <a:pPr>
+              <a:spcAft>
+                <a:spcPts val="600"/>
+              </a:spcAft>
+            </a:pPr>
+            <a:endParaRPr lang="de-DE" dirty="0">
+              <a:solidFill>
+                <a:srgbClr val="4A5C66"/>
+              </a:solidFill>
+              <a:latin typeface="Arial" panose="020B0604020202020204" pitchFamily="34" charset="0"/>
+              <a:cs typeface="Arial" panose="020B0604020202020204" pitchFamily="34" charset="0"/>
+            </a:endParaRPr>
+          </a:p>
+          <a:p>
+            <a:pPr>
+              <a:spcAft>
+                <a:spcPts val="600"/>
+              </a:spcAft>
+            </a:pPr>
+            <a:r>
+              <a:rPr lang="de-DE" dirty="0">
+                <a:solidFill>
+                  <a:srgbClr val="4A5C66"/>
+                </a:solidFill>
+                <a:latin typeface="Arial" panose="020B0604020202020204" pitchFamily="34" charset="0"/>
+                <a:cs typeface="Arial" panose="020B0604020202020204" pitchFamily="34" charset="0"/>
+              </a:rPr>
+              <a:t>Ergebnis: {1,2,</a:t>
+            </a:r>
+            <a:r>
+              <a:rPr lang="de-DE" b="1" dirty="0">
+                <a:solidFill>
+                  <a:srgbClr val="4A5C66"/>
+                </a:solidFill>
+                <a:latin typeface="Arial" panose="020B0604020202020204" pitchFamily="34" charset="0"/>
+                <a:cs typeface="Arial" panose="020B0604020202020204" pitchFamily="34" charset="0"/>
+              </a:rPr>
+              <a:t>4,5,6,7,</a:t>
+            </a:r>
+            <a:r>
+              <a:rPr lang="de-DE" b="1" dirty="0">
+                <a:solidFill>
+                  <a:srgbClr val="C00000"/>
+                </a:solidFill>
+                <a:latin typeface="Arial" panose="020B0604020202020204" pitchFamily="34" charset="0"/>
+                <a:cs typeface="Arial" panose="020B0604020202020204" pitchFamily="34" charset="0"/>
+              </a:rPr>
+              <a:t>3</a:t>
+            </a:r>
+            <a:r>
+              <a:rPr lang="de-DE" dirty="0">
+                <a:solidFill>
+                  <a:srgbClr val="4A5C66"/>
+                </a:solidFill>
+                <a:latin typeface="Arial" panose="020B0604020202020204" pitchFamily="34" charset="0"/>
+                <a:cs typeface="Arial" panose="020B0604020202020204" pitchFamily="34" charset="0"/>
+              </a:rPr>
+              <a:t>,8,9,10}</a:t>
+            </a:r>
+          </a:p>
+          <a:p>
+            <a:pPr>
+              <a:spcAft>
+                <a:spcPts val="600"/>
+              </a:spcAft>
+            </a:pPr>
+            <a:endParaRPr lang="de-DE" dirty="0">
+              <a:solidFill>
+                <a:srgbClr val="4A5C66"/>
+              </a:solidFill>
+              <a:latin typeface="Arial" panose="020B0604020202020204" pitchFamily="34" charset="0"/>
+              <a:cs typeface="Arial" panose="020B0604020202020204" pitchFamily="34" charset="0"/>
+            </a:endParaRPr>
+          </a:p>
+          <a:p>
+            <a:pPr>
+              <a:spcAft>
+                <a:spcPts val="600"/>
+              </a:spcAft>
+            </a:pPr>
+            <a:endParaRPr lang="de-DE" dirty="0">
+              <a:solidFill>
+                <a:srgbClr val="4A5C66"/>
+              </a:solidFill>
+              <a:latin typeface="Arial" panose="020B0604020202020204" pitchFamily="34" charset="0"/>
+              <a:cs typeface="Arial" panose="020B0604020202020204" pitchFamily="34" charset="0"/>
+            </a:endParaRPr>
+          </a:p>
+          <a:p>
+            <a:pPr>
+              <a:spcAft>
+                <a:spcPts val="600"/>
+              </a:spcAft>
+            </a:pPr>
+            <a:endParaRPr lang="de-DE" dirty="0">
+              <a:solidFill>
+                <a:srgbClr val="4A5C66"/>
+              </a:solidFill>
+              <a:latin typeface="Arial" panose="020B0604020202020204" pitchFamily="34" charset="0"/>
+              <a:cs typeface="Arial" panose="020B0604020202020204" pitchFamily="34" charset="0"/>
+            </a:endParaRPr>
+          </a:p>
+        </p:txBody>
+      </p:sp>
+    </p:spTree>
+    <p:extLst>
+      <p:ext uri="{BB962C8B-B14F-4D97-AF65-F5344CB8AC3E}">
+        <p14:creationId xmlns:p14="http://schemas.microsoft.com/office/powerpoint/2010/main" val="21206333"/>
+      </p:ext>
+    </p:extLst>
+  </p:cSld>
+  <p:clrMapOvr>
+    <a:masterClrMapping/>
+  </p:clrMapOvr>
+</p:sld>
+</file>
+
+<file path=ppt/slides/slide16.xml><?xml version="1.0" encoding="utf-8"?>
+<p:sld xmlns:a="http://schemas.openxmlformats.org/drawingml/2006/main" xmlns:r="http://schemas.openxmlformats.org/officeDocument/2006/relationships" xmlns:p="http://schemas.openxmlformats.org/presentationml/2006/main">
+  <p:cSld>
+    <p:spTree>
+      <p:nvGrpSpPr>
+        <p:cNvPr id="1" name=""/>
+        <p:cNvGrpSpPr/>
+        <p:nvPr/>
+      </p:nvGrpSpPr>
+      <p:grpSpPr>
+        <a:xfrm>
+          <a:off x="0" y="0"/>
+          <a:ext cx="0" cy="0"/>
+          <a:chOff x="0" y="0"/>
+          <a:chExt cx="0" cy="0"/>
+        </a:xfrm>
+      </p:grpSpPr>
+      <p:sp>
+        <p:nvSpPr>
+          <p:cNvPr id="2" name="Title 1">
+            <a:extLst>
+              <a:ext uri="{FF2B5EF4-FFF2-40B4-BE49-F238E27FC236}">
+                <a16:creationId xmlns:a16="http://schemas.microsoft.com/office/drawing/2014/main" id="{85052616-A1AA-4C30-9C7B-DBB34145436D}"/>
+              </a:ext>
+            </a:extLst>
+          </p:cNvPr>
+          <p:cNvSpPr>
+            <a:spLocks noGrp="1"/>
+          </p:cNvSpPr>
+          <p:nvPr>
+            <p:ph type="title"/>
+          </p:nvPr>
+        </p:nvSpPr>
+        <p:spPr/>
+        <p:txBody>
+          <a:bodyPr/>
+          <a:lstStyle/>
+          <a:p>
+            <a:r>
+              <a:rPr lang="de-DE" dirty="0"/>
               <a:t>Realisierung – Selektions-Algorithmus</a:t>
             </a:r>
           </a:p>
@@ -23670,7 +24560,7 @@
 </p:sld>
 </file>
 
-<file path=ppt/slides/slide16.xml><?xml version="1.0" encoding="utf-8"?>
+<file path=ppt/slides/slide17.xml><?xml version="1.0" encoding="utf-8"?>
 <p:sld xmlns:a="http://schemas.openxmlformats.org/drawingml/2006/main" xmlns:r="http://schemas.openxmlformats.org/officeDocument/2006/relationships" xmlns:p="http://schemas.openxmlformats.org/presentationml/2006/main">
   <p:cSld>
     <p:spTree>
@@ -23869,568 +24759,6 @@
     <p:extLst>
       <p:ext uri="{BB962C8B-B14F-4D97-AF65-F5344CB8AC3E}">
         <p14:creationId xmlns:p14="http://schemas.microsoft.com/office/powerpoint/2010/main" val="1459846204"/>
-      </p:ext>
-    </p:extLst>
-  </p:cSld>
-  <p:clrMapOvr>
-    <a:masterClrMapping/>
-  </p:clrMapOvr>
-</p:sld>
-</file>
-
-<file path=ppt/slides/slide17.xml><?xml version="1.0" encoding="utf-8"?>
-<p:sld xmlns:a="http://schemas.openxmlformats.org/drawingml/2006/main" xmlns:r="http://schemas.openxmlformats.org/officeDocument/2006/relationships" xmlns:p="http://schemas.openxmlformats.org/presentationml/2006/main">
-  <p:cSld>
-    <p:spTree>
-      <p:nvGrpSpPr>
-        <p:cNvPr id="1" name=""/>
-        <p:cNvGrpSpPr/>
-        <p:nvPr/>
-      </p:nvGrpSpPr>
-      <p:grpSpPr>
-        <a:xfrm>
-          <a:off x="0" y="0"/>
-          <a:ext cx="0" cy="0"/>
-          <a:chOff x="0" y="0"/>
-          <a:chExt cx="0" cy="0"/>
-        </a:xfrm>
-      </p:grpSpPr>
-      <p:sp>
-        <p:nvSpPr>
-          <p:cNvPr id="2" name="Title 1">
-            <a:extLst>
-              <a:ext uri="{FF2B5EF4-FFF2-40B4-BE49-F238E27FC236}">
-                <a16:creationId xmlns:a16="http://schemas.microsoft.com/office/drawing/2014/main" id="{81EFB697-ABB7-4385-A87F-DE3D50F38BDB}"/>
-              </a:ext>
-            </a:extLst>
-          </p:cNvPr>
-          <p:cNvSpPr>
-            <a:spLocks noGrp="1"/>
-          </p:cNvSpPr>
-          <p:nvPr>
-            <p:ph type="title"/>
-          </p:nvPr>
-        </p:nvSpPr>
-        <p:spPr/>
-        <p:txBody>
-          <a:bodyPr/>
-          <a:lstStyle/>
-          <a:p>
-            <a:r>
-              <a:rPr lang="de-DE" dirty="0"/>
-              <a:t>Realisierung – Python-Schnittstelle</a:t>
-            </a:r>
-          </a:p>
-        </p:txBody>
-      </p:sp>
-      <p:sp>
-        <p:nvSpPr>
-          <p:cNvPr id="3" name="Text Placeholder 2">
-            <a:extLst>
-              <a:ext uri="{FF2B5EF4-FFF2-40B4-BE49-F238E27FC236}">
-                <a16:creationId xmlns:a16="http://schemas.microsoft.com/office/drawing/2014/main" id="{778E93AF-5E49-4550-AA2C-7CEF1E9BA9D3}"/>
-              </a:ext>
-            </a:extLst>
-          </p:cNvPr>
-          <p:cNvSpPr>
-            <a:spLocks noGrp="1"/>
-          </p:cNvSpPr>
-          <p:nvPr>
-            <p:ph type="body" sz="quarter" idx="11"/>
-          </p:nvPr>
-        </p:nvSpPr>
-        <p:spPr>
-          <a:xfrm>
-            <a:off x="334963" y="1280160"/>
-            <a:ext cx="11487150" cy="1835902"/>
-          </a:xfrm>
-        </p:spPr>
-        <p:txBody>
-          <a:bodyPr/>
-          <a:lstStyle/>
-          <a:p>
-            <a:pPr marL="285750" indent="-285750">
-              <a:buFont typeface="Arial" panose="020B0604020202020204" pitchFamily="34" charset="0"/>
-              <a:buChar char="•"/>
-            </a:pPr>
-            <a:r>
-              <a:rPr lang="de-DE" dirty="0"/>
-              <a:t>Boost Python Bibliothek</a:t>
-            </a:r>
-          </a:p>
-          <a:p>
-            <a:pPr marL="285750" indent="-285750">
-              <a:buFont typeface="Arial" panose="020B0604020202020204" pitchFamily="34" charset="0"/>
-              <a:buChar char="•"/>
-            </a:pPr>
-            <a:r>
-              <a:rPr lang="de-DE" dirty="0"/>
-              <a:t>Erstellung von Schnittstellen zwischen C++ und Python</a:t>
-            </a:r>
-          </a:p>
-          <a:p>
-            <a:pPr marL="285750" indent="-285750">
-              <a:buFont typeface="Arial" panose="020B0604020202020204" pitchFamily="34" charset="0"/>
-              <a:buChar char="•"/>
-            </a:pPr>
-            <a:r>
-              <a:rPr lang="de-DE" dirty="0"/>
-              <a:t>Schnell und unkompliziert</a:t>
-            </a:r>
-          </a:p>
-        </p:txBody>
-      </p:sp>
-      <p:sp>
-        <p:nvSpPr>
-          <p:cNvPr id="7" name="Text Placeholder 2">
-            <a:extLst>
-              <a:ext uri="{FF2B5EF4-FFF2-40B4-BE49-F238E27FC236}">
-                <a16:creationId xmlns:a16="http://schemas.microsoft.com/office/drawing/2014/main" id="{E5D452C1-DD4D-4E05-90BB-0F8EBB7CDC84}"/>
-              </a:ext>
-            </a:extLst>
-          </p:cNvPr>
-          <p:cNvSpPr txBox="1">
-            <a:spLocks/>
-          </p:cNvSpPr>
-          <p:nvPr/>
-        </p:nvSpPr>
-        <p:spPr bwMode="auto">
-          <a:xfrm>
-            <a:off x="369887" y="2511048"/>
-            <a:ext cx="6723371" cy="3721075"/>
-          </a:xfrm>
-          <a:prstGeom prst="rect">
-            <a:avLst/>
-          </a:prstGeom>
-          <a:noFill/>
-          <a:ln>
-            <a:noFill/>
-          </a:ln>
-          <a:extLst>
-            <a:ext uri="{909E8E84-426E-40DD-AFC4-6F175D3DCCD1}">
-              <a14:hiddenFill xmlns:a14="http://schemas.microsoft.com/office/drawing/2010/main">
-                <a:solidFill>
-                  <a:srgbClr val="FFFFFF"/>
-                </a:solidFill>
-              </a14:hiddenFill>
-            </a:ext>
-            <a:ext uri="{91240B29-F687-4F45-9708-019B960494DF}">
-              <a14:hiddenLine xmlns:a14="http://schemas.microsoft.com/office/drawing/2010/main" w="9525">
-                <a:solidFill>
-                  <a:srgbClr val="000000"/>
-                </a:solidFill>
-                <a:miter lim="800000"/>
-                <a:headEnd/>
-                <a:tailEnd/>
-              </a14:hiddenLine>
-            </a:ext>
-          </a:extLst>
-        </p:spPr>
-        <p:txBody>
-          <a:bodyPr vert="horz" wrap="square" lIns="91440" tIns="45720" rIns="91440" bIns="45720" numCol="1" anchor="t" anchorCtr="0" compatLnSpc="1">
-            <a:prstTxWarp prst="textNoShape">
-              <a:avLst/>
-            </a:prstTxWarp>
-          </a:bodyPr>
-          <a:lstStyle>
-            <a:lvl1pPr marL="0" indent="0" algn="l" rtl="0" eaLnBrk="0" fontAlgn="base" hangingPunct="0">
-              <a:spcBef>
-                <a:spcPct val="20000"/>
-              </a:spcBef>
-              <a:spcAft>
-                <a:spcPct val="0"/>
-              </a:spcAft>
-              <a:buClr>
-                <a:srgbClr val="80BA24"/>
-              </a:buClr>
-              <a:buSzPct val="106000"/>
-              <a:buFontTx/>
-              <a:buNone/>
-              <a:defRPr kern="1200" baseline="0">
-                <a:solidFill>
-                  <a:srgbClr val="4A5C66"/>
-                </a:solidFill>
-                <a:latin typeface="Arial" pitchFamily="34" charset="0"/>
-                <a:ea typeface="MS PGothic" panose="020B0600070205080204" pitchFamily="34" charset="-128"/>
-                <a:cs typeface="Arial" pitchFamily="34" charset="0"/>
-              </a:defRPr>
-            </a:lvl1pPr>
-            <a:lvl2pPr marL="266700" indent="0" algn="l" rtl="0" eaLnBrk="0" fontAlgn="base" hangingPunct="0">
-              <a:spcBef>
-                <a:spcPct val="20000"/>
-              </a:spcBef>
-              <a:spcAft>
-                <a:spcPct val="0"/>
-              </a:spcAft>
-              <a:buClr>
-                <a:srgbClr val="80BA24"/>
-              </a:buClr>
-              <a:buSzPct val="90000"/>
-              <a:buFontTx/>
-              <a:buNone/>
-              <a:defRPr kern="1200">
-                <a:solidFill>
-                  <a:srgbClr val="4A5C66"/>
-                </a:solidFill>
-                <a:latin typeface="Arial" pitchFamily="34" charset="0"/>
-                <a:ea typeface="Arial" charset="0"/>
-                <a:cs typeface="Arial" pitchFamily="34" charset="0"/>
-              </a:defRPr>
-            </a:lvl2pPr>
-            <a:lvl3pPr marL="542925" indent="0" algn="l" rtl="0" eaLnBrk="0" fontAlgn="base" hangingPunct="0">
-              <a:spcBef>
-                <a:spcPct val="20000"/>
-              </a:spcBef>
-              <a:spcAft>
-                <a:spcPct val="0"/>
-              </a:spcAft>
-              <a:buClr>
-                <a:srgbClr val="80BA24"/>
-              </a:buClr>
-              <a:buSzPct val="80000"/>
-              <a:buFontTx/>
-              <a:buNone/>
-              <a:defRPr kern="1200">
-                <a:solidFill>
-                  <a:srgbClr val="4A5C66"/>
-                </a:solidFill>
-                <a:latin typeface="Arial" pitchFamily="34" charset="0"/>
-                <a:ea typeface="Arial" charset="0"/>
-                <a:cs typeface="Arial" pitchFamily="34" charset="0"/>
-              </a:defRPr>
-            </a:lvl3pPr>
-            <a:lvl4pPr marL="809625" indent="0" algn="l" rtl="0" eaLnBrk="0" fontAlgn="base" hangingPunct="0">
-              <a:spcBef>
-                <a:spcPct val="20000"/>
-              </a:spcBef>
-              <a:spcAft>
-                <a:spcPct val="0"/>
-              </a:spcAft>
-              <a:buClr>
-                <a:srgbClr val="80BA24"/>
-              </a:buClr>
-              <a:buSzPct val="80000"/>
-              <a:buFontTx/>
-              <a:buNone/>
-              <a:defRPr kern="1200">
-                <a:solidFill>
-                  <a:srgbClr val="4A5C66"/>
-                </a:solidFill>
-                <a:latin typeface="Arial" pitchFamily="34" charset="0"/>
-                <a:ea typeface="Arial" charset="0"/>
-                <a:cs typeface="Arial" pitchFamily="34" charset="0"/>
-              </a:defRPr>
-            </a:lvl4pPr>
-            <a:lvl5pPr marL="1076325" indent="0" algn="l" rtl="0" eaLnBrk="0" fontAlgn="base" hangingPunct="0">
-              <a:spcBef>
-                <a:spcPct val="20000"/>
-              </a:spcBef>
-              <a:spcAft>
-                <a:spcPct val="0"/>
-              </a:spcAft>
-              <a:buClr>
-                <a:srgbClr val="80BA24"/>
-              </a:buClr>
-              <a:buSzPct val="80000"/>
-              <a:buFontTx/>
-              <a:buNone/>
-              <a:defRPr kern="1200">
-                <a:solidFill>
-                  <a:srgbClr val="4A5C66"/>
-                </a:solidFill>
-                <a:latin typeface="Arial" pitchFamily="34" charset="0"/>
-                <a:ea typeface="Arial" charset="0"/>
-                <a:cs typeface="Arial" pitchFamily="34" charset="0"/>
-              </a:defRPr>
-            </a:lvl5pPr>
-            <a:lvl6pPr marL="2514600" indent="-228600" algn="l" defTabSz="914400" rtl="0" eaLnBrk="1" latinLnBrk="0" hangingPunct="1">
-              <a:spcBef>
-                <a:spcPct val="20000"/>
-              </a:spcBef>
-              <a:buFont typeface="Arial" pitchFamily="34" charset="0"/>
-              <a:buChar char="•"/>
-              <a:defRPr sz="2000" kern="1200">
-                <a:solidFill>
-                  <a:schemeClr val="tx1"/>
-                </a:solidFill>
-                <a:latin typeface="+mn-lt"/>
-                <a:ea typeface="+mn-ea"/>
-                <a:cs typeface="+mn-cs"/>
-              </a:defRPr>
-            </a:lvl6pPr>
-            <a:lvl7pPr marL="2971800" indent="-228600" algn="l" defTabSz="914400" rtl="0" eaLnBrk="1" latinLnBrk="0" hangingPunct="1">
-              <a:spcBef>
-                <a:spcPct val="20000"/>
-              </a:spcBef>
-              <a:buFont typeface="Arial" pitchFamily="34" charset="0"/>
-              <a:buChar char="•"/>
-              <a:defRPr sz="2000" kern="1200">
-                <a:solidFill>
-                  <a:schemeClr val="tx1"/>
-                </a:solidFill>
-                <a:latin typeface="+mn-lt"/>
-                <a:ea typeface="+mn-ea"/>
-                <a:cs typeface="+mn-cs"/>
-              </a:defRPr>
-            </a:lvl7pPr>
-            <a:lvl8pPr marL="3429000" indent="-228600" algn="l" defTabSz="914400" rtl="0" eaLnBrk="1" latinLnBrk="0" hangingPunct="1">
-              <a:spcBef>
-                <a:spcPct val="20000"/>
-              </a:spcBef>
-              <a:buFont typeface="Arial" pitchFamily="34" charset="0"/>
-              <a:buChar char="•"/>
-              <a:defRPr sz="2000" kern="1200">
-                <a:solidFill>
-                  <a:schemeClr val="tx1"/>
-                </a:solidFill>
-                <a:latin typeface="+mn-lt"/>
-                <a:ea typeface="+mn-ea"/>
-                <a:cs typeface="+mn-cs"/>
-              </a:defRPr>
-            </a:lvl8pPr>
-            <a:lvl9pPr marL="3886200" indent="-228600" algn="l" defTabSz="914400" rtl="0" eaLnBrk="1" latinLnBrk="0" hangingPunct="1">
-              <a:spcBef>
-                <a:spcPct val="20000"/>
-              </a:spcBef>
-              <a:buFont typeface="Arial" pitchFamily="34" charset="0"/>
-              <a:buChar char="•"/>
-              <a:defRPr sz="2000" kern="1200">
-                <a:solidFill>
-                  <a:schemeClr val="tx1"/>
-                </a:solidFill>
-                <a:latin typeface="+mn-lt"/>
-                <a:ea typeface="+mn-ea"/>
-                <a:cs typeface="+mn-cs"/>
-              </a:defRPr>
-            </a:lvl9pPr>
-          </a:lstStyle>
-          <a:p>
-            <a:r>
-              <a:rPr lang="en-US" sz="1200" dirty="0">
-                <a:solidFill>
-                  <a:schemeClr val="accent6">
-                    <a:lumMod val="75000"/>
-                  </a:schemeClr>
-                </a:solidFill>
-              </a:rPr>
-              <a:t>BOOST_PYTHON_MODULE</a:t>
-            </a:r>
-            <a:r>
-              <a:rPr lang="en-US" sz="1200" dirty="0"/>
-              <a:t>(</a:t>
-            </a:r>
-            <a:r>
-              <a:rPr lang="en-US" sz="1200" dirty="0" err="1"/>
-              <a:t>Simulator_Wrapper</a:t>
-            </a:r>
-            <a:r>
-              <a:rPr lang="en-US" sz="1200" dirty="0"/>
-              <a:t>)</a:t>
-            </a:r>
-          </a:p>
-          <a:p>
-            <a:r>
-              <a:rPr lang="en-US" sz="1200" dirty="0"/>
-              <a:t>{</a:t>
-            </a:r>
-          </a:p>
-          <a:p>
-            <a:r>
-              <a:rPr lang="de-DE" sz="1200" dirty="0"/>
-              <a:t>    </a:t>
-            </a:r>
-            <a:r>
-              <a:rPr lang="de-DE" sz="1200" dirty="0">
-                <a:solidFill>
-                  <a:schemeClr val="accent6">
-                    <a:lumMod val="75000"/>
-                  </a:schemeClr>
-                </a:solidFill>
-              </a:rPr>
-              <a:t>to_python_converter</a:t>
-            </a:r>
-            <a:r>
-              <a:rPr lang="de-DE" sz="1200" dirty="0"/>
-              <a:t>&lt;std::tuple&lt;int, int, int&gt;, TupleToList&lt;int&gt; &gt;();</a:t>
-            </a:r>
-          </a:p>
-          <a:p>
-            <a:endParaRPr lang="de-DE" sz="1200" dirty="0"/>
-          </a:p>
-          <a:p>
-            <a:r>
-              <a:rPr lang="de-DE" sz="1200" dirty="0"/>
-              <a:t>    </a:t>
-            </a:r>
-            <a:r>
-              <a:rPr lang="de-DE" sz="1200" dirty="0">
-                <a:solidFill>
-                  <a:schemeClr val="accent6">
-                    <a:lumMod val="75000"/>
-                  </a:schemeClr>
-                </a:solidFill>
-              </a:rPr>
-              <a:t>enum_</a:t>
-            </a:r>
-            <a:r>
-              <a:rPr lang="de-DE" sz="1200" dirty="0"/>
-              <a:t>&lt;Selection_Algorithm&gt;("Selection_Algorithm")</a:t>
-            </a:r>
-          </a:p>
-          <a:p>
-            <a:r>
-              <a:rPr lang="de-DE" sz="1200" dirty="0"/>
-              <a:t>            .</a:t>
-            </a:r>
-            <a:r>
-              <a:rPr lang="de-DE" sz="1200" dirty="0">
-                <a:solidFill>
-                  <a:schemeClr val="accent6">
-                    <a:lumMod val="75000"/>
-                  </a:schemeClr>
-                </a:solidFill>
-              </a:rPr>
-              <a:t>value</a:t>
-            </a:r>
-            <a:r>
-              <a:rPr lang="de-DE" sz="1200" dirty="0"/>
-              <a:t>("SOFT", Selection_Algorithm::SOFT);</a:t>
-            </a:r>
-          </a:p>
-          <a:p>
-            <a:endParaRPr lang="de-DE" sz="1200" dirty="0"/>
-          </a:p>
-          <a:p>
-            <a:r>
-              <a:rPr lang="de-DE" sz="1200" dirty="0"/>
-              <a:t>    </a:t>
-            </a:r>
-            <a:r>
-              <a:rPr lang="de-DE" sz="1200" dirty="0">
-                <a:solidFill>
-                  <a:schemeClr val="accent6">
-                    <a:lumMod val="75000"/>
-                  </a:schemeClr>
-                </a:solidFill>
-              </a:rPr>
-              <a:t>class_</a:t>
-            </a:r>
-            <a:r>
-              <a:rPr lang="de-DE" sz="1200" dirty="0"/>
-              <a:t>&lt;Simulator&gt;("Simulator", </a:t>
-            </a:r>
-            <a:r>
-              <a:rPr lang="de-DE" sz="1200" dirty="0">
-                <a:solidFill>
-                  <a:schemeClr val="accent6">
-                    <a:lumMod val="75000"/>
-                  </a:schemeClr>
-                </a:solidFill>
-              </a:rPr>
-              <a:t>init</a:t>
-            </a:r>
-            <a:r>
-              <a:rPr lang="de-DE" sz="1200" dirty="0"/>
-              <a:t>&lt;</a:t>
-            </a:r>
-          </a:p>
-          <a:p>
-            <a:r>
-              <a:rPr lang="de-DE" sz="1200" dirty="0"/>
-              <a:t>            std::string, std::string, std::string,</a:t>
-            </a:r>
-          </a:p>
-          <a:p>
-            <a:r>
-              <a:rPr lang="de-DE" sz="1200" dirty="0"/>
-              <a:t>            int,int,int,int,</a:t>
-            </a:r>
-          </a:p>
-          <a:p>
-            <a:r>
-              <a:rPr lang="de-DE" sz="1200" dirty="0"/>
-              <a:t>            Crossover_Algorithm, Marriage_Algorithm, Mutation_Algorithm, Selection_Algorithm&gt;(</a:t>
-            </a:r>
-          </a:p>
-          <a:p>
-            <a:r>
-              <a:rPr lang="de-DE" sz="1200" dirty="0"/>
-              <a:t>            ))</a:t>
-            </a:r>
-          </a:p>
-          <a:p>
-            <a:r>
-              <a:rPr lang="de-DE" sz="1200" dirty="0"/>
-              <a:t>            .</a:t>
-            </a:r>
-            <a:r>
-              <a:rPr lang="de-DE" sz="1200" dirty="0">
-                <a:solidFill>
-                  <a:schemeClr val="accent6">
-                    <a:lumMod val="75000"/>
-                  </a:schemeClr>
-                </a:solidFill>
-              </a:rPr>
-              <a:t>def</a:t>
-            </a:r>
-            <a:r>
-              <a:rPr lang="de-DE" sz="1200" dirty="0"/>
-              <a:t>("simulate", &amp;Simulator::simulate)</a:t>
-            </a:r>
-          </a:p>
-          <a:p>
-            <a:r>
-              <a:rPr lang="de-DE" sz="1200" dirty="0"/>
-              <a:t>            .</a:t>
-            </a:r>
-            <a:r>
-              <a:rPr lang="de-DE" sz="1200" dirty="0">
-                <a:solidFill>
-                  <a:schemeClr val="accent6">
-                    <a:lumMod val="75000"/>
-                  </a:schemeClr>
-                </a:solidFill>
-              </a:rPr>
-              <a:t>def</a:t>
-            </a:r>
-            <a:r>
-              <a:rPr lang="de-DE" sz="1200" dirty="0"/>
-              <a:t>("finished", &amp;Simulator::finished)</a:t>
-            </a:r>
-          </a:p>
-          <a:p>
-            <a:r>
-              <a:rPr lang="de-DE" sz="1200" dirty="0"/>
-              <a:t>            .</a:t>
-            </a:r>
-            <a:r>
-              <a:rPr lang="de-DE" sz="1200" dirty="0">
-                <a:solidFill>
-                  <a:schemeClr val="accent6">
-                    <a:lumMod val="75000"/>
-                  </a:schemeClr>
-                </a:solidFill>
-              </a:rPr>
-              <a:t>def</a:t>
-            </a:r>
-            <a:r>
-              <a:rPr lang="de-DE" sz="1200" dirty="0"/>
-              <a:t>("best_individual", &amp;Simulator::best_individual);</a:t>
-            </a:r>
-          </a:p>
-          <a:p>
-            <a:r>
-              <a:rPr lang="de-DE" sz="1200" dirty="0"/>
-              <a:t>}</a:t>
-            </a:r>
-            <a:endParaRPr lang="de-DE" sz="1800" dirty="0"/>
-          </a:p>
-        </p:txBody>
-      </p:sp>
-    </p:spTree>
-    <p:extLst>
-      <p:ext uri="{BB962C8B-B14F-4D97-AF65-F5344CB8AC3E}">
-        <p14:creationId xmlns:p14="http://schemas.microsoft.com/office/powerpoint/2010/main" val="580990576"/>
       </p:ext>
     </p:extLst>
   </p:cSld>
@@ -24480,6 +24808,568 @@
           <a:p>
             <a:r>
               <a:rPr lang="de-DE" dirty="0"/>
+              <a:t>Realisierung – Python-Schnittstelle</a:t>
+            </a:r>
+          </a:p>
+        </p:txBody>
+      </p:sp>
+      <p:sp>
+        <p:nvSpPr>
+          <p:cNvPr id="3" name="Text Placeholder 2">
+            <a:extLst>
+              <a:ext uri="{FF2B5EF4-FFF2-40B4-BE49-F238E27FC236}">
+                <a16:creationId xmlns:a16="http://schemas.microsoft.com/office/drawing/2014/main" id="{778E93AF-5E49-4550-AA2C-7CEF1E9BA9D3}"/>
+              </a:ext>
+            </a:extLst>
+          </p:cNvPr>
+          <p:cNvSpPr>
+            <a:spLocks noGrp="1"/>
+          </p:cNvSpPr>
+          <p:nvPr>
+            <p:ph type="body" sz="quarter" idx="11"/>
+          </p:nvPr>
+        </p:nvSpPr>
+        <p:spPr>
+          <a:xfrm>
+            <a:off x="334963" y="1280160"/>
+            <a:ext cx="11487150" cy="1835902"/>
+          </a:xfrm>
+        </p:spPr>
+        <p:txBody>
+          <a:bodyPr/>
+          <a:lstStyle/>
+          <a:p>
+            <a:pPr marL="285750" indent="-285750">
+              <a:buFont typeface="Arial" panose="020B0604020202020204" pitchFamily="34" charset="0"/>
+              <a:buChar char="•"/>
+            </a:pPr>
+            <a:r>
+              <a:rPr lang="de-DE" dirty="0"/>
+              <a:t>Boost Python Bibliothek</a:t>
+            </a:r>
+          </a:p>
+          <a:p>
+            <a:pPr marL="285750" indent="-285750">
+              <a:buFont typeface="Arial" panose="020B0604020202020204" pitchFamily="34" charset="0"/>
+              <a:buChar char="•"/>
+            </a:pPr>
+            <a:r>
+              <a:rPr lang="de-DE" dirty="0"/>
+              <a:t>Erstellung von Schnittstellen zwischen C++ und Python</a:t>
+            </a:r>
+          </a:p>
+          <a:p>
+            <a:pPr marL="285750" indent="-285750">
+              <a:buFont typeface="Arial" panose="020B0604020202020204" pitchFamily="34" charset="0"/>
+              <a:buChar char="•"/>
+            </a:pPr>
+            <a:r>
+              <a:rPr lang="de-DE" dirty="0"/>
+              <a:t>Schnell und unkompliziert</a:t>
+            </a:r>
+          </a:p>
+        </p:txBody>
+      </p:sp>
+      <p:sp>
+        <p:nvSpPr>
+          <p:cNvPr id="7" name="Text Placeholder 2">
+            <a:extLst>
+              <a:ext uri="{FF2B5EF4-FFF2-40B4-BE49-F238E27FC236}">
+                <a16:creationId xmlns:a16="http://schemas.microsoft.com/office/drawing/2014/main" id="{E5D452C1-DD4D-4E05-90BB-0F8EBB7CDC84}"/>
+              </a:ext>
+            </a:extLst>
+          </p:cNvPr>
+          <p:cNvSpPr txBox="1">
+            <a:spLocks/>
+          </p:cNvSpPr>
+          <p:nvPr/>
+        </p:nvSpPr>
+        <p:spPr bwMode="auto">
+          <a:xfrm>
+            <a:off x="369887" y="2511048"/>
+            <a:ext cx="6723371" cy="3721075"/>
+          </a:xfrm>
+          <a:prstGeom prst="rect">
+            <a:avLst/>
+          </a:prstGeom>
+          <a:noFill/>
+          <a:ln>
+            <a:noFill/>
+          </a:ln>
+          <a:extLst>
+            <a:ext uri="{909E8E84-426E-40DD-AFC4-6F175D3DCCD1}">
+              <a14:hiddenFill xmlns:a14="http://schemas.microsoft.com/office/drawing/2010/main">
+                <a:solidFill>
+                  <a:srgbClr val="FFFFFF"/>
+                </a:solidFill>
+              </a14:hiddenFill>
+            </a:ext>
+            <a:ext uri="{91240B29-F687-4F45-9708-019B960494DF}">
+              <a14:hiddenLine xmlns:a14="http://schemas.microsoft.com/office/drawing/2010/main" w="9525">
+                <a:solidFill>
+                  <a:srgbClr val="000000"/>
+                </a:solidFill>
+                <a:miter lim="800000"/>
+                <a:headEnd/>
+                <a:tailEnd/>
+              </a14:hiddenLine>
+            </a:ext>
+          </a:extLst>
+        </p:spPr>
+        <p:txBody>
+          <a:bodyPr vert="horz" wrap="square" lIns="91440" tIns="45720" rIns="91440" bIns="45720" numCol="1" anchor="t" anchorCtr="0" compatLnSpc="1">
+            <a:prstTxWarp prst="textNoShape">
+              <a:avLst/>
+            </a:prstTxWarp>
+          </a:bodyPr>
+          <a:lstStyle>
+            <a:lvl1pPr marL="0" indent="0" algn="l" rtl="0" eaLnBrk="0" fontAlgn="base" hangingPunct="0">
+              <a:spcBef>
+                <a:spcPct val="20000"/>
+              </a:spcBef>
+              <a:spcAft>
+                <a:spcPct val="0"/>
+              </a:spcAft>
+              <a:buClr>
+                <a:srgbClr val="80BA24"/>
+              </a:buClr>
+              <a:buSzPct val="106000"/>
+              <a:buFontTx/>
+              <a:buNone/>
+              <a:defRPr kern="1200" baseline="0">
+                <a:solidFill>
+                  <a:srgbClr val="4A5C66"/>
+                </a:solidFill>
+                <a:latin typeface="Arial" pitchFamily="34" charset="0"/>
+                <a:ea typeface="MS PGothic" panose="020B0600070205080204" pitchFamily="34" charset="-128"/>
+                <a:cs typeface="Arial" pitchFamily="34" charset="0"/>
+              </a:defRPr>
+            </a:lvl1pPr>
+            <a:lvl2pPr marL="266700" indent="0" algn="l" rtl="0" eaLnBrk="0" fontAlgn="base" hangingPunct="0">
+              <a:spcBef>
+                <a:spcPct val="20000"/>
+              </a:spcBef>
+              <a:spcAft>
+                <a:spcPct val="0"/>
+              </a:spcAft>
+              <a:buClr>
+                <a:srgbClr val="80BA24"/>
+              </a:buClr>
+              <a:buSzPct val="90000"/>
+              <a:buFontTx/>
+              <a:buNone/>
+              <a:defRPr kern="1200">
+                <a:solidFill>
+                  <a:srgbClr val="4A5C66"/>
+                </a:solidFill>
+                <a:latin typeface="Arial" pitchFamily="34" charset="0"/>
+                <a:ea typeface="Arial" charset="0"/>
+                <a:cs typeface="Arial" pitchFamily="34" charset="0"/>
+              </a:defRPr>
+            </a:lvl2pPr>
+            <a:lvl3pPr marL="542925" indent="0" algn="l" rtl="0" eaLnBrk="0" fontAlgn="base" hangingPunct="0">
+              <a:spcBef>
+                <a:spcPct val="20000"/>
+              </a:spcBef>
+              <a:spcAft>
+                <a:spcPct val="0"/>
+              </a:spcAft>
+              <a:buClr>
+                <a:srgbClr val="80BA24"/>
+              </a:buClr>
+              <a:buSzPct val="80000"/>
+              <a:buFontTx/>
+              <a:buNone/>
+              <a:defRPr kern="1200">
+                <a:solidFill>
+                  <a:srgbClr val="4A5C66"/>
+                </a:solidFill>
+                <a:latin typeface="Arial" pitchFamily="34" charset="0"/>
+                <a:ea typeface="Arial" charset="0"/>
+                <a:cs typeface="Arial" pitchFamily="34" charset="0"/>
+              </a:defRPr>
+            </a:lvl3pPr>
+            <a:lvl4pPr marL="809625" indent="0" algn="l" rtl="0" eaLnBrk="0" fontAlgn="base" hangingPunct="0">
+              <a:spcBef>
+                <a:spcPct val="20000"/>
+              </a:spcBef>
+              <a:spcAft>
+                <a:spcPct val="0"/>
+              </a:spcAft>
+              <a:buClr>
+                <a:srgbClr val="80BA24"/>
+              </a:buClr>
+              <a:buSzPct val="80000"/>
+              <a:buFontTx/>
+              <a:buNone/>
+              <a:defRPr kern="1200">
+                <a:solidFill>
+                  <a:srgbClr val="4A5C66"/>
+                </a:solidFill>
+                <a:latin typeface="Arial" pitchFamily="34" charset="0"/>
+                <a:ea typeface="Arial" charset="0"/>
+                <a:cs typeface="Arial" pitchFamily="34" charset="0"/>
+              </a:defRPr>
+            </a:lvl4pPr>
+            <a:lvl5pPr marL="1076325" indent="0" algn="l" rtl="0" eaLnBrk="0" fontAlgn="base" hangingPunct="0">
+              <a:spcBef>
+                <a:spcPct val="20000"/>
+              </a:spcBef>
+              <a:spcAft>
+                <a:spcPct val="0"/>
+              </a:spcAft>
+              <a:buClr>
+                <a:srgbClr val="80BA24"/>
+              </a:buClr>
+              <a:buSzPct val="80000"/>
+              <a:buFontTx/>
+              <a:buNone/>
+              <a:defRPr kern="1200">
+                <a:solidFill>
+                  <a:srgbClr val="4A5C66"/>
+                </a:solidFill>
+                <a:latin typeface="Arial" pitchFamily="34" charset="0"/>
+                <a:ea typeface="Arial" charset="0"/>
+                <a:cs typeface="Arial" pitchFamily="34" charset="0"/>
+              </a:defRPr>
+            </a:lvl5pPr>
+            <a:lvl6pPr marL="2514600" indent="-228600" algn="l" defTabSz="914400" rtl="0" eaLnBrk="1" latinLnBrk="0" hangingPunct="1">
+              <a:spcBef>
+                <a:spcPct val="20000"/>
+              </a:spcBef>
+              <a:buFont typeface="Arial" pitchFamily="34" charset="0"/>
+              <a:buChar char="•"/>
+              <a:defRPr sz="2000" kern="1200">
+                <a:solidFill>
+                  <a:schemeClr val="tx1"/>
+                </a:solidFill>
+                <a:latin typeface="+mn-lt"/>
+                <a:ea typeface="+mn-ea"/>
+                <a:cs typeface="+mn-cs"/>
+              </a:defRPr>
+            </a:lvl6pPr>
+            <a:lvl7pPr marL="2971800" indent="-228600" algn="l" defTabSz="914400" rtl="0" eaLnBrk="1" latinLnBrk="0" hangingPunct="1">
+              <a:spcBef>
+                <a:spcPct val="20000"/>
+              </a:spcBef>
+              <a:buFont typeface="Arial" pitchFamily="34" charset="0"/>
+              <a:buChar char="•"/>
+              <a:defRPr sz="2000" kern="1200">
+                <a:solidFill>
+                  <a:schemeClr val="tx1"/>
+                </a:solidFill>
+                <a:latin typeface="+mn-lt"/>
+                <a:ea typeface="+mn-ea"/>
+                <a:cs typeface="+mn-cs"/>
+              </a:defRPr>
+            </a:lvl7pPr>
+            <a:lvl8pPr marL="3429000" indent="-228600" algn="l" defTabSz="914400" rtl="0" eaLnBrk="1" latinLnBrk="0" hangingPunct="1">
+              <a:spcBef>
+                <a:spcPct val="20000"/>
+              </a:spcBef>
+              <a:buFont typeface="Arial" pitchFamily="34" charset="0"/>
+              <a:buChar char="•"/>
+              <a:defRPr sz="2000" kern="1200">
+                <a:solidFill>
+                  <a:schemeClr val="tx1"/>
+                </a:solidFill>
+                <a:latin typeface="+mn-lt"/>
+                <a:ea typeface="+mn-ea"/>
+                <a:cs typeface="+mn-cs"/>
+              </a:defRPr>
+            </a:lvl8pPr>
+            <a:lvl9pPr marL="3886200" indent="-228600" algn="l" defTabSz="914400" rtl="0" eaLnBrk="1" latinLnBrk="0" hangingPunct="1">
+              <a:spcBef>
+                <a:spcPct val="20000"/>
+              </a:spcBef>
+              <a:buFont typeface="Arial" pitchFamily="34" charset="0"/>
+              <a:buChar char="•"/>
+              <a:defRPr sz="2000" kern="1200">
+                <a:solidFill>
+                  <a:schemeClr val="tx1"/>
+                </a:solidFill>
+                <a:latin typeface="+mn-lt"/>
+                <a:ea typeface="+mn-ea"/>
+                <a:cs typeface="+mn-cs"/>
+              </a:defRPr>
+            </a:lvl9pPr>
+          </a:lstStyle>
+          <a:p>
+            <a:r>
+              <a:rPr lang="en-US" sz="1200" dirty="0">
+                <a:solidFill>
+                  <a:schemeClr val="accent6">
+                    <a:lumMod val="75000"/>
+                  </a:schemeClr>
+                </a:solidFill>
+              </a:rPr>
+              <a:t>BOOST_PYTHON_MODULE</a:t>
+            </a:r>
+            <a:r>
+              <a:rPr lang="en-US" sz="1200" dirty="0"/>
+              <a:t>(</a:t>
+            </a:r>
+            <a:r>
+              <a:rPr lang="en-US" sz="1200" dirty="0" err="1"/>
+              <a:t>Simulator_Wrapper</a:t>
+            </a:r>
+            <a:r>
+              <a:rPr lang="en-US" sz="1200" dirty="0"/>
+              <a:t>)</a:t>
+            </a:r>
+          </a:p>
+          <a:p>
+            <a:r>
+              <a:rPr lang="en-US" sz="1200" dirty="0"/>
+              <a:t>{</a:t>
+            </a:r>
+          </a:p>
+          <a:p>
+            <a:r>
+              <a:rPr lang="de-DE" sz="1200" dirty="0"/>
+              <a:t>    </a:t>
+            </a:r>
+            <a:r>
+              <a:rPr lang="de-DE" sz="1200" dirty="0">
+                <a:solidFill>
+                  <a:schemeClr val="accent6">
+                    <a:lumMod val="75000"/>
+                  </a:schemeClr>
+                </a:solidFill>
+              </a:rPr>
+              <a:t>to_python_converter</a:t>
+            </a:r>
+            <a:r>
+              <a:rPr lang="de-DE" sz="1200" dirty="0"/>
+              <a:t>&lt;std::tuple&lt;int, int, int&gt;, TupleToList&lt;int&gt; &gt;();</a:t>
+            </a:r>
+          </a:p>
+          <a:p>
+            <a:endParaRPr lang="de-DE" sz="1200" dirty="0"/>
+          </a:p>
+          <a:p>
+            <a:r>
+              <a:rPr lang="de-DE" sz="1200" dirty="0"/>
+              <a:t>    </a:t>
+            </a:r>
+            <a:r>
+              <a:rPr lang="de-DE" sz="1200" dirty="0">
+                <a:solidFill>
+                  <a:schemeClr val="accent6">
+                    <a:lumMod val="75000"/>
+                  </a:schemeClr>
+                </a:solidFill>
+              </a:rPr>
+              <a:t>enum_</a:t>
+            </a:r>
+            <a:r>
+              <a:rPr lang="de-DE" sz="1200" dirty="0"/>
+              <a:t>&lt;Selection_Algorithm&gt;("Selection_Algorithm")</a:t>
+            </a:r>
+          </a:p>
+          <a:p>
+            <a:r>
+              <a:rPr lang="de-DE" sz="1200" dirty="0"/>
+              <a:t>            .</a:t>
+            </a:r>
+            <a:r>
+              <a:rPr lang="de-DE" sz="1200" dirty="0">
+                <a:solidFill>
+                  <a:schemeClr val="accent6">
+                    <a:lumMod val="75000"/>
+                  </a:schemeClr>
+                </a:solidFill>
+              </a:rPr>
+              <a:t>value</a:t>
+            </a:r>
+            <a:r>
+              <a:rPr lang="de-DE" sz="1200" dirty="0"/>
+              <a:t>("SOFT", Selection_Algorithm::SOFT);</a:t>
+            </a:r>
+          </a:p>
+          <a:p>
+            <a:endParaRPr lang="de-DE" sz="1200" dirty="0"/>
+          </a:p>
+          <a:p>
+            <a:r>
+              <a:rPr lang="de-DE" sz="1200" dirty="0"/>
+              <a:t>    </a:t>
+            </a:r>
+            <a:r>
+              <a:rPr lang="de-DE" sz="1200" dirty="0">
+                <a:solidFill>
+                  <a:schemeClr val="accent6">
+                    <a:lumMod val="75000"/>
+                  </a:schemeClr>
+                </a:solidFill>
+              </a:rPr>
+              <a:t>class_</a:t>
+            </a:r>
+            <a:r>
+              <a:rPr lang="de-DE" sz="1200" dirty="0"/>
+              <a:t>&lt;Simulator&gt;("Simulator", </a:t>
+            </a:r>
+            <a:r>
+              <a:rPr lang="de-DE" sz="1200" dirty="0">
+                <a:solidFill>
+                  <a:schemeClr val="accent6">
+                    <a:lumMod val="75000"/>
+                  </a:schemeClr>
+                </a:solidFill>
+              </a:rPr>
+              <a:t>init</a:t>
+            </a:r>
+            <a:r>
+              <a:rPr lang="de-DE" sz="1200" dirty="0"/>
+              <a:t>&lt;</a:t>
+            </a:r>
+          </a:p>
+          <a:p>
+            <a:r>
+              <a:rPr lang="de-DE" sz="1200" dirty="0"/>
+              <a:t>            std::string, std::string, std::string,</a:t>
+            </a:r>
+          </a:p>
+          <a:p>
+            <a:r>
+              <a:rPr lang="de-DE" sz="1200" dirty="0"/>
+              <a:t>            int,int,int,int,</a:t>
+            </a:r>
+          </a:p>
+          <a:p>
+            <a:r>
+              <a:rPr lang="de-DE" sz="1200" dirty="0"/>
+              <a:t>            Crossover_Algorithm, Marriage_Algorithm, Mutation_Algorithm, Selection_Algorithm&gt;(</a:t>
+            </a:r>
+          </a:p>
+          <a:p>
+            <a:r>
+              <a:rPr lang="de-DE" sz="1200" dirty="0"/>
+              <a:t>            ))</a:t>
+            </a:r>
+          </a:p>
+          <a:p>
+            <a:r>
+              <a:rPr lang="de-DE" sz="1200" dirty="0"/>
+              <a:t>            .</a:t>
+            </a:r>
+            <a:r>
+              <a:rPr lang="de-DE" sz="1200" dirty="0">
+                <a:solidFill>
+                  <a:schemeClr val="accent6">
+                    <a:lumMod val="75000"/>
+                  </a:schemeClr>
+                </a:solidFill>
+              </a:rPr>
+              <a:t>def</a:t>
+            </a:r>
+            <a:r>
+              <a:rPr lang="de-DE" sz="1200" dirty="0"/>
+              <a:t>("simulate", &amp;Simulator::simulate)</a:t>
+            </a:r>
+          </a:p>
+          <a:p>
+            <a:r>
+              <a:rPr lang="de-DE" sz="1200" dirty="0"/>
+              <a:t>            .</a:t>
+            </a:r>
+            <a:r>
+              <a:rPr lang="de-DE" sz="1200" dirty="0">
+                <a:solidFill>
+                  <a:schemeClr val="accent6">
+                    <a:lumMod val="75000"/>
+                  </a:schemeClr>
+                </a:solidFill>
+              </a:rPr>
+              <a:t>def</a:t>
+            </a:r>
+            <a:r>
+              <a:rPr lang="de-DE" sz="1200" dirty="0"/>
+              <a:t>("finished", &amp;Simulator::finished)</a:t>
+            </a:r>
+          </a:p>
+          <a:p>
+            <a:r>
+              <a:rPr lang="de-DE" sz="1200" dirty="0"/>
+              <a:t>            .</a:t>
+            </a:r>
+            <a:r>
+              <a:rPr lang="de-DE" sz="1200" dirty="0">
+                <a:solidFill>
+                  <a:schemeClr val="accent6">
+                    <a:lumMod val="75000"/>
+                  </a:schemeClr>
+                </a:solidFill>
+              </a:rPr>
+              <a:t>def</a:t>
+            </a:r>
+            <a:r>
+              <a:rPr lang="de-DE" sz="1200" dirty="0"/>
+              <a:t>("best_individual", &amp;Simulator::best_individual);</a:t>
+            </a:r>
+          </a:p>
+          <a:p>
+            <a:r>
+              <a:rPr lang="de-DE" sz="1200" dirty="0"/>
+              <a:t>}</a:t>
+            </a:r>
+            <a:endParaRPr lang="de-DE" sz="1800" dirty="0"/>
+          </a:p>
+        </p:txBody>
+      </p:sp>
+    </p:spTree>
+    <p:extLst>
+      <p:ext uri="{BB962C8B-B14F-4D97-AF65-F5344CB8AC3E}">
+        <p14:creationId xmlns:p14="http://schemas.microsoft.com/office/powerpoint/2010/main" val="580990576"/>
+      </p:ext>
+    </p:extLst>
+  </p:cSld>
+  <p:clrMapOvr>
+    <a:masterClrMapping/>
+  </p:clrMapOvr>
+</p:sld>
+</file>
+
+<file path=ppt/slides/slide19.xml><?xml version="1.0" encoding="utf-8"?>
+<p:sld xmlns:a="http://schemas.openxmlformats.org/drawingml/2006/main" xmlns:r="http://schemas.openxmlformats.org/officeDocument/2006/relationships" xmlns:p="http://schemas.openxmlformats.org/presentationml/2006/main">
+  <p:cSld>
+    <p:spTree>
+      <p:nvGrpSpPr>
+        <p:cNvPr id="1" name=""/>
+        <p:cNvGrpSpPr/>
+        <p:nvPr/>
+      </p:nvGrpSpPr>
+      <p:grpSpPr>
+        <a:xfrm>
+          <a:off x="0" y="0"/>
+          <a:ext cx="0" cy="0"/>
+          <a:chOff x="0" y="0"/>
+          <a:chExt cx="0" cy="0"/>
+        </a:xfrm>
+      </p:grpSpPr>
+      <p:sp>
+        <p:nvSpPr>
+          <p:cNvPr id="2" name="Title 1">
+            <a:extLst>
+              <a:ext uri="{FF2B5EF4-FFF2-40B4-BE49-F238E27FC236}">
+                <a16:creationId xmlns:a16="http://schemas.microsoft.com/office/drawing/2014/main" id="{81EFB697-ABB7-4385-A87F-DE3D50F38BDB}"/>
+              </a:ext>
+            </a:extLst>
+          </p:cNvPr>
+          <p:cNvSpPr>
+            <a:spLocks noGrp="1"/>
+          </p:cNvSpPr>
+          <p:nvPr>
+            <p:ph type="title"/>
+          </p:nvPr>
+        </p:nvSpPr>
+        <p:spPr/>
+        <p:txBody>
+          <a:bodyPr/>
+          <a:lstStyle/>
+          <a:p>
+            <a:r>
+              <a:rPr lang="de-DE" dirty="0"/>
               <a:t>Realisierung – Testen</a:t>
             </a:r>
           </a:p>
@@ -24933,89 +25823,6 @@
     <p:extLst>
       <p:ext uri="{BB962C8B-B14F-4D97-AF65-F5344CB8AC3E}">
         <p14:creationId xmlns:p14="http://schemas.microsoft.com/office/powerpoint/2010/main" val="2116170783"/>
-      </p:ext>
-    </p:extLst>
-  </p:cSld>
-  <p:clrMapOvr>
-    <a:masterClrMapping/>
-  </p:clrMapOvr>
-</p:sld>
-</file>
-
-<file path=ppt/slides/slide19.xml><?xml version="1.0" encoding="utf-8"?>
-<p:sld xmlns:a="http://schemas.openxmlformats.org/drawingml/2006/main" xmlns:r="http://schemas.openxmlformats.org/officeDocument/2006/relationships" xmlns:p="http://schemas.openxmlformats.org/presentationml/2006/main">
-  <p:cSld>
-    <p:spTree>
-      <p:nvGrpSpPr>
-        <p:cNvPr id="1" name=""/>
-        <p:cNvGrpSpPr/>
-        <p:nvPr/>
-      </p:nvGrpSpPr>
-      <p:grpSpPr>
-        <a:xfrm>
-          <a:off x="0" y="0"/>
-          <a:ext cx="0" cy="0"/>
-          <a:chOff x="0" y="0"/>
-          <a:chExt cx="0" cy="0"/>
-        </a:xfrm>
-      </p:grpSpPr>
-      <p:sp>
-        <p:nvSpPr>
-          <p:cNvPr id="2" name="Title 1">
-            <a:extLst>
-              <a:ext uri="{FF2B5EF4-FFF2-40B4-BE49-F238E27FC236}">
-                <a16:creationId xmlns:a16="http://schemas.microsoft.com/office/drawing/2014/main" id="{2BC7ABD1-FA22-4A07-8074-128F2BE75F22}"/>
-              </a:ext>
-            </a:extLst>
-          </p:cNvPr>
-          <p:cNvSpPr>
-            <a:spLocks noGrp="1"/>
-          </p:cNvSpPr>
-          <p:nvPr>
-            <p:ph type="title"/>
-          </p:nvPr>
-        </p:nvSpPr>
-        <p:spPr/>
-        <p:txBody>
-          <a:bodyPr/>
-          <a:lstStyle/>
-          <a:p>
-            <a:r>
-              <a:rPr lang="de-DE" dirty="0"/>
-              <a:t>Experimente</a:t>
-            </a:r>
-          </a:p>
-        </p:txBody>
-      </p:sp>
-      <p:sp>
-        <p:nvSpPr>
-          <p:cNvPr id="3" name="Text Placeholder 2">
-            <a:extLst>
-              <a:ext uri="{FF2B5EF4-FFF2-40B4-BE49-F238E27FC236}">
-                <a16:creationId xmlns:a16="http://schemas.microsoft.com/office/drawing/2014/main" id="{A1EF1E2D-8B9F-419C-AAF3-98ED1E7877CB}"/>
-              </a:ext>
-            </a:extLst>
-          </p:cNvPr>
-          <p:cNvSpPr>
-            <a:spLocks noGrp="1"/>
-          </p:cNvSpPr>
-          <p:nvPr>
-            <p:ph type="body" sz="quarter" idx="11"/>
-          </p:nvPr>
-        </p:nvSpPr>
-        <p:spPr/>
-        <p:txBody>
-          <a:bodyPr/>
-          <a:lstStyle/>
-          <a:p>
-            <a:endParaRPr lang="de-DE" dirty="0"/>
-          </a:p>
-        </p:txBody>
-      </p:sp>
-    </p:spTree>
-    <p:extLst>
-      <p:ext uri="{BB962C8B-B14F-4D97-AF65-F5344CB8AC3E}">
-        <p14:creationId xmlns:p14="http://schemas.microsoft.com/office/powerpoint/2010/main" val="3262423100"/>
       </p:ext>
     </p:extLst>
   </p:cSld>
@@ -25441,6 +26248,89 @@
           <p:cNvPr id="2" name="Title 1">
             <a:extLst>
               <a:ext uri="{FF2B5EF4-FFF2-40B4-BE49-F238E27FC236}">
+                <a16:creationId xmlns:a16="http://schemas.microsoft.com/office/drawing/2014/main" id="{2BC7ABD1-FA22-4A07-8074-128F2BE75F22}"/>
+              </a:ext>
+            </a:extLst>
+          </p:cNvPr>
+          <p:cNvSpPr>
+            <a:spLocks noGrp="1"/>
+          </p:cNvSpPr>
+          <p:nvPr>
+            <p:ph type="title"/>
+          </p:nvPr>
+        </p:nvSpPr>
+        <p:spPr/>
+        <p:txBody>
+          <a:bodyPr/>
+          <a:lstStyle/>
+          <a:p>
+            <a:r>
+              <a:rPr lang="de-DE" dirty="0"/>
+              <a:t>Experimente</a:t>
+            </a:r>
+          </a:p>
+        </p:txBody>
+      </p:sp>
+      <p:sp>
+        <p:nvSpPr>
+          <p:cNvPr id="3" name="Text Placeholder 2">
+            <a:extLst>
+              <a:ext uri="{FF2B5EF4-FFF2-40B4-BE49-F238E27FC236}">
+                <a16:creationId xmlns:a16="http://schemas.microsoft.com/office/drawing/2014/main" id="{A1EF1E2D-8B9F-419C-AAF3-98ED1E7877CB}"/>
+              </a:ext>
+            </a:extLst>
+          </p:cNvPr>
+          <p:cNvSpPr>
+            <a:spLocks noGrp="1"/>
+          </p:cNvSpPr>
+          <p:nvPr>
+            <p:ph type="body" sz="quarter" idx="11"/>
+          </p:nvPr>
+        </p:nvSpPr>
+        <p:spPr/>
+        <p:txBody>
+          <a:bodyPr/>
+          <a:lstStyle/>
+          <a:p>
+            <a:endParaRPr lang="de-DE" dirty="0"/>
+          </a:p>
+        </p:txBody>
+      </p:sp>
+    </p:spTree>
+    <p:extLst>
+      <p:ext uri="{BB962C8B-B14F-4D97-AF65-F5344CB8AC3E}">
+        <p14:creationId xmlns:p14="http://schemas.microsoft.com/office/powerpoint/2010/main" val="3262423100"/>
+      </p:ext>
+    </p:extLst>
+  </p:cSld>
+  <p:clrMapOvr>
+    <a:masterClrMapping/>
+  </p:clrMapOvr>
+</p:sld>
+</file>
+
+<file path=ppt/slides/slide21.xml><?xml version="1.0" encoding="utf-8"?>
+<p:sld xmlns:a="http://schemas.openxmlformats.org/drawingml/2006/main" xmlns:r="http://schemas.openxmlformats.org/officeDocument/2006/relationships" xmlns:p="http://schemas.openxmlformats.org/presentationml/2006/main">
+  <p:cSld>
+    <p:spTree>
+      <p:nvGrpSpPr>
+        <p:cNvPr id="1" name=""/>
+        <p:cNvGrpSpPr/>
+        <p:nvPr/>
+      </p:nvGrpSpPr>
+      <p:grpSpPr>
+        <a:xfrm>
+          <a:off x="0" y="0"/>
+          <a:ext cx="0" cy="0"/>
+          <a:chOff x="0" y="0"/>
+          <a:chExt cx="0" cy="0"/>
+        </a:xfrm>
+      </p:grpSpPr>
+      <p:sp>
+        <p:nvSpPr>
+          <p:cNvPr id="2" name="Title 1">
+            <a:extLst>
+              <a:ext uri="{FF2B5EF4-FFF2-40B4-BE49-F238E27FC236}">
                 <a16:creationId xmlns:a16="http://schemas.microsoft.com/office/drawing/2014/main" id="{5C90F86E-5409-42C3-8720-C9F27C41C489}"/>
               </a:ext>
             </a:extLst>
@@ -25482,7 +26372,7 @@
 </p:sld>
 </file>
 
-<file path=ppt/slides/slide21.xml><?xml version="1.0" encoding="utf-8"?>
+<file path=ppt/slides/slide22.xml><?xml version="1.0" encoding="utf-8"?>
 <p:sld xmlns:a="http://schemas.openxmlformats.org/drawingml/2006/main" xmlns:r="http://schemas.openxmlformats.org/officeDocument/2006/relationships" xmlns:p="http://schemas.openxmlformats.org/presentationml/2006/main">
   <p:cSld>
     <p:spTree>
@@ -25680,7 +26570,7 @@
 </p:sld>
 </file>
 
-<file path=ppt/slides/slide22.xml><?xml version="1.0" encoding="utf-8"?>
+<file path=ppt/slides/slide23.xml><?xml version="1.0" encoding="utf-8"?>
 <p:sld xmlns:a="http://schemas.openxmlformats.org/drawingml/2006/main" xmlns:r="http://schemas.openxmlformats.org/officeDocument/2006/relationships" xmlns:p="http://schemas.openxmlformats.org/presentationml/2006/main">
   <p:cSld>
     <p:spTree>
@@ -25887,7 +26777,7 @@
 </p:sld>
 </file>
 
-<file path=ppt/slides/slide23.xml><?xml version="1.0" encoding="utf-8"?>
+<file path=ppt/slides/slide24.xml><?xml version="1.0" encoding="utf-8"?>
 <p:sld xmlns:a="http://schemas.openxmlformats.org/drawingml/2006/main" xmlns:r="http://schemas.openxmlformats.org/officeDocument/2006/relationships" xmlns:p="http://schemas.openxmlformats.org/presentationml/2006/main">
   <p:cSld>
     <p:spTree>
@@ -25997,7 +26887,7 @@
 </p:sld>
 </file>
 
-<file path=ppt/slides/slide24.xml><?xml version="1.0" encoding="utf-8"?>
+<file path=ppt/slides/slide25.xml><?xml version="1.0" encoding="utf-8"?>
 <p:sld xmlns:a="http://schemas.openxmlformats.org/drawingml/2006/main" xmlns:r="http://schemas.openxmlformats.org/officeDocument/2006/relationships" xmlns:p="http://schemas.openxmlformats.org/presentationml/2006/main">
   <p:cSld>
     <p:spTree>

</xml_diff>

<commit_message>
Added images to latex
</commit_message>
<xml_diff>
--- a/Projektvortrag/Präsentation Projektvortrag.pptx
+++ b/Projektvortrag/Präsentation Projektvortrag.pptx
@@ -71,6 +71,10 @@
       <p:bold r:id="rId55"/>
       <p:italic r:id="rId56"/>
       <p:boldItalic r:id="rId57"/>
+    </p:embeddedFont>
+    <p:embeddedFont>
+      <p:font typeface="Cambria Math" panose="02040503050406030204" pitchFamily="18" charset="0"/>
+      <p:regular r:id="rId58"/>
     </p:embeddedFont>
   </p:embeddedFontLst>
   <p:defaultTextStyle>
@@ -389,6 +393,18 @@
     </p:ext>
   </p:extLst>
 </p:presentation>
+</file>
+
+<file path=ppt/commentAuthors.xml><?xml version="1.0" encoding="utf-8"?>
+<p:cmAuthorLst xmlns:a="http://schemas.openxmlformats.org/drawingml/2006/main" xmlns:r="http://schemas.openxmlformats.org/officeDocument/2006/relationships" xmlns:p="http://schemas.openxmlformats.org/presentationml/2006/main">
+  <p:cmAuthor id="1" name="niklas hartinger" initials="nh" lastIdx="1" clrIdx="0">
+    <p:extLst>
+      <p:ext uri="{19B8F6BF-5375-455C-9EA6-DF929625EA0E}">
+        <p15:presenceInfo xmlns:p15="http://schemas.microsoft.com/office/powerpoint/2012/main" userId="57c72d3db51efbcb" providerId="Windows Live"/>
+      </p:ext>
+    </p:extLst>
+  </p:cmAuthor>
+</p:cmAuthorLst>
 </file>
 
 <file path=ppt/charts/chart1.xml><?xml version="1.0" encoding="utf-8"?>
@@ -1392,7 +1408,7 @@
           <a:p>
             <a:fld id="{05D446E8-F186-42E5-80D9-72B8BAA14DE1}" type="datetimeFigureOut">
               <a:rPr lang="de-DE" smtClean="0"/>
-              <a:t>24.01.2021</a:t>
+              <a:t>25.01.2021</a:t>
             </a:fld>
             <a:endParaRPr lang="de-DE"/>
           </a:p>
@@ -3840,6 +3856,15 @@
           <a:p>
             <a:r>
               <a:rPr lang="de-DE" dirty="0"/>
+              <a:t>Es wird zuerst getauscht dann korrigiert</a:t>
+            </a:r>
+          </a:p>
+          <a:p>
+            <a:endParaRPr lang="de-DE" dirty="0"/>
+          </a:p>
+          <a:p>
+            <a:r>
+              <a:rPr lang="de-DE" dirty="0"/>
               <a:t>Neigt dazu die absoluten Elementposition zu erhalten</a:t>
             </a:r>
           </a:p>
@@ -3949,6 +3974,53 @@
         <p:txBody>
           <a:bodyPr/>
           <a:lstStyle/>
+          <a:p>
+            <a:pPr marL="457200" marR="0" lvl="0" indent="-228600" algn="l" defTabSz="914400" rtl="0" eaLnBrk="1" fontAlgn="auto" latinLnBrk="0" hangingPunct="1">
+              <a:lnSpc>
+                <a:spcPct val="100000"/>
+              </a:lnSpc>
+              <a:spcBef>
+                <a:spcPts val="360"/>
+              </a:spcBef>
+              <a:spcAft>
+                <a:spcPts val="0"/>
+              </a:spcAft>
+              <a:buClr>
+                <a:srgbClr val="000000"/>
+              </a:buClr>
+              <a:buSzPts val="1400"/>
+              <a:buFont typeface="Arial"/>
+              <a:buNone/>
+              <a:tabLst/>
+              <a:defRPr/>
+            </a:pPr>
+            <a:r>
+              <a:rPr lang="de-DE" dirty="0"/>
+              <a:t>Es wird zuerst korrigiert und dann getauscht</a:t>
+            </a:r>
+          </a:p>
+          <a:p>
+            <a:pPr marL="457200" marR="0" lvl="0" indent="-228600" algn="l" defTabSz="914400" rtl="0" eaLnBrk="1" fontAlgn="auto" latinLnBrk="0" hangingPunct="1">
+              <a:lnSpc>
+                <a:spcPct val="100000"/>
+              </a:lnSpc>
+              <a:spcBef>
+                <a:spcPts val="360"/>
+              </a:spcBef>
+              <a:spcAft>
+                <a:spcPts val="0"/>
+              </a:spcAft>
+              <a:buClr>
+                <a:srgbClr val="000000"/>
+              </a:buClr>
+              <a:buSzPts val="1400"/>
+              <a:buFont typeface="Arial"/>
+              <a:buNone/>
+              <a:tabLst/>
+              <a:defRPr/>
+            </a:pPr>
+            <a:endParaRPr lang="de-DE" dirty="0"/>
+          </a:p>
           <a:p>
             <a:pPr marL="457200" marR="0" lvl="0" indent="-228600" algn="l" defTabSz="914400" rtl="0" eaLnBrk="1" fontAlgn="auto" latinLnBrk="0" hangingPunct="1">
               <a:lnSpc>
@@ -25229,7 +25301,7 @@
           <a:lstStyle/>
           <a:p>
             <a:r>
-              <a:rPr lang="en-US" sz="1050" dirty="0">
+              <a:rPr lang="en-US" sz="1100" dirty="0">
                 <a:solidFill>
                   <a:schemeClr val="accent6">
                     <a:lumMod val="75000"/>
@@ -25239,55 +25311,44 @@
               <a:t>void</a:t>
             </a:r>
             <a:r>
-              <a:rPr lang="en-US" sz="1050" dirty="0"/>
+              <a:rPr lang="en-US" sz="1100" dirty="0"/>
               <a:t> </a:t>
             </a:r>
             <a:r>
-              <a:rPr lang="en-US" sz="1050" dirty="0" err="1"/>
+              <a:rPr lang="en-US" sz="1100" dirty="0" err="1"/>
               <a:t>partially_matched_crossover</a:t>
             </a:r>
             <a:r>
-              <a:rPr lang="en-US" sz="1050" dirty="0"/>
+              <a:rPr lang="en-US" sz="1100" dirty="0"/>
               <a:t>(Individual &amp;p1, Individual &amp;p2, Individual &amp;c1, Individual &amp;c2) {</a:t>
             </a:r>
             <a:r>
-              <a:rPr lang="de-DE" sz="1050" dirty="0"/>
+              <a:rPr lang="de-DE" sz="1100" dirty="0"/>
               <a:t> </a:t>
             </a:r>
           </a:p>
           <a:p>
             <a:pPr lvl="1"/>
             <a:r>
-              <a:rPr lang="de-DE" sz="1050" dirty="0"/>
+              <a:rPr lang="de-DE" sz="1100" dirty="0"/>
               <a:t>int length = p1.get_size();</a:t>
             </a:r>
           </a:p>
           <a:p>
             <a:pPr lvl="1"/>
             <a:r>
-              <a:rPr lang="de-DE" sz="1050" dirty="0"/>
-              <a:t>int interval_border_left = rand(length - 2) + 1; </a:t>
+              <a:rPr lang="de-DE" sz="1100" dirty="0"/>
+              <a:t> int interval_border_left, interval_border_right = calc_two_random_interval_borders(length);</a:t>
             </a:r>
           </a:p>
           <a:p>
             <a:pPr lvl="1"/>
-            <a:r>
-              <a:rPr lang="de-DE" sz="1050" dirty="0"/>
-              <a:t>int interval_border_right</a:t>
-            </a:r>
-            <a:r>
-              <a:rPr lang="de-DE" altLang="de-DE" sz="1050" dirty="0"/>
-              <a:t> = rand(position_a + 1, individual.get_size());</a:t>
-            </a:r>
+            <a:endParaRPr lang="de-DE" sz="1100" dirty="0"/>
           </a:p>
           <a:p>
             <a:pPr lvl="1"/>
-            <a:endParaRPr lang="de-DE" sz="1050" dirty="0"/>
-          </a:p>
-          <a:p>
-            <a:pPr lvl="1"/>
-            <a:r>
-              <a:rPr lang="de-DE" sz="1050" dirty="0">
+            <a:r>
+              <a:rPr lang="de-DE" sz="1100" dirty="0">
                 <a:solidFill>
                   <a:schemeClr val="accent6">
                     <a:lumMod val="75000"/>
@@ -25297,18 +25358,18 @@
               <a:t>for</a:t>
             </a:r>
             <a:r>
-              <a:rPr lang="de-DE" sz="1050" dirty="0"/>
+              <a:rPr lang="de-DE" sz="1100" dirty="0"/>
               <a:t> (int i = 0; i &lt; length; ++i) {</a:t>
             </a:r>
           </a:p>
           <a:p>
             <a:pPr lvl="1"/>
             <a:r>
-              <a:rPr lang="de-DE" sz="1050" dirty="0"/>
+              <a:rPr lang="de-DE" sz="1100" dirty="0"/>
               <a:t>    </a:t>
             </a:r>
             <a:r>
-              <a:rPr lang="de-DE" sz="1050" dirty="0">
+              <a:rPr lang="de-DE" sz="1100" dirty="0">
                 <a:solidFill>
                   <a:schemeClr val="accent6">
                     <a:lumMod val="75000"/>
@@ -25318,32 +25379,32 @@
               <a:t>if</a:t>
             </a:r>
             <a:r>
-              <a:rPr lang="de-DE" sz="1050" dirty="0"/>
+              <a:rPr lang="de-DE" sz="1100" dirty="0"/>
               <a:t> (i &lt; interval_border_left || i &gt;= interval_border_right) {</a:t>
             </a:r>
           </a:p>
           <a:p>
             <a:pPr lvl="1"/>
             <a:r>
-              <a:rPr lang="de-DE" sz="1050" dirty="0"/>
+              <a:rPr lang="de-DE" sz="1100" dirty="0"/>
               <a:t>        c1.update_chromosome(p1.get_chromosome().at(i), i);</a:t>
             </a:r>
           </a:p>
           <a:p>
             <a:pPr lvl="1"/>
             <a:r>
-              <a:rPr lang="de-DE" sz="1050" dirty="0"/>
+              <a:rPr lang="de-DE" sz="1100" dirty="0"/>
               <a:t>        c2.update_chromosome(p2.get_chromosome().at(i), i);</a:t>
             </a:r>
           </a:p>
           <a:p>
             <a:pPr lvl="1"/>
             <a:r>
-              <a:rPr lang="de-DE" sz="1050" dirty="0"/>
+              <a:rPr lang="de-DE" sz="1100" dirty="0"/>
               <a:t>    } </a:t>
             </a:r>
             <a:r>
-              <a:rPr lang="de-DE" sz="1050" dirty="0">
+              <a:rPr lang="de-DE" sz="1100" dirty="0">
                 <a:solidFill>
                   <a:schemeClr val="accent6">
                     <a:lumMod val="75000"/>
@@ -25353,60 +25414,60 @@
               <a:t>else</a:t>
             </a:r>
             <a:r>
-              <a:rPr lang="de-DE" sz="1050" dirty="0"/>
+              <a:rPr lang="de-DE" sz="1100" dirty="0"/>
               <a:t> {</a:t>
             </a:r>
           </a:p>
           <a:p>
             <a:pPr lvl="1"/>
             <a:r>
-              <a:rPr lang="de-DE" sz="1050" dirty="0"/>
+              <a:rPr lang="de-DE" sz="1100" dirty="0"/>
               <a:t>        c1.update_chromosome(p2.get_chromosome().at(i), i);</a:t>
             </a:r>
           </a:p>
           <a:p>
             <a:pPr lvl="1"/>
             <a:r>
-              <a:rPr lang="de-DE" sz="1050" dirty="0"/>
+              <a:rPr lang="de-DE" sz="1100" dirty="0"/>
               <a:t>        c2.update_chromosome(p1.get_chromosome().at(i), i);</a:t>
             </a:r>
           </a:p>
           <a:p>
             <a:pPr lvl="1"/>
             <a:r>
-              <a:rPr lang="de-DE" sz="1050" dirty="0"/>
+              <a:rPr lang="de-DE" sz="1100" dirty="0"/>
               <a:t>    }</a:t>
             </a:r>
           </a:p>
           <a:p>
             <a:pPr lvl="1"/>
             <a:r>
-              <a:rPr lang="de-DE" sz="1050" dirty="0"/>
+              <a:rPr lang="de-DE" sz="1100" dirty="0"/>
               <a:t>}</a:t>
             </a:r>
           </a:p>
           <a:p>
             <a:pPr lvl="1"/>
-            <a:endParaRPr lang="de-DE" sz="1050" dirty="0"/>
+            <a:endParaRPr lang="de-DE" sz="1100" dirty="0"/>
           </a:p>
           <a:p>
             <a:pPr lvl="1"/>
             <a:r>
-              <a:rPr lang="de-DE" sz="1050" dirty="0"/>
+              <a:rPr lang="de-DE" sz="1100" dirty="0"/>
               <a:t>duplicate_correction_pmx(p1, p2, c1);</a:t>
             </a:r>
           </a:p>
           <a:p>
             <a:pPr lvl="1"/>
             <a:r>
-              <a:rPr lang="de-DE" sz="1050" dirty="0"/>
+              <a:rPr lang="de-DE" sz="1100" dirty="0"/>
               <a:t>duplicate_correction_pmx(p2, p1, c2);</a:t>
             </a:r>
           </a:p>
           <a:p>
             <a:pPr lvl="1"/>
             <a:r>
-              <a:rPr lang="de-DE" sz="1050" dirty="0"/>
+              <a:rPr lang="de-DE" sz="1100" dirty="0"/>
               <a:t>}</a:t>
             </a:r>
           </a:p>
@@ -25956,7 +26017,7 @@
         </p:nvSpPr>
         <p:spPr>
           <a:xfrm>
-            <a:off x="263942" y="1251993"/>
+            <a:off x="321010" y="1251993"/>
             <a:ext cx="6101348" cy="4534714"/>
           </a:xfrm>
         </p:spPr>
@@ -25988,7 +26049,7 @@
           <a:p>
             <a:r>
               <a:rPr lang="de-DE" sz="1050" dirty="0"/>
-              <a:t>    int interval_border_left = calc_two_random_interval_borders(length);</a:t>
+              <a:t>    int interval_border_left, interval_border_right = calc_two_random_interval_borders(length);</a:t>
             </a:r>
           </a:p>
           <a:p>
@@ -27181,15 +27242,34 @@
             </a:r>
           </a:p>
           <a:p>
+            <a:pPr lvl="2">
+              <a:spcAft>
+                <a:spcPts val="600"/>
+              </a:spcAft>
+            </a:pPr>
+            <a:r>
+              <a:rPr lang="de-DE" dirty="0"/>
+              <a:t>c1 = 1 4 3 2 5</a:t>
+            </a:r>
+          </a:p>
+          <a:p>
+            <a:pPr lvl="2">
+              <a:spcAft>
+                <a:spcPts val="600"/>
+              </a:spcAft>
+            </a:pPr>
+            <a:r>
+              <a:rPr lang="de-DE" dirty="0"/>
+              <a:t>c2 = 5 2 3 4 1</a:t>
+            </a:r>
+          </a:p>
+          <a:p>
             <a:pPr lvl="1">
               <a:spcAft>
                 <a:spcPts val="600"/>
               </a:spcAft>
             </a:pPr>
-            <a:r>
-              <a:rPr lang="de-DE" dirty="0"/>
-              <a:t>C1:</a:t>
-            </a:r>
+            <a:endParaRPr lang="de-DE" dirty="0"/>
           </a:p>
           <a:p>
             <a:pPr lvl="1">
@@ -27197,10 +27277,7 @@
                 <a:spcPts val="600"/>
               </a:spcAft>
             </a:pPr>
-            <a:r>
-              <a:rPr lang="de-DE" dirty="0"/>
-              <a:t>C2:</a:t>
-            </a:r>
+            <a:endParaRPr lang="de-DE" dirty="0"/>
           </a:p>
           <a:p>
             <a:pPr lvl="2">
@@ -28718,7 +28795,7 @@
           <a:p>
             <a:r>
               <a:rPr lang="de-DE" dirty="0"/>
-              <a:t>Realisierung – Edge-Rocombination-Algorithmus</a:t>
+              <a:t>Realisierung – Edge-Rocombination-Crossover</a:t>
             </a:r>
           </a:p>
         </p:txBody>
@@ -29676,7 +29753,7 @@
           <a:p>
             <a:r>
               <a:rPr lang="de-DE" dirty="0"/>
-              <a:t>Realisierung – Edge-Rocombination-Algorithmus</a:t>
+              <a:t>Realisierung – Edge-Rocombination-Crossover</a:t>
             </a:r>
           </a:p>
         </p:txBody>
@@ -30654,7 +30731,7 @@
           <a:p>
             <a:r>
               <a:rPr lang="de-DE" dirty="0"/>
-              <a:t>Realisierung – Edge-Rocombination-Algorithmus</a:t>
+              <a:t>Realisierung – Edge-Rocombination-Crossover</a:t>
             </a:r>
           </a:p>
         </p:txBody>
@@ -31656,7 +31733,7 @@
           <a:p>
             <a:r>
               <a:rPr lang="de-DE" dirty="0"/>
-              <a:t>Realisierung – Edge-Rocombination-Algorithmus</a:t>
+              <a:t>Realisierung – Edge-Rocombination-Crossover</a:t>
             </a:r>
           </a:p>
         </p:txBody>
@@ -32682,7 +32759,7 @@
           <a:p>
             <a:r>
               <a:rPr lang="de-DE" dirty="0"/>
-              <a:t>Realisierung – Edge-Rocombination-Algorithmus</a:t>
+              <a:t>Realisierung – Edge-Rocombination-Crossover</a:t>
             </a:r>
           </a:p>
         </p:txBody>
@@ -37270,7 +37347,7 @@
           <a:p>
             <a:r>
               <a:rPr lang="de-DE" dirty="0"/>
-              <a:t>Generationsgröße: 10</a:t>
+              <a:t>Populationsgröße : 10</a:t>
             </a:r>
           </a:p>
           <a:p>
@@ -37770,7 +37847,7 @@
           <a:p>
             <a:r>
               <a:rPr lang="de-DE" dirty="0"/>
-              <a:t>Generationsgröße: 10</a:t>
+              <a:t>Populationsgröße : 10</a:t>
             </a:r>
           </a:p>
           <a:p>
@@ -38340,7 +38417,7 @@
             </a:pPr>
             <a:r>
               <a:rPr lang="de-DE" dirty="0"/>
-              <a:t>Lediglich die Mutation</a:t>
+              <a:t>Lediglich die Mutation hat noch Auswirkung</a:t>
             </a:r>
           </a:p>
           <a:p>
@@ -38383,7 +38460,7 @@
             </a:pPr>
             <a:r>
               <a:rPr lang="de-DE" dirty="0"/>
-              <a:t>In der Selektion wird geprüft ob zufällig dopplungen Entstanden sind und gelöscht.</a:t>
+              <a:t>In der Selektion wird geprüft ob zufällig Dopplungen entstanden sind und gelöscht.</a:t>
             </a:r>
           </a:p>
           <a:p>
@@ -38546,7 +38623,7 @@
           <a:p>
             <a:r>
               <a:rPr lang="de-DE" dirty="0"/>
-              <a:t>Generationsgröße: 10</a:t>
+              <a:t>Populationsgröße : 10</a:t>
             </a:r>
           </a:p>
           <a:p>
@@ -40580,7 +40657,7 @@
           <a:p>
             <a:r>
               <a:rPr lang="de-DE" dirty="0"/>
-              <a:t>Generationsgröße: 300</a:t>
+              <a:t>Populationsgröße : 300</a:t>
             </a:r>
           </a:p>
           <a:p>
@@ -40644,7 +40721,7 @@
                 <a:latin typeface="Arial" panose="020B0604020202020204" pitchFamily="34" charset="0"/>
                 <a:cs typeface="Arial" panose="020B0604020202020204" pitchFamily="34" charset="0"/>
               </a:rPr>
-              <a:t>Erreicht eine Distanz von ~3466 Meilen.</a:t>
+              <a:t>Erreicht eine Distanz von ~34663 Meilen.</a:t>
             </a:r>
           </a:p>
           <a:p>
@@ -40661,7 +40738,7 @@
                 <a:latin typeface="Arial" panose="020B0604020202020204" pitchFamily="34" charset="0"/>
                 <a:cs typeface="Arial" panose="020B0604020202020204" pitchFamily="34" charset="0"/>
               </a:rPr>
-              <a:t>34669/33551 = 1,033 =&gt; </a:t>
+              <a:t>34663/33551 = 1,033 =&gt; </a:t>
             </a:r>
             <a:r>
               <a:rPr lang="de-DE" sz="1600" b="1" dirty="0">
@@ -41319,7 +41396,7 @@
         </p:nvSpPr>
         <p:spPr>
           <a:xfrm>
-            <a:off x="334963" y="1041373"/>
+            <a:off x="334963" y="1069538"/>
             <a:ext cx="9170633" cy="1169551"/>
           </a:xfrm>
           <a:prstGeom prst="rect">
@@ -41335,19 +41412,23 @@
           <a:p>
             <a:r>
               <a:rPr lang="de-DE" dirty="0"/>
-              <a:t>Generationsgröße: 300</a:t>
+              <a:t>Crossover: </a:t>
+            </a:r>
+            <a:r>
+              <a:rPr lang="de-DE" b="1" dirty="0"/>
+              <a:t>Edge-Recombination</a:t>
             </a:r>
           </a:p>
           <a:p>
             <a:r>
               <a:rPr lang="de-DE" dirty="0"/>
-              <a:t>Mutationsrate: 10%</a:t>
+              <a:t>Populationsgröße : 300</a:t>
             </a:r>
           </a:p>
           <a:p>
             <a:r>
               <a:rPr lang="de-DE" dirty="0"/>
-              <a:t>Mutation: Delete-And-Shift</a:t>
+              <a:t>Mutation: Delete-And-Shift 10%</a:t>
             </a:r>
           </a:p>
           <a:p>
@@ -43016,7 +43097,7 @@
           <a:p>
             <a:r>
               <a:rPr lang="de-DE" dirty="0"/>
-              <a:t>Retrospective</a:t>
+              <a:t>Retrospektive</a:t>
             </a:r>
           </a:p>
         </p:txBody>
@@ -43754,7 +43835,7 @@
             </a:pPr>
             <a:r>
               <a:rPr lang="de-DE" dirty="0"/>
-              <a:t>Experimente konnten zeigen, dann vor allem die Populationsgröße und die Wahl des Crossover-Verfahrens das Ergebnis beeinflussen.</a:t>
+              <a:t>Experimente konnten zeigen, dass vor allem die Populationsgröße und die Wahl des Crossover-Verfahrens das Ergebnis beeinflussen.</a:t>
             </a:r>
           </a:p>
           <a:p>
@@ -43902,7 +43983,7 @@
             </a:pPr>
             <a:r>
               <a:rPr lang="de-DE" dirty="0"/>
-              <a:t>Code mit hinblick auf Performance überarbeiten</a:t>
+              <a:t>Code im Hinblick auf Performance überarbeiten</a:t>
             </a:r>
           </a:p>
           <a:p>
@@ -44223,6 +44304,66 @@
             </a:pPr>
             <a:r>
               <a:rPr lang="de-DE" dirty="0"/>
+              <a:t>Algorithmen:</a:t>
+            </a:r>
+          </a:p>
+          <a:p>
+            <a:pPr marL="0" indent="0" algn="l">
+              <a:buNone/>
+            </a:pPr>
+            <a:r>
+              <a:rPr lang="de-DE" sz="1800" b="0" i="0" u="none" strike="noStrike" baseline="0" dirty="0">
+                <a:latin typeface="LMRoman10-Regular"/>
+              </a:rPr>
+              <a:t>Schöneburg, Eberhard; Heinzmann, Frank; Feddersen, Sven: </a:t>
+            </a:r>
+            <a:r>
+              <a:rPr lang="de-DE" sz="1800" b="0" i="1" u="none" strike="noStrike" baseline="0" dirty="0">
+                <a:latin typeface="LMRoman10-Italic"/>
+              </a:rPr>
+              <a:t>Genetische Algorithmen</a:t>
+            </a:r>
+          </a:p>
+          <a:p>
+            <a:pPr marL="0" indent="0" algn="l">
+              <a:buNone/>
+            </a:pPr>
+            <a:r>
+              <a:rPr lang="de-DE" sz="1800" b="0" i="1" u="none" strike="noStrike" baseline="0" dirty="0">
+                <a:latin typeface="LMRoman10-Italic"/>
+              </a:rPr>
+              <a:t>und Evolutionsstrategien</a:t>
+            </a:r>
+            <a:r>
+              <a:rPr lang="de-DE" sz="1800" b="0" i="0" u="none" strike="noStrike" baseline="0" dirty="0">
+                <a:latin typeface="LMRoman10-Regular"/>
+              </a:rPr>
+              <a:t>, Sammelwerk, 1994, Addison-Wesley Verlag, Bonn, ISBN:</a:t>
+            </a:r>
+          </a:p>
+          <a:p>
+            <a:pPr marL="0" indent="0" algn="l">
+              <a:buNone/>
+            </a:pPr>
+            <a:r>
+              <a:rPr lang="de-DE" sz="1800" b="0" i="0" u="none" strike="noStrike" baseline="0" dirty="0">
+                <a:latin typeface="LMRoman10-Regular"/>
+              </a:rPr>
+              <a:t>978-3-89319-493-3</a:t>
+            </a:r>
+          </a:p>
+          <a:p>
+            <a:pPr marL="0" indent="0" algn="l">
+              <a:buNone/>
+            </a:pPr>
+            <a:endParaRPr lang="de-DE" dirty="0"/>
+          </a:p>
+          <a:p>
+            <a:pPr marL="0" indent="0">
+              <a:buNone/>
+            </a:pPr>
+            <a:r>
+              <a:rPr lang="de-DE" dirty="0"/>
               <a:t>Datensatz:</a:t>
             </a:r>
           </a:p>
@@ -44318,125 +44459,212 @@
           </a:p>
         </p:txBody>
       </p:sp>
-      <p:sp>
-        <p:nvSpPr>
-          <p:cNvPr id="4" name="Text Placeholder 3">
-            <a:extLst>
-              <a:ext uri="{FF2B5EF4-FFF2-40B4-BE49-F238E27FC236}">
-                <a16:creationId xmlns:a16="http://schemas.microsoft.com/office/drawing/2014/main" id="{CB236A5E-E807-4CE0-9539-E7DFD1EDC54B}"/>
-              </a:ext>
-            </a:extLst>
-          </p:cNvPr>
-          <p:cNvSpPr>
-            <a:spLocks noGrp="1"/>
-          </p:cNvSpPr>
-          <p:nvPr>
-            <p:ph type="body" sz="quarter" idx="11"/>
-          </p:nvPr>
-        </p:nvSpPr>
-        <p:spPr>
-          <a:xfrm>
-            <a:off x="3732517" y="1280160"/>
-            <a:ext cx="8131025" cy="3611909"/>
-          </a:xfrm>
-        </p:spPr>
-        <p:txBody>
-          <a:bodyPr/>
-          <a:lstStyle/>
-          <a:p>
-            <a:endParaRPr lang="de-DE" dirty="0"/>
-          </a:p>
-          <a:p>
-            <a:pPr marL="285750" indent="-285750">
-              <a:buFont typeface="Arial" panose="020B0604020202020204" pitchFamily="34" charset="0"/>
-              <a:buChar char="•"/>
-            </a:pPr>
-            <a:r>
-              <a:rPr lang="de-DE" dirty="0"/>
-              <a:t>Besuche die Städte in einer Reihenfolge unter den Bedingungen, dass</a:t>
-            </a:r>
-          </a:p>
-          <a:p>
-            <a:pPr lvl="2"/>
-            <a:r>
-              <a:rPr lang="de-DE" dirty="0"/>
-              <a:t>... keine Stadt außer der Startstadt zwei mal besucht wird und</a:t>
-            </a:r>
-          </a:p>
-          <a:p>
-            <a:pPr lvl="2"/>
-            <a:r>
-              <a:rPr lang="de-DE" dirty="0"/>
-              <a:t>... die zurückgelegte Distanz möglichst kurz ist</a:t>
-            </a:r>
-          </a:p>
-          <a:p>
-            <a:endParaRPr lang="de-DE" dirty="0"/>
-          </a:p>
-          <a:p>
-            <a:pPr marL="285750" indent="-285750">
-              <a:buFont typeface="Arial" panose="020B0604020202020204" pitchFamily="34" charset="0"/>
-              <a:buChar char="•"/>
-            </a:pPr>
-            <a:r>
-              <a:rPr lang="de-DE" dirty="0"/>
-              <a:t>Routen =&gt; Individuen</a:t>
-            </a:r>
-          </a:p>
-          <a:p>
-            <a:r>
-              <a:rPr lang="de-DE" dirty="0"/>
-              <a:t>Berlin – Hamburg – Leipzig – Berlin</a:t>
-            </a:r>
-          </a:p>
-          <a:p>
-            <a:r>
-              <a:rPr lang="de-DE" dirty="0"/>
-              <a:t>[   1	,     0          ,      2        ,    1    ]</a:t>
-            </a:r>
-          </a:p>
-          <a:p>
-            <a:r>
-              <a:rPr lang="de-DE" dirty="0"/>
-              <a:t>=&gt; Array welches verändert werden muss: [0,2]</a:t>
-            </a:r>
-          </a:p>
-          <a:p>
-            <a:endParaRPr lang="de-DE" dirty="0"/>
-          </a:p>
-          <a:p>
-            <a:pPr marL="285750" indent="-285750">
-              <a:buFont typeface="Arial" panose="020B0604020202020204" pitchFamily="34" charset="0"/>
-              <a:buChar char="•"/>
-            </a:pPr>
-            <a:r>
-              <a:rPr lang="de-DE" dirty="0"/>
-              <a:t>Menge von Routen =&gt; Population</a:t>
-            </a:r>
-          </a:p>
-          <a:p>
-            <a:endParaRPr lang="de-DE" dirty="0"/>
-          </a:p>
-          <a:p>
-            <a:endParaRPr lang="de-DE" dirty="0"/>
-          </a:p>
-          <a:p>
-            <a:r>
-              <a:rPr lang="de-DE" dirty="0"/>
-              <a:t>			</a:t>
-            </a:r>
-          </a:p>
-          <a:p>
-            <a:r>
-              <a:rPr lang="de-DE" dirty="0"/>
-              <a:t>			</a:t>
-            </a:r>
-          </a:p>
-          <a:p>
-            <a:endParaRPr lang="de-DE" dirty="0"/>
-          </a:p>
-        </p:txBody>
-      </p:sp>
+      <mc:AlternateContent xmlns:mc="http://schemas.openxmlformats.org/markup-compatibility/2006">
+        <mc:Choice xmlns:a14="http://schemas.microsoft.com/office/drawing/2010/main" Requires="a14">
+          <p:sp>
+            <p:nvSpPr>
+              <p:cNvPr id="4" name="Text Placeholder 3">
+                <a:extLst>
+                  <a:ext uri="{FF2B5EF4-FFF2-40B4-BE49-F238E27FC236}">
+                    <a16:creationId xmlns:a16="http://schemas.microsoft.com/office/drawing/2014/main" id="{CB236A5E-E807-4CE0-9539-E7DFD1EDC54B}"/>
+                  </a:ext>
+                </a:extLst>
+              </p:cNvPr>
+              <p:cNvSpPr>
+                <a:spLocks noGrp="1"/>
+              </p:cNvSpPr>
+              <p:nvPr>
+                <p:ph type="body" sz="quarter" idx="11"/>
+              </p:nvPr>
+            </p:nvSpPr>
+            <p:spPr>
+              <a:xfrm>
+                <a:off x="3732517" y="1280160"/>
+                <a:ext cx="8131025" cy="3611909"/>
+              </a:xfrm>
+            </p:spPr>
+            <p:txBody>
+              <a:bodyPr/>
+              <a:lstStyle/>
+              <a:p>
+                <a:endParaRPr lang="de-DE" dirty="0"/>
+              </a:p>
+              <a:p>
+                <a:pPr marL="285750" indent="-285750">
+                  <a:buFont typeface="Arial" panose="020B0604020202020204" pitchFamily="34" charset="0"/>
+                  <a:buChar char="•"/>
+                </a:pPr>
+                <a:r>
+                  <a:rPr lang="de-DE" dirty="0"/>
+                  <a:t>Besuche die Städte in einer Reihenfolge unter den Bedingungen, dass</a:t>
+                </a:r>
+              </a:p>
+              <a:p>
+                <a:pPr lvl="2"/>
+                <a:r>
+                  <a:rPr lang="de-DE" dirty="0"/>
+                  <a:t>... keine Stadt außer der Startstadt zwei mal besucht wird und</a:t>
+                </a:r>
+              </a:p>
+              <a:p>
+                <a:pPr lvl="2"/>
+                <a:r>
+                  <a:rPr lang="de-DE" dirty="0"/>
+                  <a:t>... die zurückgelegte Distanz möglichst kurz ist</a:t>
+                </a:r>
+              </a:p>
+              <a:p>
+                <a:pPr marL="285750" indent="-285750">
+                  <a:buFont typeface="Arial" panose="020B0604020202020204" pitchFamily="34" charset="0"/>
+                  <a:buChar char="•"/>
+                </a:pPr>
+                <a:r>
+                  <a:rPr lang="de-DE" dirty="0"/>
+                  <a:t>NP-schweres Problem (20 Städte =&gt; 20! =&gt;</a:t>
+                </a:r>
+                <a14:m>
+                  <m:oMath xmlns:m="http://schemas.openxmlformats.org/officeDocument/2006/math">
+                    <m:sSup>
+                      <m:sSupPr>
+                        <m:ctrlPr>
+                          <a:rPr lang="de-DE" sz="1800" b="0" i="1" smtClean="0">
+                            <a:latin typeface="Cambria Math" panose="02040503050406030204" pitchFamily="18" charset="0"/>
+                          </a:rPr>
+                        </m:ctrlPr>
+                      </m:sSupPr>
+                      <m:e>
+                        <m:r>
+                          <a:rPr lang="de-DE" sz="1800" b="0" i="1" smtClean="0">
+                            <a:latin typeface="Cambria Math" panose="02040503050406030204" pitchFamily="18" charset="0"/>
+                          </a:rPr>
+                          <m:t>10</m:t>
+                        </m:r>
+                      </m:e>
+                      <m:sup>
+                        <m:r>
+                          <a:rPr lang="de-DE" sz="1800" b="0" i="1" smtClean="0">
+                            <a:latin typeface="Cambria Math" panose="02040503050406030204" pitchFamily="18" charset="0"/>
+                          </a:rPr>
+                          <m:t>18</m:t>
+                        </m:r>
+                      </m:sup>
+                    </m:sSup>
+                  </m:oMath>
+                </a14:m>
+                <a:r>
+                  <a:rPr lang="de-DE" dirty="0"/>
+                  <a:t> Möglichkeiten)</a:t>
+                </a:r>
+              </a:p>
+              <a:p>
+                <a:pPr marL="285750" indent="-285750">
+                  <a:buFont typeface="Arial" panose="020B0604020202020204" pitchFamily="34" charset="0"/>
+                  <a:buChar char="•"/>
+                </a:pPr>
+                <a:r>
+                  <a:rPr lang="de-DE" dirty="0"/>
+                  <a:t>Routen =&gt; Individuen</a:t>
+                </a:r>
+              </a:p>
+              <a:p>
+                <a:r>
+                  <a:rPr lang="de-DE" dirty="0"/>
+                  <a:t>Berlin – Hamburg – Leipzig – Berlin</a:t>
+                </a:r>
+              </a:p>
+              <a:p>
+                <a:r>
+                  <a:rPr lang="de-DE" dirty="0"/>
+                  <a:t>[   1	,     0          ,      2        ,    1    ]</a:t>
+                </a:r>
+              </a:p>
+              <a:p>
+                <a:r>
+                  <a:rPr lang="de-DE" dirty="0"/>
+                  <a:t>=&gt; Array welches verändert werden muss: [0,2]</a:t>
+                </a:r>
+              </a:p>
+              <a:p>
+                <a:endParaRPr lang="de-DE" dirty="0"/>
+              </a:p>
+              <a:p>
+                <a:pPr marL="285750" indent="-285750">
+                  <a:buFont typeface="Arial" panose="020B0604020202020204" pitchFamily="34" charset="0"/>
+                  <a:buChar char="•"/>
+                </a:pPr>
+                <a:r>
+                  <a:rPr lang="de-DE" dirty="0"/>
+                  <a:t>Menge von Routen =&gt; Population</a:t>
+                </a:r>
+              </a:p>
+              <a:p>
+                <a:endParaRPr lang="de-DE" dirty="0"/>
+              </a:p>
+              <a:p>
+                <a:endParaRPr lang="de-DE" dirty="0"/>
+              </a:p>
+              <a:p>
+                <a:r>
+                  <a:rPr lang="de-DE" dirty="0"/>
+                  <a:t>			</a:t>
+                </a:r>
+              </a:p>
+              <a:p>
+                <a:r>
+                  <a:rPr lang="de-DE" dirty="0"/>
+                  <a:t>			</a:t>
+                </a:r>
+              </a:p>
+              <a:p>
+                <a:endParaRPr lang="de-DE" dirty="0"/>
+              </a:p>
+            </p:txBody>
+          </p:sp>
+        </mc:Choice>
+        <mc:Fallback>
+          <p:sp>
+            <p:nvSpPr>
+              <p:cNvPr id="4" name="Text Placeholder 3">
+                <a:extLst>
+                  <a:ext uri="{FF2B5EF4-FFF2-40B4-BE49-F238E27FC236}">
+                    <a16:creationId xmlns:a16="http://schemas.microsoft.com/office/drawing/2014/main" id="{CB236A5E-E807-4CE0-9539-E7DFD1EDC54B}"/>
+                  </a:ext>
+                </a:extLst>
+              </p:cNvPr>
+              <p:cNvSpPr>
+                <a:spLocks noGrp="1" noRot="1" noChangeAspect="1" noMove="1" noResize="1" noEditPoints="1" noAdjustHandles="1" noChangeArrowheads="1" noChangeShapeType="1" noTextEdit="1"/>
+              </p:cNvSpPr>
+              <p:nvPr>
+                <p:ph type="body" sz="quarter" idx="11"/>
+              </p:nvPr>
+            </p:nvSpPr>
+            <p:spPr>
+              <a:xfrm>
+                <a:off x="3732517" y="1280160"/>
+                <a:ext cx="8131025" cy="3611909"/>
+              </a:xfrm>
+              <a:blipFill>
+                <a:blip r:embed="rId3"/>
+                <a:stretch>
+                  <a:fillRect l="-600" b="-3879"/>
+                </a:stretch>
+              </a:blipFill>
+            </p:spPr>
+            <p:txBody>
+              <a:bodyPr/>
+              <a:lstStyle/>
+              <a:p>
+                <a:r>
+                  <a:rPr lang="de-DE">
+                    <a:noFill/>
+                  </a:rPr>
+                  <a:t> </a:t>
+                </a:r>
+              </a:p>
+            </p:txBody>
+          </p:sp>
+        </mc:Fallback>
+      </mc:AlternateContent>
       <p:pic>
         <p:nvPicPr>
           <p:cNvPr id="5" name="Picture 4">
@@ -44452,7 +44680,7 @@
           <p:nvPr/>
         </p:nvPicPr>
         <p:blipFill>
-          <a:blip r:embed="rId3"/>
+          <a:blip r:embed="rId4"/>
           <a:stretch>
             <a:fillRect/>
           </a:stretch>

</xml_diff>